<commit_message>
Updated text and pwp: added health tracking
</commit_message>
<xml_diff>
--- a/Presentatie_powerpoint.pptx
+++ b/Presentatie_powerpoint.pptx
@@ -4437,7 +4437,7 @@
           <a:p>
             <a:fld id="{C722F3E1-CB26-48F9-850F-095D388C7B08}" type="datetimeFigureOut">
               <a:rPr lang="nl-NL" smtClean="0"/>
-              <a:t>7-10-2024</a:t>
+              <a:t>10-10-2024</a:t>
             </a:fld>
             <a:endParaRPr lang="nl-NL"/>
           </a:p>
@@ -5046,39 +5046,39 @@
           <a:lstStyle/>
           <a:p>
             <a:r>
-              <a:rPr lang="nl-BE" sz="3200" dirty="0"/>
+              <a:rPr lang="nl-BE" sz="1400" dirty="0"/>
               <a:t>Sporttoestellen</a:t>
             </a:r>
           </a:p>
           <a:p>
             <a:r>
-              <a:rPr lang="nl-BE" sz="3200" dirty="0"/>
+              <a:rPr lang="nl-BE" sz="1400" dirty="0"/>
               <a:t>Krachtmetingen</a:t>
             </a:r>
           </a:p>
           <a:p>
             <a:r>
-              <a:rPr lang="nl-BE" sz="3200" dirty="0"/>
+              <a:rPr lang="nl-BE" sz="1400" dirty="0"/>
               <a:t>Revalidatie</a:t>
             </a:r>
           </a:p>
           <a:p>
             <a:r>
-              <a:rPr lang="nl-BE" sz="3200" dirty="0"/>
+              <a:rPr lang="nl-BE" sz="1400" dirty="0"/>
               <a:t>Hartslag</a:t>
             </a:r>
           </a:p>
           <a:p>
             <a:pPr lvl="1"/>
             <a:r>
-              <a:rPr lang="nl-BE" sz="3000" dirty="0"/>
+              <a:rPr lang="nl-BE" sz="1400" dirty="0"/>
               <a:t>Meten</a:t>
             </a:r>
           </a:p>
           <a:p>
             <a:pPr lvl="1"/>
             <a:r>
-              <a:rPr lang="nl-BE" sz="3000" dirty="0"/>
+              <a:rPr lang="nl-BE" sz="1400" dirty="0"/>
               <a:t>Stabiel houden (pacemaker)</a:t>
             </a:r>
           </a:p>
@@ -5437,7 +5437,7 @@
             <a:fld id="{B61BEF0D-F0BB-DE4B-95CE-6DB70DBA9567}" type="datetimeFigureOut">
               <a:rPr lang="en-US" dirty="0"/>
               <a:pPr/>
-              <a:t>10/7/2024</a:t>
+              <a:t>10/10/2024</a:t>
             </a:fld>
             <a:endParaRPr lang="en-US" dirty="0"/>
           </a:p>
@@ -5768,7 +5768,7 @@
             <a:fld id="{B61BEF0D-F0BB-DE4B-95CE-6DB70DBA9567}" type="datetimeFigureOut">
               <a:rPr lang="en-US" dirty="0"/>
               <a:pPr/>
-              <a:t>10/7/2024</a:t>
+              <a:t>10/10/2024</a:t>
             </a:fld>
             <a:endParaRPr lang="en-US" dirty="0"/>
           </a:p>
@@ -6043,7 +6043,7 @@
             <a:fld id="{B61BEF0D-F0BB-DE4B-95CE-6DB70DBA9567}" type="datetimeFigureOut">
               <a:rPr lang="en-US" dirty="0"/>
               <a:pPr/>
-              <a:t>10/7/2024</a:t>
+              <a:t>10/10/2024</a:t>
             </a:fld>
             <a:endParaRPr lang="en-US" dirty="0"/>
           </a:p>
@@ -6608,7 +6608,7 @@
             <a:fld id="{B61BEF0D-F0BB-DE4B-95CE-6DB70DBA9567}" type="datetimeFigureOut">
               <a:rPr lang="en-US" dirty="0"/>
               <a:pPr/>
-              <a:t>10/7/2024</a:t>
+              <a:t>10/10/2024</a:t>
             </a:fld>
             <a:endParaRPr lang="en-US" dirty="0"/>
           </a:p>
@@ -6883,7 +6883,7 @@
             <a:fld id="{B61BEF0D-F0BB-DE4B-95CE-6DB70DBA9567}" type="datetimeFigureOut">
               <a:rPr lang="en-US" dirty="0"/>
               <a:pPr/>
-              <a:t>10/7/2024</a:t>
+              <a:t>10/10/2024</a:t>
             </a:fld>
             <a:endParaRPr lang="en-US" dirty="0"/>
           </a:p>
@@ -7442,7 +7442,7 @@
             <a:fld id="{B61BEF0D-F0BB-DE4B-95CE-6DB70DBA9567}" type="datetimeFigureOut">
               <a:rPr lang="en-US" dirty="0"/>
               <a:pPr/>
-              <a:t>10/7/2024</a:t>
+              <a:t>10/10/2024</a:t>
             </a:fld>
             <a:endParaRPr lang="en-US" dirty="0"/>
           </a:p>
@@ -7766,7 +7766,7 @@
             <a:fld id="{B61BEF0D-F0BB-DE4B-95CE-6DB70DBA9567}" type="datetimeFigureOut">
               <a:rPr lang="en-US" dirty="0"/>
               <a:pPr/>
-              <a:t>10/7/2024</a:t>
+              <a:t>10/10/2024</a:t>
             </a:fld>
             <a:endParaRPr lang="en-US" dirty="0"/>
           </a:p>
@@ -7940,7 +7940,7 @@
             <a:fld id="{B61BEF0D-F0BB-DE4B-95CE-6DB70DBA9567}" type="datetimeFigureOut">
               <a:rPr lang="en-US" dirty="0"/>
               <a:pPr/>
-              <a:t>10/7/2024</a:t>
+              <a:t>10/10/2024</a:t>
             </a:fld>
             <a:endParaRPr lang="en-US" dirty="0"/>
           </a:p>
@@ -8175,7 +8175,7 @@
             <a:fld id="{B61BEF0D-F0BB-DE4B-95CE-6DB70DBA9567}" type="datetimeFigureOut">
               <a:rPr lang="en-US" dirty="0"/>
               <a:pPr/>
-              <a:t>10/7/2024</a:t>
+              <a:t>10/10/2024</a:t>
             </a:fld>
             <a:endParaRPr lang="en-US" dirty="0"/>
           </a:p>
@@ -8372,7 +8372,7 @@
             <a:fld id="{B61BEF0D-F0BB-DE4B-95CE-6DB70DBA9567}" type="datetimeFigureOut">
               <a:rPr lang="en-US" dirty="0"/>
               <a:pPr/>
-              <a:t>10/7/2024</a:t>
+              <a:t>10/10/2024</a:t>
             </a:fld>
             <a:endParaRPr lang="en-US" dirty="0"/>
           </a:p>
@@ -8645,7 +8645,7 @@
             <a:fld id="{B61BEF0D-F0BB-DE4B-95CE-6DB70DBA9567}" type="datetimeFigureOut">
               <a:rPr lang="en-US" dirty="0"/>
               <a:pPr/>
-              <a:t>10/7/2024</a:t>
+              <a:t>10/10/2024</a:t>
             </a:fld>
             <a:endParaRPr lang="en-US" dirty="0"/>
           </a:p>
@@ -8908,7 +8908,7 @@
             <a:fld id="{B61BEF0D-F0BB-DE4B-95CE-6DB70DBA9567}" type="datetimeFigureOut">
               <a:rPr lang="en-US" dirty="0"/>
               <a:pPr/>
-              <a:t>10/7/2024</a:t>
+              <a:t>10/10/2024</a:t>
             </a:fld>
             <a:endParaRPr lang="en-US" dirty="0"/>
           </a:p>
@@ -9279,7 +9279,7 @@
             <a:fld id="{B61BEF0D-F0BB-DE4B-95CE-6DB70DBA9567}" type="datetimeFigureOut">
               <a:rPr lang="en-US" dirty="0"/>
               <a:pPr/>
-              <a:t>10/7/2024</a:t>
+              <a:t>10/10/2024</a:t>
             </a:fld>
             <a:endParaRPr lang="en-US" dirty="0"/>
           </a:p>
@@ -9424,7 +9424,7 @@
             <a:fld id="{B61BEF0D-F0BB-DE4B-95CE-6DB70DBA9567}" type="datetimeFigureOut">
               <a:rPr lang="en-US" dirty="0"/>
               <a:pPr/>
-              <a:t>10/7/2024</a:t>
+              <a:t>10/10/2024</a:t>
             </a:fld>
             <a:endParaRPr lang="en-US" dirty="0"/>
           </a:p>
@@ -9546,7 +9546,7 @@
             <a:fld id="{B61BEF0D-F0BB-DE4B-95CE-6DB70DBA9567}" type="datetimeFigureOut">
               <a:rPr lang="en-US" dirty="0"/>
               <a:pPr/>
-              <a:t>10/7/2024</a:t>
+              <a:t>10/10/2024</a:t>
             </a:fld>
             <a:endParaRPr lang="en-US" dirty="0"/>
           </a:p>
@@ -9828,7 +9828,7 @@
             <a:fld id="{B61BEF0D-F0BB-DE4B-95CE-6DB70DBA9567}" type="datetimeFigureOut">
               <a:rPr lang="en-US" dirty="0"/>
               <a:pPr/>
-              <a:t>10/7/2024</a:t>
+              <a:t>10/10/2024</a:t>
             </a:fld>
             <a:endParaRPr lang="en-US" dirty="0"/>
           </a:p>
@@ -10149,7 +10149,7 @@
             <a:fld id="{B61BEF0D-F0BB-DE4B-95CE-6DB70DBA9567}" type="datetimeFigureOut">
               <a:rPr lang="en-US" dirty="0"/>
               <a:pPr/>
-              <a:t>10/7/2024</a:t>
+              <a:t>10/10/2024</a:t>
             </a:fld>
             <a:endParaRPr lang="en-US" dirty="0"/>
           </a:p>
@@ -10360,7 +10360,7 @@
             <a:fld id="{B61BEF0D-F0BB-DE4B-95CE-6DB70DBA9567}" type="datetimeFigureOut">
               <a:rPr lang="en-US" dirty="0"/>
               <a:pPr/>
-              <a:t>10/7/2024</a:t>
+              <a:t>10/10/2024</a:t>
             </a:fld>
             <a:endParaRPr lang="en-US" dirty="0"/>
           </a:p>
@@ -11725,23 +11725,18 @@
         </p:nvSpPr>
         <p:spPr>
           <a:xfrm>
-            <a:off x="1327255" y="1030288"/>
-            <a:ext cx="6368945" cy="1035579"/>
+            <a:off x="685802" y="990599"/>
+            <a:ext cx="4791336" cy="1075268"/>
           </a:xfrm>
         </p:spPr>
         <p:txBody>
           <a:bodyPr>
-            <a:noAutofit/>
+            <a:normAutofit/>
           </a:bodyPr>
           <a:lstStyle/>
           <a:p>
-            <a:pPr>
-              <a:lnSpc>
-                <a:spcPct val="90000"/>
-              </a:lnSpc>
-            </a:pPr>
-            <a:r>
-              <a:rPr lang="nl-BE" sz="4800" dirty="0"/>
+            <a:r>
+              <a:rPr lang="nl-BE"/>
               <a:t>Gezondheidstracking</a:t>
             </a:r>
           </a:p>
@@ -11765,8 +11760,8 @@
         </p:nvSpPr>
         <p:spPr>
           <a:xfrm>
-            <a:off x="1327255" y="2142067"/>
-            <a:ext cx="5435495" cy="3649133"/>
+            <a:off x="685802" y="2142067"/>
+            <a:ext cx="4791336" cy="3649131"/>
           </a:xfrm>
         </p:spPr>
         <p:txBody>
@@ -11783,7 +11778,13 @@
           <a:p>
             <a:r>
               <a:rPr lang="nl-BE" sz="3200" dirty="0"/>
-              <a:t>Medische toepassingen</a:t>
+              <a:t>Slimme weegschaal</a:t>
+            </a:r>
+          </a:p>
+          <a:p>
+            <a:r>
+              <a:rPr lang="nl-BE" sz="3200" dirty="0"/>
+              <a:t>Revalidatie</a:t>
             </a:r>
           </a:p>
           <a:p>
@@ -11791,42 +11792,194 @@
           </a:p>
         </p:txBody>
       </p:sp>
-      <p:pic>
-        <p:nvPicPr>
-          <p:cNvPr id="5122" name="Picture 2">
+      <p:sp>
+        <p:nvSpPr>
+          <p:cNvPr id="5129" name="Freeform 30">
             <a:extLst>
               <a:ext uri="{FF2B5EF4-FFF2-40B4-BE49-F238E27FC236}">
-                <a16:creationId xmlns:a16="http://schemas.microsoft.com/office/drawing/2014/main" id="{B76B7EA7-30D8-45FC-85EC-8656F6A3A8A2}"/>
+                <a16:creationId xmlns:a16="http://schemas.microsoft.com/office/drawing/2014/main" id="{6B48CC9C-E443-4619-A5F1-8D19F764D4DB}"/>
+              </a:ext>
+              <a:ext uri="{C183D7F6-B498-43B3-948B-1728B52AA6E4}">
+                <adec:decorative xmlns:adec="http://schemas.microsoft.com/office/drawing/2017/decorative" val="1"/>
               </a:ext>
             </a:extLst>
           </p:cNvPr>
-          <p:cNvPicPr>
-            <a:picLocks noChangeAspect="1" noChangeArrowheads="1"/>
-          </p:cNvPicPr>
-          <p:nvPr/>
-        </p:nvPicPr>
-        <p:blipFill>
-          <a:blip r:embed="rId4">
-            <a:extLst>
-              <a:ext uri="{28A0092B-C50C-407E-A947-70E740481C1C}">
-                <a14:useLocalDpi xmlns:a14="http://schemas.microsoft.com/office/drawing/2010/main" val="0"/>
-              </a:ext>
-            </a:extLst>
-          </a:blip>
-          <a:stretch>
-            <a:fillRect/>
-          </a:stretch>
-        </p:blipFill>
-        <p:spPr bwMode="auto">
+          <p:cNvSpPr>
+            <a:spLocks noGrp="1" noRot="1" noChangeAspect="1" noMove="1" noResize="1" noEditPoints="1" noAdjustHandles="1" noChangeArrowheads="1" noChangeShapeType="1" noTextEdit="1"/>
+          </p:cNvSpPr>
+          <p:nvPr>
+            <p:extLst>
+              <p:ext uri="{386F3935-93C4-4BCD-93E2-E3B085C9AB24}">
+                <p16:designElem xmlns:p16="http://schemas.microsoft.com/office/powerpoint/2015/main" val="1"/>
+              </p:ext>
+            </p:extLst>
+          </p:nvPr>
+        </p:nvSpPr>
+        <p:spPr>
           <a:xfrm>
-            <a:off x="7889524" y="639097"/>
-            <a:ext cx="3707664" cy="5575437"/>
+            <a:off x="6100005" y="990599"/>
+            <a:ext cx="4965113" cy="4800599"/>
           </a:xfrm>
-          <a:prstGeom prst="roundRect">
-            <a:avLst>
-              <a:gd name="adj" fmla="val 6267"/>
-            </a:avLst>
-          </a:prstGeom>
+          <a:custGeom>
+            <a:avLst/>
+            <a:gdLst>
+              <a:gd name="connsiteX0" fmla="*/ 2543761 w 4965113"/>
+              <a:gd name="connsiteY0" fmla="*/ 2479677 h 4800599"/>
+              <a:gd name="connsiteX1" fmla="*/ 4965113 w 4965113"/>
+              <a:gd name="connsiteY1" fmla="*/ 2479677 h 4800599"/>
+              <a:gd name="connsiteX2" fmla="*/ 4965113 w 4965113"/>
+              <a:gd name="connsiteY2" fmla="*/ 4545255 h 4800599"/>
+              <a:gd name="connsiteX3" fmla="*/ 4709769 w 4965113"/>
+              <a:gd name="connsiteY3" fmla="*/ 4800599 h 4800599"/>
+              <a:gd name="connsiteX4" fmla="*/ 2543761 w 4965113"/>
+              <a:gd name="connsiteY4" fmla="*/ 4800599 h 4800599"/>
+              <a:gd name="connsiteX5" fmla="*/ 0 w 4965113"/>
+              <a:gd name="connsiteY5" fmla="*/ 2479677 h 4800599"/>
+              <a:gd name="connsiteX6" fmla="*/ 2392885 w 4965113"/>
+              <a:gd name="connsiteY6" fmla="*/ 2479677 h 4800599"/>
+              <a:gd name="connsiteX7" fmla="*/ 2392885 w 4965113"/>
+              <a:gd name="connsiteY7" fmla="*/ 4800599 h 4800599"/>
+              <a:gd name="connsiteX8" fmla="*/ 255344 w 4965113"/>
+              <a:gd name="connsiteY8" fmla="*/ 4800599 h 4800599"/>
+              <a:gd name="connsiteX9" fmla="*/ 0 w 4965113"/>
+              <a:gd name="connsiteY9" fmla="*/ 4545255 h 4800599"/>
+              <a:gd name="connsiteX10" fmla="*/ 255344 w 4965113"/>
+              <a:gd name="connsiteY10" fmla="*/ 0 h 4800599"/>
+              <a:gd name="connsiteX11" fmla="*/ 4709769 w 4965113"/>
+              <a:gd name="connsiteY11" fmla="*/ 0 h 4800599"/>
+              <a:gd name="connsiteX12" fmla="*/ 4965113 w 4965113"/>
+              <a:gd name="connsiteY12" fmla="*/ 255344 h 4800599"/>
+              <a:gd name="connsiteX13" fmla="*/ 4965113 w 4965113"/>
+              <a:gd name="connsiteY13" fmla="*/ 2328801 h 4800599"/>
+              <a:gd name="connsiteX14" fmla="*/ 0 w 4965113"/>
+              <a:gd name="connsiteY14" fmla="*/ 2328801 h 4800599"/>
+              <a:gd name="connsiteX15" fmla="*/ 0 w 4965113"/>
+              <a:gd name="connsiteY15" fmla="*/ 255344 h 4800599"/>
+              <a:gd name="connsiteX16" fmla="*/ 255344 w 4965113"/>
+              <a:gd name="connsiteY16" fmla="*/ 0 h 4800599"/>
+            </a:gdLst>
+            <a:ahLst/>
+            <a:cxnLst>
+              <a:cxn ang="0">
+                <a:pos x="connsiteX0" y="connsiteY0"/>
+              </a:cxn>
+              <a:cxn ang="0">
+                <a:pos x="connsiteX1" y="connsiteY1"/>
+              </a:cxn>
+              <a:cxn ang="0">
+                <a:pos x="connsiteX2" y="connsiteY2"/>
+              </a:cxn>
+              <a:cxn ang="0">
+                <a:pos x="connsiteX3" y="connsiteY3"/>
+              </a:cxn>
+              <a:cxn ang="0">
+                <a:pos x="connsiteX4" y="connsiteY4"/>
+              </a:cxn>
+              <a:cxn ang="0">
+                <a:pos x="connsiteX5" y="connsiteY5"/>
+              </a:cxn>
+              <a:cxn ang="0">
+                <a:pos x="connsiteX6" y="connsiteY6"/>
+              </a:cxn>
+              <a:cxn ang="0">
+                <a:pos x="connsiteX7" y="connsiteY7"/>
+              </a:cxn>
+              <a:cxn ang="0">
+                <a:pos x="connsiteX8" y="connsiteY8"/>
+              </a:cxn>
+              <a:cxn ang="0">
+                <a:pos x="connsiteX9" y="connsiteY9"/>
+              </a:cxn>
+              <a:cxn ang="0">
+                <a:pos x="connsiteX10" y="connsiteY10"/>
+              </a:cxn>
+              <a:cxn ang="0">
+                <a:pos x="connsiteX11" y="connsiteY11"/>
+              </a:cxn>
+              <a:cxn ang="0">
+                <a:pos x="connsiteX12" y="connsiteY12"/>
+              </a:cxn>
+              <a:cxn ang="0">
+                <a:pos x="connsiteX13" y="connsiteY13"/>
+              </a:cxn>
+              <a:cxn ang="0">
+                <a:pos x="connsiteX14" y="connsiteY14"/>
+              </a:cxn>
+              <a:cxn ang="0">
+                <a:pos x="connsiteX15" y="connsiteY15"/>
+              </a:cxn>
+              <a:cxn ang="0">
+                <a:pos x="connsiteX16" y="connsiteY16"/>
+              </a:cxn>
+            </a:cxnLst>
+            <a:rect l="l" t="t" r="r" b="b"/>
+            <a:pathLst>
+              <a:path w="4965113" h="4800599">
+                <a:moveTo>
+                  <a:pt x="2543761" y="2479677"/>
+                </a:moveTo>
+                <a:lnTo>
+                  <a:pt x="4965113" y="2479677"/>
+                </a:lnTo>
+                <a:lnTo>
+                  <a:pt x="4965113" y="4545255"/>
+                </a:lnTo>
+                <a:cubicBezTo>
+                  <a:pt x="4965113" y="4686278"/>
+                  <a:pt x="4850792" y="4800599"/>
+                  <a:pt x="4709769" y="4800599"/>
+                </a:cubicBezTo>
+                <a:lnTo>
+                  <a:pt x="2543761" y="4800599"/>
+                </a:lnTo>
+                <a:close/>
+                <a:moveTo>
+                  <a:pt x="0" y="2479677"/>
+                </a:moveTo>
+                <a:lnTo>
+                  <a:pt x="2392885" y="2479677"/>
+                </a:lnTo>
+                <a:lnTo>
+                  <a:pt x="2392885" y="4800599"/>
+                </a:lnTo>
+                <a:lnTo>
+                  <a:pt x="255344" y="4800599"/>
+                </a:lnTo>
+                <a:cubicBezTo>
+                  <a:pt x="114321" y="4800599"/>
+                  <a:pt x="0" y="4686278"/>
+                  <a:pt x="0" y="4545255"/>
+                </a:cubicBezTo>
+                <a:close/>
+                <a:moveTo>
+                  <a:pt x="255344" y="0"/>
+                </a:moveTo>
+                <a:lnTo>
+                  <a:pt x="4709769" y="0"/>
+                </a:lnTo>
+                <a:cubicBezTo>
+                  <a:pt x="4850792" y="0"/>
+                  <a:pt x="4965113" y="114321"/>
+                  <a:pt x="4965113" y="255344"/>
+                </a:cubicBezTo>
+                <a:lnTo>
+                  <a:pt x="4965113" y="2328801"/>
+                </a:lnTo>
+                <a:lnTo>
+                  <a:pt x="0" y="2328801"/>
+                </a:lnTo>
+                <a:lnTo>
+                  <a:pt x="0" y="255344"/>
+                </a:lnTo>
+                <a:cubicBezTo>
+                  <a:pt x="0" y="114321"/>
+                  <a:pt x="114321" y="0"/>
+                  <a:pt x="255344" y="0"/>
+                </a:cubicBezTo>
+                <a:close/>
+              </a:path>
+            </a:pathLst>
+          </a:custGeom>
           <a:noFill/>
           <a:ln w="50800" cap="sq" cmpd="dbl">
             <a:gradFill flip="none" rotWithShape="1">
@@ -11854,6 +12007,183 @@
               </a:srgbClr>
             </a:outerShdw>
           </a:effectLst>
+        </p:spPr>
+        <p:style>
+          <a:lnRef idx="2">
+            <a:schemeClr val="accent1">
+              <a:shade val="50000"/>
+            </a:schemeClr>
+          </a:lnRef>
+          <a:fillRef idx="1">
+            <a:schemeClr val="accent1"/>
+          </a:fillRef>
+          <a:effectRef idx="0">
+            <a:schemeClr val="accent1"/>
+          </a:effectRef>
+          <a:fontRef idx="minor">
+            <a:schemeClr val="lt1"/>
+          </a:fontRef>
+        </p:style>
+        <p:txBody>
+          <a:bodyPr wrap="square" rtlCol="0" anchor="ctr">
+            <a:noAutofit/>
+          </a:bodyPr>
+          <a:lstStyle/>
+          <a:p>
+            <a:pPr algn="ctr"/>
+            <a:endParaRPr lang="en-US"/>
+          </a:p>
+        </p:txBody>
+      </p:sp>
+      <p:pic>
+        <p:nvPicPr>
+          <p:cNvPr id="1026" name="Picture 2" descr="Pieter Meyns 2 08">
+            <a:extLst>
+              <a:ext uri="{FF2B5EF4-FFF2-40B4-BE49-F238E27FC236}">
+                <a16:creationId xmlns:a16="http://schemas.microsoft.com/office/drawing/2014/main" id="{74225092-4DF1-3445-4445-87A94DB03624}"/>
+              </a:ext>
+            </a:extLst>
+          </p:cNvPr>
+          <p:cNvPicPr>
+            <a:picLocks noChangeAspect="1" noChangeArrowheads="1"/>
+          </p:cNvPicPr>
+          <p:nvPr/>
+        </p:nvPicPr>
+        <p:blipFill>
+          <a:blip r:embed="rId4">
+            <a:extLst>
+              <a:ext uri="{28A0092B-C50C-407E-A947-70E740481C1C}">
+                <a14:useLocalDpi xmlns:a14="http://schemas.microsoft.com/office/drawing/2010/main" val="0"/>
+              </a:ext>
+            </a:extLst>
+          </a:blip>
+          <a:srcRect r="3" b="16138"/>
+          <a:stretch/>
+        </p:blipFill>
+        <p:spPr bwMode="auto">
+          <a:xfrm>
+            <a:off x="6100005" y="990600"/>
+            <a:ext cx="4936645" cy="2328800"/>
+          </a:xfrm>
+          <a:custGeom>
+            <a:avLst/>
+            <a:gdLst/>
+            <a:ahLst/>
+            <a:cxnLst/>
+            <a:rect l="l" t="t" r="r" b="b"/>
+            <a:pathLst>
+              <a:path w="4936645" h="2328800">
+                <a:moveTo>
+                  <a:pt x="210266" y="0"/>
+                </a:moveTo>
+                <a:lnTo>
+                  <a:pt x="4726379" y="0"/>
+                </a:lnTo>
+                <a:cubicBezTo>
+                  <a:pt x="4842506" y="0"/>
+                  <a:pt x="4936645" y="94139"/>
+                  <a:pt x="4936645" y="210266"/>
+                </a:cubicBezTo>
+                <a:lnTo>
+                  <a:pt x="4936645" y="2328800"/>
+                </a:lnTo>
+                <a:lnTo>
+                  <a:pt x="0" y="2328800"/>
+                </a:lnTo>
+                <a:lnTo>
+                  <a:pt x="0" y="210266"/>
+                </a:lnTo>
+                <a:cubicBezTo>
+                  <a:pt x="0" y="94139"/>
+                  <a:pt x="94139" y="0"/>
+                  <a:pt x="210266" y="0"/>
+                </a:cubicBezTo>
+                <a:close/>
+              </a:path>
+            </a:pathLst>
+          </a:custGeom>
+          <a:noFill/>
+          <a:ln w="50800" cap="sq" cmpd="dbl">
+            <a:noFill/>
+            <a:miter lim="800000"/>
+          </a:ln>
+          <a:effectLst/>
+          <a:extLst>
+            <a:ext uri="{909E8E84-426E-40DD-AFC4-6F175D3DCCD1}">
+              <a14:hiddenFill xmlns:a14="http://schemas.microsoft.com/office/drawing/2010/main">
+                <a:solidFill>
+                  <a:srgbClr val="FFFFFF"/>
+                </a:solidFill>
+              </a14:hiddenFill>
+            </a:ext>
+          </a:extLst>
+        </p:spPr>
+      </p:pic>
+      <p:pic>
+        <p:nvPicPr>
+          <p:cNvPr id="5122" name="Picture 2">
+            <a:extLst>
+              <a:ext uri="{FF2B5EF4-FFF2-40B4-BE49-F238E27FC236}">
+                <a16:creationId xmlns:a16="http://schemas.microsoft.com/office/drawing/2014/main" id="{B76B7EA7-30D8-45FC-85EC-8656F6A3A8A2}"/>
+              </a:ext>
+            </a:extLst>
+          </p:cNvPr>
+          <p:cNvPicPr>
+            <a:picLocks noChangeAspect="1" noChangeArrowheads="1"/>
+          </p:cNvPicPr>
+          <p:nvPr/>
+        </p:nvPicPr>
+        <p:blipFill>
+          <a:blip r:embed="rId5">
+            <a:extLst>
+              <a:ext uri="{28A0092B-C50C-407E-A947-70E740481C1C}">
+                <a14:useLocalDpi xmlns:a14="http://schemas.microsoft.com/office/drawing/2010/main" val="0"/>
+              </a:ext>
+            </a:extLst>
+          </a:blip>
+          <a:srcRect t="26436" r="2" b="9066"/>
+          <a:stretch/>
+        </p:blipFill>
+        <p:spPr bwMode="auto">
+          <a:xfrm>
+            <a:off x="6100006" y="3470276"/>
+            <a:ext cx="2392885" cy="2320923"/>
+          </a:xfrm>
+          <a:custGeom>
+            <a:avLst/>
+            <a:gdLst/>
+            <a:ahLst/>
+            <a:cxnLst/>
+            <a:rect l="l" t="t" r="r" b="b"/>
+            <a:pathLst>
+              <a:path w="2392885" h="2320923">
+                <a:moveTo>
+                  <a:pt x="0" y="0"/>
+                </a:moveTo>
+                <a:lnTo>
+                  <a:pt x="2392885" y="0"/>
+                </a:lnTo>
+                <a:lnTo>
+                  <a:pt x="2392885" y="2320923"/>
+                </a:lnTo>
+                <a:lnTo>
+                  <a:pt x="210266" y="2320923"/>
+                </a:lnTo>
+                <a:cubicBezTo>
+                  <a:pt x="94139" y="2320923"/>
+                  <a:pt x="0" y="2226784"/>
+                  <a:pt x="0" y="2110657"/>
+                </a:cubicBezTo>
+                <a:close/>
+              </a:path>
+            </a:pathLst>
+          </a:custGeom>
+          <a:noFill/>
+          <a:ln w="50800" cap="sq" cmpd="dbl">
+            <a:noFill/>
+            <a:miter lim="800000"/>
+          </a:ln>
+          <a:effectLst/>
           <a:extLst>
             <a:ext uri="{909E8E84-426E-40DD-AFC4-6F175D3DCCD1}">
               <a14:hiddenFill xmlns:a14="http://schemas.microsoft.com/office/drawing/2010/main">
@@ -11880,54 +12210,56 @@
           <p:nvPr/>
         </p:nvPicPr>
         <p:blipFill>
-          <a:blip r:embed="rId5">
+          <a:blip r:embed="rId6">
             <a:extLst>
               <a:ext uri="{28A0092B-C50C-407E-A947-70E740481C1C}">
                 <a14:useLocalDpi xmlns:a14="http://schemas.microsoft.com/office/drawing/2010/main" val="0"/>
               </a:ext>
             </a:extLst>
           </a:blip>
-          <a:stretch>
-            <a:fillRect/>
-          </a:stretch>
+          <a:srcRect t="4424" r="3" b="5618"/>
+          <a:stretch/>
         </p:blipFill>
         <p:spPr bwMode="auto">
           <a:xfrm>
-            <a:off x="7152556" y="3966633"/>
-            <a:ext cx="3065000" cy="3304584"/>
+            <a:off x="8643766" y="3470276"/>
+            <a:ext cx="2392884" cy="2320923"/>
           </a:xfrm>
-          <a:prstGeom prst="roundRect">
-            <a:avLst>
-              <a:gd name="adj" fmla="val 6267"/>
-            </a:avLst>
-          </a:prstGeom>
+          <a:custGeom>
+            <a:avLst/>
+            <a:gdLst/>
+            <a:ahLst/>
+            <a:cxnLst/>
+            <a:rect l="l" t="t" r="r" b="b"/>
+            <a:pathLst>
+              <a:path w="2392884" h="2320923">
+                <a:moveTo>
+                  <a:pt x="0" y="0"/>
+                </a:moveTo>
+                <a:lnTo>
+                  <a:pt x="2392884" y="0"/>
+                </a:lnTo>
+                <a:lnTo>
+                  <a:pt x="2392884" y="2110657"/>
+                </a:lnTo>
+                <a:cubicBezTo>
+                  <a:pt x="2392884" y="2226784"/>
+                  <a:pt x="2298745" y="2320923"/>
+                  <a:pt x="2182618" y="2320923"/>
+                </a:cubicBezTo>
+                <a:lnTo>
+                  <a:pt x="0" y="2320923"/>
+                </a:lnTo>
+                <a:close/>
+              </a:path>
+            </a:pathLst>
+          </a:custGeom>
           <a:noFill/>
           <a:ln w="50800" cap="sq" cmpd="dbl">
-            <a:gradFill flip="none" rotWithShape="1">
-              <a:gsLst>
-                <a:gs pos="0">
-                  <a:srgbClr val="FFFFFF"/>
-                </a:gs>
-                <a:gs pos="100000">
-                  <a:schemeClr val="tx1">
-                    <a:alpha val="0"/>
-                  </a:schemeClr>
-                </a:gs>
-              </a:gsLst>
-              <a:path path="circle">
-                <a:fillToRect l="50000" t="50000" r="50000" b="50000"/>
-              </a:path>
-              <a:tileRect/>
-            </a:gradFill>
+            <a:noFill/>
             <a:miter lim="800000"/>
           </a:ln>
-          <a:effectLst>
-            <a:outerShdw blurRad="254000" algn="tl" rotWithShape="0">
-              <a:srgbClr val="000000">
-                <a:alpha val="43000"/>
-              </a:srgbClr>
-            </a:outerShdw>
-          </a:effectLst>
+          <a:effectLst/>
           <a:extLst>
             <a:ext uri="{909E8E84-426E-40DD-AFC4-6F175D3DCCD1}">
               <a14:hiddenFill xmlns:a14="http://schemas.microsoft.com/office/drawing/2010/main">
@@ -12465,10 +12797,10 @@
       </p:sp>
       <p:sp>
         <p:nvSpPr>
-          <p:cNvPr id="8" name="Rectangle 4">
+          <p:cNvPr id="3" name="Rectangle 1">
             <a:extLst>
               <a:ext uri="{FF2B5EF4-FFF2-40B4-BE49-F238E27FC236}">
-                <a16:creationId xmlns:a16="http://schemas.microsoft.com/office/drawing/2014/main" id="{B34937EF-E902-F998-5B14-8C8A855A665F}"/>
+                <a16:creationId xmlns:a16="http://schemas.microsoft.com/office/drawing/2014/main" id="{7C25F310-76B6-4506-9528-489F13EC7D1E}"/>
               </a:ext>
             </a:extLst>
           </p:cNvPr>
@@ -12481,8 +12813,8 @@
         </p:nvSpPr>
         <p:spPr bwMode="auto">
           <a:xfrm>
-            <a:off x="685801" y="2945475"/>
-            <a:ext cx="35514996" cy="1846659"/>
+            <a:off x="685800" y="2760742"/>
+            <a:ext cx="21491221" cy="2215991"/>
           </a:xfrm>
           <a:prstGeom prst="rect">
             <a:avLst/>
@@ -12662,7 +12994,7 @@
               <a:buSzTx/>
             </a:pPr>
             <a:r>
-              <a:rPr kumimoji="0" lang="nl-BE" altLang="nl-BE" sz="2000" b="0" i="1" u="none" strike="noStrike" cap="none" normalizeH="0" baseline="0" dirty="0">
+              <a:rPr kumimoji="0" lang="nl-BE" altLang="nl-BE" sz="1200" b="0" i="1" u="none" strike="noStrike" cap="none" normalizeH="0" baseline="0" dirty="0">
                 <a:ln>
                   <a:noFill/>
                 </a:ln>
@@ -12676,7 +13008,7 @@
               <a:t>(5) Beats of Golf: overzicht | LinkedIn</a:t>
             </a:r>
             <a:r>
-              <a:rPr kumimoji="0" lang="nl-BE" altLang="nl-BE" sz="2000" b="0" i="0" u="none" strike="noStrike" cap="none" normalizeH="0" baseline="0" dirty="0">
+              <a:rPr kumimoji="0" lang="nl-BE" altLang="nl-BE" sz="1200" b="0" i="0" u="none" strike="noStrike" cap="none" normalizeH="0" baseline="0" dirty="0">
                 <a:ln>
                   <a:noFill/>
                 </a:ln>
@@ -12690,7 +13022,7 @@
               <a:t>. (</a:t>
             </a:r>
             <a:r>
-              <a:rPr kumimoji="0" lang="nl-BE" altLang="nl-BE" sz="2000" b="0" i="0" u="none" strike="noStrike" cap="none" normalizeH="0" baseline="0" dirty="0" err="1">
+              <a:rPr kumimoji="0" lang="nl-BE" altLang="nl-BE" sz="1200" b="0" i="0" u="none" strike="noStrike" cap="none" normalizeH="0" baseline="0" dirty="0" err="1">
                 <a:ln>
                   <a:noFill/>
                 </a:ln>
@@ -12704,7 +13036,7 @@
               <a:t>n.d</a:t>
             </a:r>
             <a:r>
-              <a:rPr kumimoji="0" lang="nl-BE" altLang="nl-BE" sz="2000" b="0" i="0" u="none" strike="noStrike" cap="none" normalizeH="0" baseline="0" dirty="0">
+              <a:rPr kumimoji="0" lang="nl-BE" altLang="nl-BE" sz="1200" b="0" i="0" u="none" strike="noStrike" cap="none" normalizeH="0" baseline="0" dirty="0">
                 <a:ln>
                   <a:noFill/>
                 </a:ln>
@@ -12715,9 +13047,38 @@
                 <a:latin typeface="Times New Roman" panose="02020603050405020304" pitchFamily="18" charset="0"/>
                 <a:cs typeface="Times New Roman" panose="02020603050405020304" pitchFamily="18" charset="0"/>
               </a:rPr>
-              <a:t>.). https://www.linkedin.com/company/beats-of-golf/?originalSubdomain=at</a:t>
-            </a:r>
-            <a:endParaRPr kumimoji="0" lang="nl-BE" altLang="nl-BE" sz="2000" b="0" i="0" u="none" strike="noStrike" cap="none" normalizeH="0" baseline="0" dirty="0">
+              <a:t>.). </a:t>
+            </a:r>
+            <a:r>
+              <a:rPr kumimoji="0" lang="nl-BE" altLang="nl-BE" sz="1200" b="0" i="0" u="none" strike="noStrike" cap="none" normalizeH="0" baseline="0" dirty="0">
+                <a:ln>
+                  <a:noFill/>
+                </a:ln>
+                <a:solidFill>
+                  <a:schemeClr val="tx1"/>
+                </a:solidFill>
+                <a:effectLst/>
+                <a:latin typeface="Times New Roman" panose="02020603050405020304" pitchFamily="18" charset="0"/>
+                <a:cs typeface="Times New Roman" panose="02020603050405020304" pitchFamily="18" charset="0"/>
+                <a:hlinkClick r:id="rId2"/>
+              </a:rPr>
+              <a:t>https://www.linkedin.com/company/beats-of-golf/?originalSubdomain=at</a:t>
+            </a:r>
+            <a:r>
+              <a:rPr kumimoji="0" lang="nl-BE" altLang="nl-BE" sz="1200" b="0" i="0" u="none" strike="noStrike" cap="none" normalizeH="0" baseline="0" dirty="0">
+                <a:ln>
+                  <a:noFill/>
+                </a:ln>
+                <a:solidFill>
+                  <a:schemeClr val="tx1"/>
+                </a:solidFill>
+                <a:effectLst/>
+                <a:latin typeface="Times New Roman" panose="02020603050405020304" pitchFamily="18" charset="0"/>
+                <a:cs typeface="Times New Roman" panose="02020603050405020304" pitchFamily="18" charset="0"/>
+              </a:rPr>
+              <a:t> </a:t>
+            </a:r>
+            <a:endParaRPr kumimoji="0" lang="nl-BE" altLang="nl-BE" sz="600" b="0" i="0" u="none" strike="noStrike" cap="none" normalizeH="0" baseline="0" dirty="0">
               <a:ln>
                 <a:noFill/>
               </a:ln>
@@ -12733,7 +13094,7 @@
               <a:buSzTx/>
             </a:pPr>
             <a:r>
-              <a:rPr kumimoji="0" lang="nl-BE" altLang="nl-BE" sz="2000" b="0" i="0" u="none" strike="noStrike" cap="none" normalizeH="0" baseline="0" dirty="0" err="1">
+              <a:rPr kumimoji="0" lang="nl-BE" altLang="nl-BE" sz="1200" b="0" i="0" u="none" strike="noStrike" cap="none" normalizeH="0" baseline="0" dirty="0" err="1">
                 <a:ln>
                   <a:noFill/>
                 </a:ln>
@@ -12747,7 +13108,7 @@
               <a:t>Bădescu</a:t>
             </a:r>
             <a:r>
-              <a:rPr kumimoji="0" lang="nl-BE" altLang="nl-BE" sz="2000" b="0" i="0" u="none" strike="noStrike" cap="none" normalizeH="0" baseline="0" dirty="0">
+              <a:rPr kumimoji="0" lang="nl-BE" altLang="nl-BE" sz="1200" b="0" i="0" u="none" strike="noStrike" cap="none" normalizeH="0" baseline="0" dirty="0">
                 <a:ln>
                   <a:noFill/>
                 </a:ln>
@@ -12761,7 +13122,7 @@
               <a:t>, D., </a:t>
             </a:r>
             <a:r>
-              <a:rPr kumimoji="0" lang="nl-BE" altLang="nl-BE" sz="2000" b="0" i="0" u="none" strike="noStrike" cap="none" normalizeH="0" baseline="0" dirty="0" err="1">
+              <a:rPr kumimoji="0" lang="nl-BE" altLang="nl-BE" sz="1200" b="0" i="0" u="none" strike="noStrike" cap="none" normalizeH="0" baseline="0" dirty="0" err="1">
                 <a:ln>
                   <a:noFill/>
                 </a:ln>
@@ -12775,7 +13136,7 @@
               <a:t>Zaharie</a:t>
             </a:r>
             <a:r>
-              <a:rPr kumimoji="0" lang="nl-BE" altLang="nl-BE" sz="2000" b="0" i="0" u="none" strike="noStrike" cap="none" normalizeH="0" baseline="0" dirty="0">
+              <a:rPr kumimoji="0" lang="nl-BE" altLang="nl-BE" sz="1200" b="0" i="0" u="none" strike="noStrike" cap="none" normalizeH="0" baseline="0" dirty="0">
                 <a:ln>
                   <a:noFill/>
                 </a:ln>
@@ -12789,7 +13150,7 @@
               <a:t>, N., </a:t>
             </a:r>
             <a:r>
-              <a:rPr kumimoji="0" lang="nl-BE" altLang="nl-BE" sz="2000" b="0" i="0" u="none" strike="noStrike" cap="none" normalizeH="0" baseline="0" dirty="0" err="1">
+              <a:rPr kumimoji="0" lang="nl-BE" altLang="nl-BE" sz="1200" b="0" i="0" u="none" strike="noStrike" cap="none" normalizeH="0" baseline="0" dirty="0" err="1">
                 <a:ln>
                   <a:noFill/>
                 </a:ln>
@@ -12803,7 +13164,7 @@
               <a:t>Stoian</a:t>
             </a:r>
             <a:r>
-              <a:rPr kumimoji="0" lang="nl-BE" altLang="nl-BE" sz="2000" b="0" i="0" u="none" strike="noStrike" cap="none" normalizeH="0" baseline="0" dirty="0">
+              <a:rPr kumimoji="0" lang="nl-BE" altLang="nl-BE" sz="1200" b="0" i="0" u="none" strike="noStrike" cap="none" normalizeH="0" baseline="0" dirty="0">
                 <a:ln>
                   <a:noFill/>
                 </a:ln>
@@ -12817,7 +13178,7 @@
               <a:t>, I., </a:t>
             </a:r>
             <a:r>
-              <a:rPr kumimoji="0" lang="nl-BE" altLang="nl-BE" sz="2000" b="0" i="0" u="none" strike="noStrike" cap="none" normalizeH="0" baseline="0" dirty="0" err="1">
+              <a:rPr kumimoji="0" lang="nl-BE" altLang="nl-BE" sz="1200" b="0" i="0" u="none" strike="noStrike" cap="none" normalizeH="0" baseline="0" dirty="0" err="1">
                 <a:ln>
                   <a:noFill/>
                 </a:ln>
@@ -12831,7 +13192,7 @@
               <a:t>Bădescu</a:t>
             </a:r>
             <a:r>
-              <a:rPr kumimoji="0" lang="nl-BE" altLang="nl-BE" sz="2000" b="0" i="0" u="none" strike="noStrike" cap="none" normalizeH="0" baseline="0" dirty="0">
+              <a:rPr kumimoji="0" lang="nl-BE" altLang="nl-BE" sz="1200" b="0" i="0" u="none" strike="noStrike" cap="none" normalizeH="0" baseline="0" dirty="0">
                 <a:ln>
                   <a:noFill/>
                 </a:ln>
@@ -12845,7 +13206,7 @@
               <a:t>, M., &amp; </a:t>
             </a:r>
             <a:r>
-              <a:rPr kumimoji="0" lang="nl-BE" altLang="nl-BE" sz="2000" b="0" i="0" u="none" strike="noStrike" cap="none" normalizeH="0" baseline="0" dirty="0" err="1">
+              <a:rPr kumimoji="0" lang="nl-BE" altLang="nl-BE" sz="1200" b="0" i="0" u="none" strike="noStrike" cap="none" normalizeH="0" baseline="0" dirty="0" err="1">
                 <a:ln>
                   <a:noFill/>
                 </a:ln>
@@ -12859,7 +13220,7 @@
               <a:t>Stanciu</a:t>
             </a:r>
             <a:r>
-              <a:rPr kumimoji="0" lang="nl-BE" altLang="nl-BE" sz="2000" b="0" i="0" u="none" strike="noStrike" cap="none" normalizeH="0" baseline="0" dirty="0">
+              <a:rPr kumimoji="0" lang="nl-BE" altLang="nl-BE" sz="1200" b="0" i="0" u="none" strike="noStrike" cap="none" normalizeH="0" baseline="0" dirty="0">
                 <a:ln>
                   <a:noFill/>
                 </a:ln>
@@ -12873,7 +13234,7 @@
               <a:t>, C. (2022). A </a:t>
             </a:r>
             <a:r>
-              <a:rPr kumimoji="0" lang="nl-BE" altLang="nl-BE" sz="2000" b="0" i="0" u="none" strike="noStrike" cap="none" normalizeH="0" baseline="0" dirty="0" err="1">
+              <a:rPr kumimoji="0" lang="nl-BE" altLang="nl-BE" sz="1200" b="0" i="0" u="none" strike="noStrike" cap="none" normalizeH="0" baseline="0" dirty="0" err="1">
                 <a:ln>
                   <a:noFill/>
                 </a:ln>
@@ -12887,7 +13248,7 @@
               <a:t>Narrative</a:t>
             </a:r>
             <a:r>
-              <a:rPr kumimoji="0" lang="nl-BE" altLang="nl-BE" sz="2000" b="0" i="0" u="none" strike="noStrike" cap="none" normalizeH="0" baseline="0" dirty="0">
+              <a:rPr kumimoji="0" lang="nl-BE" altLang="nl-BE" sz="1200" b="0" i="0" u="none" strike="noStrike" cap="none" normalizeH="0" baseline="0" dirty="0">
                 <a:ln>
                   <a:noFill/>
                 </a:ln>
@@ -12901,7 +13262,7 @@
               <a:t> Review of </a:t>
             </a:r>
             <a:r>
-              <a:rPr kumimoji="0" lang="nl-BE" altLang="nl-BE" sz="2000" b="0" i="0" u="none" strike="noStrike" cap="none" normalizeH="0" baseline="0" dirty="0" err="1">
+              <a:rPr kumimoji="0" lang="nl-BE" altLang="nl-BE" sz="1200" b="0" i="0" u="none" strike="noStrike" cap="none" normalizeH="0" baseline="0" dirty="0" err="1">
                 <a:ln>
                   <a:noFill/>
                 </a:ln>
@@ -12915,7 +13276,7 @@
               <a:t>the</a:t>
             </a:r>
             <a:r>
-              <a:rPr kumimoji="0" lang="nl-BE" altLang="nl-BE" sz="2000" b="0" i="0" u="none" strike="noStrike" cap="none" normalizeH="0" baseline="0" dirty="0">
+              <a:rPr kumimoji="0" lang="nl-BE" altLang="nl-BE" sz="1200" b="0" i="0" u="none" strike="noStrike" cap="none" normalizeH="0" baseline="0" dirty="0">
                 <a:ln>
                   <a:noFill/>
                 </a:ln>
@@ -12929,7 +13290,7 @@
               <a:t> Link </a:t>
             </a:r>
             <a:r>
-              <a:rPr kumimoji="0" lang="nl-BE" altLang="nl-BE" sz="2000" b="0" i="0" u="none" strike="noStrike" cap="none" normalizeH="0" baseline="0" dirty="0" err="1">
+              <a:rPr kumimoji="0" lang="nl-BE" altLang="nl-BE" sz="1200" b="0" i="0" u="none" strike="noStrike" cap="none" normalizeH="0" baseline="0" dirty="0" err="1">
                 <a:ln>
                   <a:noFill/>
                 </a:ln>
@@ -12943,7 +13304,7 @@
               <a:t>between</a:t>
             </a:r>
             <a:r>
-              <a:rPr kumimoji="0" lang="nl-BE" altLang="nl-BE" sz="2000" b="0" i="0" u="none" strike="noStrike" cap="none" normalizeH="0" baseline="0" dirty="0">
+              <a:rPr kumimoji="0" lang="nl-BE" altLang="nl-BE" sz="1200" b="0" i="0" u="none" strike="noStrike" cap="none" normalizeH="0" baseline="0" dirty="0">
                 <a:ln>
                   <a:noFill/>
                 </a:ln>
@@ -12957,7 +13318,7 @@
               <a:t> Sport </a:t>
             </a:r>
             <a:r>
-              <a:rPr kumimoji="0" lang="nl-BE" altLang="nl-BE" sz="2000" b="0" i="0" u="none" strike="noStrike" cap="none" normalizeH="0" baseline="0" dirty="0" err="1">
+              <a:rPr kumimoji="0" lang="nl-BE" altLang="nl-BE" sz="1200" b="0" i="0" u="none" strike="noStrike" cap="none" normalizeH="0" baseline="0" dirty="0" err="1">
                 <a:ln>
                   <a:noFill/>
                 </a:ln>
@@ -12971,7 +13332,7 @@
               <a:t>and</a:t>
             </a:r>
             <a:r>
-              <a:rPr kumimoji="0" lang="nl-BE" altLang="nl-BE" sz="2000" b="0" i="0" u="none" strike="noStrike" cap="none" normalizeH="0" baseline="0" dirty="0">
+              <a:rPr kumimoji="0" lang="nl-BE" altLang="nl-BE" sz="1200" b="0" i="0" u="none" strike="noStrike" cap="none" normalizeH="0" baseline="0" dirty="0">
                 <a:ln>
                   <a:noFill/>
                 </a:ln>
@@ -12985,7 +13346,7 @@
               <a:t> Technology. </a:t>
             </a:r>
             <a:r>
-              <a:rPr kumimoji="0" lang="nl-BE" altLang="nl-BE" sz="2000" b="0" i="1" u="none" strike="noStrike" cap="none" normalizeH="0" baseline="0" dirty="0" err="1">
+              <a:rPr kumimoji="0" lang="nl-BE" altLang="nl-BE" sz="1200" b="0" i="1" u="none" strike="noStrike" cap="none" normalizeH="0" baseline="0" dirty="0" err="1">
                 <a:ln>
                   <a:noFill/>
                 </a:ln>
@@ -12999,7 +13360,7 @@
               <a:t>Sustainability</a:t>
             </a:r>
             <a:r>
-              <a:rPr kumimoji="0" lang="nl-BE" altLang="nl-BE" sz="2000" b="0" i="0" u="none" strike="noStrike" cap="none" normalizeH="0" baseline="0" dirty="0">
+              <a:rPr kumimoji="0" lang="nl-BE" altLang="nl-BE" sz="1200" b="0" i="0" u="none" strike="noStrike" cap="none" normalizeH="0" baseline="0" dirty="0">
                 <a:ln>
                   <a:noFill/>
                 </a:ln>
@@ -13013,7 +13374,7 @@
               <a:t>, </a:t>
             </a:r>
             <a:r>
-              <a:rPr kumimoji="0" lang="nl-BE" altLang="nl-BE" sz="2000" b="0" i="1" u="none" strike="noStrike" cap="none" normalizeH="0" baseline="0" dirty="0">
+              <a:rPr kumimoji="0" lang="nl-BE" altLang="nl-BE" sz="1200" b="0" i="1" u="none" strike="noStrike" cap="none" normalizeH="0" baseline="0" dirty="0">
                 <a:ln>
                   <a:noFill/>
                 </a:ln>
@@ -13027,7 +13388,7 @@
               <a:t>14</a:t>
             </a:r>
             <a:r>
-              <a:rPr kumimoji="0" lang="nl-BE" altLang="nl-BE" sz="2000" b="0" i="0" u="none" strike="noStrike" cap="none" normalizeH="0" baseline="0" dirty="0">
+              <a:rPr kumimoji="0" lang="nl-BE" altLang="nl-BE" sz="1200" b="0" i="0" u="none" strike="noStrike" cap="none" normalizeH="0" baseline="0" dirty="0">
                 <a:ln>
                   <a:noFill/>
                 </a:ln>
@@ -13038,9 +13399,38 @@
                 <a:latin typeface="Times New Roman" panose="02020603050405020304" pitchFamily="18" charset="0"/>
                 <a:cs typeface="Times New Roman" panose="02020603050405020304" pitchFamily="18" charset="0"/>
               </a:rPr>
-              <a:t>(23), 16265. https://doi.org/10.3390/su142316265</a:t>
-            </a:r>
-            <a:endParaRPr kumimoji="0" lang="nl-BE" altLang="nl-BE" sz="2000" b="0" i="0" u="none" strike="noStrike" cap="none" normalizeH="0" baseline="0" dirty="0">
+              <a:t>(23), 16265. </a:t>
+            </a:r>
+            <a:r>
+              <a:rPr kumimoji="0" lang="nl-BE" altLang="nl-BE" sz="1200" b="0" i="0" u="none" strike="noStrike" cap="none" normalizeH="0" baseline="0" dirty="0">
+                <a:ln>
+                  <a:noFill/>
+                </a:ln>
+                <a:solidFill>
+                  <a:schemeClr val="tx1"/>
+                </a:solidFill>
+                <a:effectLst/>
+                <a:latin typeface="Times New Roman" panose="02020603050405020304" pitchFamily="18" charset="0"/>
+                <a:cs typeface="Times New Roman" panose="02020603050405020304" pitchFamily="18" charset="0"/>
+                <a:hlinkClick r:id="rId3"/>
+              </a:rPr>
+              <a:t>https://doi.org/10.3390/su142316265</a:t>
+            </a:r>
+            <a:r>
+              <a:rPr kumimoji="0" lang="nl-BE" altLang="nl-BE" sz="1200" b="0" i="0" u="none" strike="noStrike" cap="none" normalizeH="0" baseline="0" dirty="0">
+                <a:ln>
+                  <a:noFill/>
+                </a:ln>
+                <a:solidFill>
+                  <a:schemeClr val="tx1"/>
+                </a:solidFill>
+                <a:effectLst/>
+                <a:latin typeface="Times New Roman" panose="02020603050405020304" pitchFamily="18" charset="0"/>
+                <a:cs typeface="Times New Roman" panose="02020603050405020304" pitchFamily="18" charset="0"/>
+              </a:rPr>
+              <a:t> </a:t>
+            </a:r>
+            <a:endParaRPr kumimoji="0" lang="nl-BE" altLang="nl-BE" sz="600" b="0" i="0" u="none" strike="noStrike" cap="none" normalizeH="0" baseline="0" dirty="0">
               <a:ln>
                 <a:noFill/>
               </a:ln>
@@ -13056,7 +13446,7 @@
               <a:buSzTx/>
             </a:pPr>
             <a:r>
-              <a:rPr kumimoji="0" lang="nl-BE" altLang="nl-BE" sz="2000" b="0" i="0" u="none" strike="noStrike" cap="none" normalizeH="0" baseline="0" dirty="0">
+              <a:rPr kumimoji="0" lang="nl-BE" altLang="nl-BE" sz="1200" b="0" i="0" u="none" strike="noStrike" cap="none" normalizeH="0" baseline="0" dirty="0">
                 <a:ln>
                   <a:noFill/>
                 </a:ln>
@@ -13067,10 +13457,10 @@
                 <a:latin typeface="Times New Roman" panose="02020603050405020304" pitchFamily="18" charset="0"/>
                 <a:cs typeface="Times New Roman" panose="02020603050405020304" pitchFamily="18" charset="0"/>
               </a:rPr>
-              <a:t>Correspondent, O. (2024, </a:t>
-            </a:r>
-            <a:r>
-              <a:rPr kumimoji="0" lang="nl-BE" altLang="nl-BE" sz="2000" b="0" i="0" u="none" strike="noStrike" cap="none" normalizeH="0" baseline="0" dirty="0" err="1">
+              <a:t>Balk, Y. (2023, September 13). </a:t>
+            </a:r>
+            <a:r>
+              <a:rPr kumimoji="0" lang="nl-BE" altLang="nl-BE" sz="1200" b="0" i="1" u="none" strike="noStrike" cap="none" normalizeH="0" baseline="0" dirty="0">
                 <a:ln>
                   <a:noFill/>
                 </a:ln>
@@ -13081,10 +13471,10 @@
                 <a:latin typeface="Times New Roman" panose="02020603050405020304" pitchFamily="18" charset="0"/>
                 <a:cs typeface="Times New Roman" panose="02020603050405020304" pitchFamily="18" charset="0"/>
               </a:rPr>
-              <a:t>October</a:t>
-            </a:r>
-            <a:r>
-              <a:rPr kumimoji="0" lang="nl-BE" altLang="nl-BE" sz="2000" b="0" i="0" u="none" strike="noStrike" cap="none" normalizeH="0" baseline="0" dirty="0">
+              <a:t>Hoe smart is een smartwatch? #111</a:t>
+            </a:r>
+            <a:r>
+              <a:rPr kumimoji="0" lang="nl-BE" altLang="nl-BE" sz="1200" b="0" i="0" u="none" strike="noStrike" cap="none" normalizeH="0" baseline="0" dirty="0">
                 <a:ln>
                   <a:noFill/>
                 </a:ln>
@@ -13095,10 +13485,10 @@
                 <a:latin typeface="Times New Roman" panose="02020603050405020304" pitchFamily="18" charset="0"/>
                 <a:cs typeface="Times New Roman" panose="02020603050405020304" pitchFamily="18" charset="0"/>
               </a:rPr>
-              <a:t> 6). Nieuwe tegenvaller voor Duitsland: ook Kai </a:t>
-            </a:r>
-            <a:r>
-              <a:rPr kumimoji="0" lang="nl-BE" altLang="nl-BE" sz="2000" b="0" i="0" u="none" strike="noStrike" cap="none" normalizeH="0" baseline="0" dirty="0" err="1">
+              <a:t>. </a:t>
+            </a:r>
+            <a:r>
+              <a:rPr kumimoji="0" lang="nl-BE" altLang="nl-BE" sz="1200" b="0" i="0" u="none" strike="noStrike" cap="none" normalizeH="0" baseline="0" dirty="0" err="1">
                 <a:ln>
                   <a:noFill/>
                 </a:ln>
@@ -13109,10 +13499,10 @@
                 <a:latin typeface="Times New Roman" panose="02020603050405020304" pitchFamily="18" charset="0"/>
                 <a:cs typeface="Times New Roman" panose="02020603050405020304" pitchFamily="18" charset="0"/>
               </a:rPr>
-              <a:t>Havertz</a:t>
-            </a:r>
-            <a:r>
-              <a:rPr kumimoji="0" lang="nl-BE" altLang="nl-BE" sz="2000" b="0" i="0" u="none" strike="noStrike" cap="none" normalizeH="0" baseline="0" dirty="0">
+              <a:t>NLSportpsycholoog</a:t>
+            </a:r>
+            <a:r>
+              <a:rPr kumimoji="0" lang="nl-BE" altLang="nl-BE" sz="1200" b="0" i="0" u="none" strike="noStrike" cap="none" normalizeH="0" baseline="0" dirty="0">
                 <a:ln>
                   <a:noFill/>
                 </a:ln>
@@ -13123,10 +13513,25 @@
                 <a:latin typeface="Times New Roman" panose="02020603050405020304" pitchFamily="18" charset="0"/>
                 <a:cs typeface="Times New Roman" panose="02020603050405020304" pitchFamily="18" charset="0"/>
               </a:rPr>
-              <a:t> ontbreekt tegen Nederlands elftal. </a:t>
-            </a:r>
-            <a:r>
-              <a:rPr kumimoji="0" lang="nl-BE" altLang="nl-BE" sz="2000" b="0" i="1" u="none" strike="noStrike" cap="none" normalizeH="0" baseline="0" dirty="0">
+              <a:t>. </a:t>
+            </a:r>
+            <a:r>
+              <a:rPr kumimoji="0" lang="nl-BE" altLang="nl-BE" sz="1200" b="0" i="0" u="none" strike="noStrike" cap="none" normalizeH="0" baseline="0" dirty="0">
+                <a:ln>
+                  <a:noFill/>
+                </a:ln>
+                <a:solidFill>
+                  <a:schemeClr val="tx1"/>
+                </a:solidFill>
+                <a:effectLst/>
+                <a:latin typeface="Times New Roman" panose="02020603050405020304" pitchFamily="18" charset="0"/>
+                <a:cs typeface="Times New Roman" panose="02020603050405020304" pitchFamily="18" charset="0"/>
+                <a:hlinkClick r:id="rId4"/>
+              </a:rPr>
+              <a:t>https://www.nlsportpsycholoog.nl/blog/hoe-smart-is-een-smartwatch-111/#:~:text=Deze%20apparaten%20zijn%20vrij%20goed,betrouwbaarheid%20naar%2060%2D65%25</a:t>
+            </a:r>
+            <a:r>
+              <a:rPr kumimoji="0" lang="nl-BE" altLang="nl-BE" sz="1200" b="0" i="0" u="none" strike="noStrike" cap="none" normalizeH="0" baseline="0" dirty="0">
                 <a:ln>
                   <a:noFill/>
                 </a:ln>
@@ -13137,23 +13542,9 @@
                 <a:latin typeface="Times New Roman" panose="02020603050405020304" pitchFamily="18" charset="0"/>
                 <a:cs typeface="Times New Roman" panose="02020603050405020304" pitchFamily="18" charset="0"/>
               </a:rPr>
-              <a:t>Telegraaf</a:t>
-            </a:r>
-            <a:r>
-              <a:rPr kumimoji="0" lang="nl-BE" altLang="nl-BE" sz="2000" b="0" i="0" u="none" strike="noStrike" cap="none" normalizeH="0" baseline="0" dirty="0">
-                <a:ln>
-                  <a:noFill/>
-                </a:ln>
-                <a:solidFill>
-                  <a:schemeClr val="tx1"/>
-                </a:solidFill>
-                <a:effectLst/>
-                <a:latin typeface="Times New Roman" panose="02020603050405020304" pitchFamily="18" charset="0"/>
-                <a:cs typeface="Times New Roman" panose="02020603050405020304" pitchFamily="18" charset="0"/>
-              </a:rPr>
-              <a:t>. https://www.telegraaf.nl/sport/166997363/nieuwe-tegenvaller-voor-duitsland-ook-kai-havertz-ontbreekt-tegen-nederlands-elftal</a:t>
-            </a:r>
-            <a:endParaRPr kumimoji="0" lang="nl-BE" altLang="nl-BE" sz="2000" b="0" i="0" u="none" strike="noStrike" cap="none" normalizeH="0" baseline="0" dirty="0">
+              <a:t>. </a:t>
+            </a:r>
+            <a:endParaRPr kumimoji="0" lang="nl-BE" altLang="nl-BE" sz="600" b="0" i="0" u="none" strike="noStrike" cap="none" normalizeH="0" baseline="0" dirty="0">
               <a:ln>
                 <a:noFill/>
               </a:ln>
@@ -13169,7 +13560,7 @@
               <a:buSzTx/>
             </a:pPr>
             <a:r>
-              <a:rPr kumimoji="0" lang="nl-BE" altLang="nl-BE" sz="2000" b="0" i="1" u="none" strike="noStrike" cap="none" normalizeH="0" baseline="0" dirty="0" err="1">
+              <a:rPr kumimoji="0" lang="nl-BE" altLang="nl-BE" sz="1200" b="0" i="0" u="none" strike="noStrike" cap="none" normalizeH="0" baseline="0" dirty="0">
                 <a:ln>
                   <a:noFill/>
                 </a:ln>
@@ -13180,10 +13571,10 @@
                 <a:latin typeface="Times New Roman" panose="02020603050405020304" pitchFamily="18" charset="0"/>
                 <a:cs typeface="Times New Roman" panose="02020603050405020304" pitchFamily="18" charset="0"/>
               </a:rPr>
-              <a:t>Golfpro</a:t>
-            </a:r>
-            <a:r>
-              <a:rPr kumimoji="0" lang="nl-BE" altLang="nl-BE" sz="2000" b="0" i="1" u="none" strike="noStrike" cap="none" normalizeH="0" baseline="0" dirty="0">
+              <a:t>Correspondent, O. (2024, </a:t>
+            </a:r>
+            <a:r>
+              <a:rPr kumimoji="0" lang="nl-BE" altLang="nl-BE" sz="1200" b="0" i="0" u="none" strike="noStrike" cap="none" normalizeH="0" baseline="0" dirty="0" err="1">
                 <a:ln>
                   <a:noFill/>
                 </a:ln>
@@ -13194,10 +13585,10 @@
                 <a:latin typeface="Times New Roman" panose="02020603050405020304" pitchFamily="18" charset="0"/>
                 <a:cs typeface="Times New Roman" panose="02020603050405020304" pitchFamily="18" charset="0"/>
               </a:rPr>
-              <a:t> - Foto van Beats of Golf, Antwerpen - </a:t>
-            </a:r>
-            <a:r>
-              <a:rPr kumimoji="0" lang="nl-BE" altLang="nl-BE" sz="2000" b="0" i="1" u="none" strike="noStrike" cap="none" normalizeH="0" baseline="0" dirty="0" err="1">
+              <a:t>October</a:t>
+            </a:r>
+            <a:r>
+              <a:rPr kumimoji="0" lang="nl-BE" altLang="nl-BE" sz="1200" b="0" i="0" u="none" strike="noStrike" cap="none" normalizeH="0" baseline="0" dirty="0">
                 <a:ln>
                   <a:noFill/>
                 </a:ln>
@@ -13208,10 +13599,10 @@
                 <a:latin typeface="Times New Roman" panose="02020603050405020304" pitchFamily="18" charset="0"/>
                 <a:cs typeface="Times New Roman" panose="02020603050405020304" pitchFamily="18" charset="0"/>
               </a:rPr>
-              <a:t>Tripadvisor</a:t>
-            </a:r>
-            <a:r>
-              <a:rPr kumimoji="0" lang="nl-BE" altLang="nl-BE" sz="2000" b="0" i="0" u="none" strike="noStrike" cap="none" normalizeH="0" baseline="0" dirty="0">
+              <a:t> 6). Nieuwe tegenvaller voor Duitsland: ook Kai </a:t>
+            </a:r>
+            <a:r>
+              <a:rPr kumimoji="0" lang="nl-BE" altLang="nl-BE" sz="1200" b="0" i="0" u="none" strike="noStrike" cap="none" normalizeH="0" baseline="0" dirty="0" err="1">
                 <a:ln>
                   <a:noFill/>
                 </a:ln>
@@ -13222,10 +13613,10 @@
                 <a:latin typeface="Times New Roman" panose="02020603050405020304" pitchFamily="18" charset="0"/>
                 <a:cs typeface="Times New Roman" panose="02020603050405020304" pitchFamily="18" charset="0"/>
               </a:rPr>
-              <a:t>. (</a:t>
-            </a:r>
-            <a:r>
-              <a:rPr kumimoji="0" lang="nl-BE" altLang="nl-BE" sz="2000" b="0" i="0" u="none" strike="noStrike" cap="none" normalizeH="0" baseline="0" dirty="0" err="1">
+              <a:t>Havertz</a:t>
+            </a:r>
+            <a:r>
+              <a:rPr kumimoji="0" lang="nl-BE" altLang="nl-BE" sz="1200" b="0" i="0" u="none" strike="noStrike" cap="none" normalizeH="0" baseline="0" dirty="0">
                 <a:ln>
                   <a:noFill/>
                 </a:ln>
@@ -13236,10 +13627,10 @@
                 <a:latin typeface="Times New Roman" panose="02020603050405020304" pitchFamily="18" charset="0"/>
                 <a:cs typeface="Times New Roman" panose="02020603050405020304" pitchFamily="18" charset="0"/>
               </a:rPr>
-              <a:t>n.d</a:t>
-            </a:r>
-            <a:r>
-              <a:rPr kumimoji="0" lang="nl-BE" altLang="nl-BE" sz="2000" b="0" i="0" u="none" strike="noStrike" cap="none" normalizeH="0" baseline="0" dirty="0">
+              <a:t> ontbreekt tegen Nederlands elftal. </a:t>
+            </a:r>
+            <a:r>
+              <a:rPr kumimoji="0" lang="nl-BE" altLang="nl-BE" sz="1200" b="0" i="1" u="none" strike="noStrike" cap="none" normalizeH="0" baseline="0" dirty="0">
                 <a:ln>
                   <a:noFill/>
                 </a:ln>
@@ -13250,9 +13641,52 @@
                 <a:latin typeface="Times New Roman" panose="02020603050405020304" pitchFamily="18" charset="0"/>
                 <a:cs typeface="Times New Roman" panose="02020603050405020304" pitchFamily="18" charset="0"/>
               </a:rPr>
-              <a:t>.). https://www.tripadvisor.be/LocationPhotoDirectLink-g188636-d23542732-i493436553-Beats_of_Golf-Antwerp_Antwerp_Province.html</a:t>
-            </a:r>
-            <a:endParaRPr kumimoji="0" lang="nl-BE" altLang="nl-BE" sz="2000" b="0" i="0" u="none" strike="noStrike" cap="none" normalizeH="0" baseline="0" dirty="0">
+              <a:t>Telegraaf</a:t>
+            </a:r>
+            <a:r>
+              <a:rPr kumimoji="0" lang="nl-BE" altLang="nl-BE" sz="1200" b="0" i="0" u="none" strike="noStrike" cap="none" normalizeH="0" baseline="0" dirty="0">
+                <a:ln>
+                  <a:noFill/>
+                </a:ln>
+                <a:solidFill>
+                  <a:schemeClr val="tx1"/>
+                </a:solidFill>
+                <a:effectLst/>
+                <a:latin typeface="Times New Roman" panose="02020603050405020304" pitchFamily="18" charset="0"/>
+                <a:cs typeface="Times New Roman" panose="02020603050405020304" pitchFamily="18" charset="0"/>
+              </a:rPr>
+              <a:t>. </a:t>
+            </a:r>
+            <a:r>
+              <a:rPr kumimoji="0" lang="nl-BE" altLang="nl-BE" sz="1200" b="0" i="0" u="none" strike="noStrike" cap="none" normalizeH="0" baseline="0" dirty="0">
+                <a:ln>
+                  <a:noFill/>
+                </a:ln>
+                <a:solidFill>
+                  <a:schemeClr val="tx1"/>
+                </a:solidFill>
+                <a:effectLst/>
+                <a:latin typeface="Times New Roman" panose="02020603050405020304" pitchFamily="18" charset="0"/>
+                <a:cs typeface="Times New Roman" panose="02020603050405020304" pitchFamily="18" charset="0"/>
+                <a:hlinkClick r:id="rId5"/>
+              </a:rPr>
+              <a:t>https://www.telegraaf.nl/sport/166997363/nieuwe-tegenvaller-voor-duitsland-ook-kai-havertz-ontbreekt-tegen-nederlands-elftal</a:t>
+            </a:r>
+            <a:r>
+              <a:rPr kumimoji="0" lang="nl-BE" altLang="nl-BE" sz="1200" b="0" i="0" u="none" strike="noStrike" cap="none" normalizeH="0" baseline="0" dirty="0">
+                <a:ln>
+                  <a:noFill/>
+                </a:ln>
+                <a:solidFill>
+                  <a:schemeClr val="tx1"/>
+                </a:solidFill>
+                <a:effectLst/>
+                <a:latin typeface="Times New Roman" panose="02020603050405020304" pitchFamily="18" charset="0"/>
+                <a:cs typeface="Times New Roman" panose="02020603050405020304" pitchFamily="18" charset="0"/>
+              </a:rPr>
+              <a:t> </a:t>
+            </a:r>
+            <a:endParaRPr kumimoji="0" lang="nl-BE" altLang="nl-BE" sz="600" b="0" i="0" u="none" strike="noStrike" cap="none" normalizeH="0" baseline="0" dirty="0">
               <a:ln>
                 <a:noFill/>
               </a:ln>
@@ -13268,7 +13702,7 @@
               <a:buSzTx/>
             </a:pPr>
             <a:r>
-              <a:rPr kumimoji="0" lang="nl-BE" altLang="nl-BE" sz="2000" b="0" i="1" u="none" strike="noStrike" cap="none" normalizeH="0" baseline="0" dirty="0">
+              <a:rPr kumimoji="0" lang="nl-BE" altLang="nl-BE" sz="1200" b="0" i="0" u="none" strike="noStrike" cap="none" normalizeH="0" baseline="0" dirty="0">
                 <a:ln>
                   <a:noFill/>
                 </a:ln>
@@ -13279,10 +13713,10 @@
                 <a:latin typeface="Times New Roman" panose="02020603050405020304" pitchFamily="18" charset="0"/>
                 <a:cs typeface="Times New Roman" panose="02020603050405020304" pitchFamily="18" charset="0"/>
               </a:rPr>
-              <a:t>Home Golf | Beats of Golf</a:t>
-            </a:r>
-            <a:r>
-              <a:rPr kumimoji="0" lang="nl-BE" altLang="nl-BE" sz="2000" b="0" i="0" u="none" strike="noStrike" cap="none" normalizeH="0" baseline="0" dirty="0">
+              <a:t>De Jong, R. (2022, December 8). De werking van een weegschaal met lichaamsanalyse. </a:t>
+            </a:r>
+            <a:r>
+              <a:rPr kumimoji="0" lang="nl-BE" altLang="nl-BE" sz="1200" b="0" i="1" u="none" strike="noStrike" cap="none" normalizeH="0" baseline="0" dirty="0" err="1">
                 <a:ln>
                   <a:noFill/>
                 </a:ln>
@@ -13293,10 +13727,10 @@
                 <a:latin typeface="Times New Roman" panose="02020603050405020304" pitchFamily="18" charset="0"/>
                 <a:cs typeface="Times New Roman" panose="02020603050405020304" pitchFamily="18" charset="0"/>
               </a:rPr>
-              <a:t>. (</a:t>
-            </a:r>
-            <a:r>
-              <a:rPr kumimoji="0" lang="nl-BE" altLang="nl-BE" sz="2000" b="0" i="0" u="none" strike="noStrike" cap="none" normalizeH="0" baseline="0" dirty="0" err="1">
+              <a:t>Robistore</a:t>
+            </a:r>
+            <a:r>
+              <a:rPr kumimoji="0" lang="nl-BE" altLang="nl-BE" sz="1200" b="0" i="0" u="none" strike="noStrike" cap="none" normalizeH="0" baseline="0" dirty="0">
                 <a:ln>
                   <a:noFill/>
                 </a:ln>
@@ -13307,10 +13741,25 @@
                 <a:latin typeface="Times New Roman" panose="02020603050405020304" pitchFamily="18" charset="0"/>
                 <a:cs typeface="Times New Roman" panose="02020603050405020304" pitchFamily="18" charset="0"/>
               </a:rPr>
-              <a:t>n.d</a:t>
-            </a:r>
-            <a:r>
-              <a:rPr kumimoji="0" lang="nl-BE" altLang="nl-BE" sz="2000" b="0" i="0" u="none" strike="noStrike" cap="none" normalizeH="0" baseline="0" dirty="0">
+              <a:t>. </a:t>
+            </a:r>
+            <a:r>
+              <a:rPr kumimoji="0" lang="nl-BE" altLang="nl-BE" sz="1200" b="0" i="0" u="none" strike="noStrike" cap="none" normalizeH="0" baseline="0" dirty="0">
+                <a:ln>
+                  <a:noFill/>
+                </a:ln>
+                <a:solidFill>
+                  <a:schemeClr val="tx1"/>
+                </a:solidFill>
+                <a:effectLst/>
+                <a:latin typeface="Times New Roman" panose="02020603050405020304" pitchFamily="18" charset="0"/>
+                <a:cs typeface="Times New Roman" panose="02020603050405020304" pitchFamily="18" charset="0"/>
+                <a:hlinkClick r:id="rId6"/>
+              </a:rPr>
+              <a:t>https://robistore.nl/blogs/news/de-werking-van-een-weegschaal-met-lichaamsanalyse#:~:text=Bij%20een%20compleet%20lichaamsanalyse%2C%20stuurt,tot%20meetresultaten%20via%20een%20rekenmodel</a:t>
+            </a:r>
+            <a:r>
+              <a:rPr kumimoji="0" lang="nl-BE" altLang="nl-BE" sz="1200" b="0" i="0" u="none" strike="noStrike" cap="none" normalizeH="0" baseline="0" dirty="0">
                 <a:ln>
                   <a:noFill/>
                 </a:ln>
@@ -13321,9 +13770,9 @@
                 <a:latin typeface="Times New Roman" panose="02020603050405020304" pitchFamily="18" charset="0"/>
                 <a:cs typeface="Times New Roman" panose="02020603050405020304" pitchFamily="18" charset="0"/>
               </a:rPr>
-              <a:t>.). Beats of Golf. https://www.beatsofgolf.com/homegolf?src=search_home_golf&amp;utm_source=googleads&amp;utm_medium=search&amp;utm_campaign=search_home_golf&amp;gad_source=1&amp;gclid=Cj0KCQjwjY64BhCaARIsAIfc7YYoXLSCNRDuIWK87vSPrpN0FXUIICT66b7mVvZCaI9DzrreoRv4T8EaAjNOEALw_wcB</a:t>
-            </a:r>
-            <a:endParaRPr kumimoji="0" lang="nl-BE" altLang="nl-BE" sz="2000" b="0" i="0" u="none" strike="noStrike" cap="none" normalizeH="0" baseline="0" dirty="0">
+              <a:t>. </a:t>
+            </a:r>
+            <a:endParaRPr kumimoji="0" lang="nl-BE" altLang="nl-BE" sz="600" b="0" i="0" u="none" strike="noStrike" cap="none" normalizeH="0" baseline="0" dirty="0">
               <a:ln>
                 <a:noFill/>
               </a:ln>
@@ -13339,7 +13788,235 @@
               <a:buSzTx/>
             </a:pPr>
             <a:r>
-              <a:rPr kumimoji="0" lang="nl-BE" altLang="nl-BE" sz="2000" b="0" i="1" u="none" strike="noStrike" cap="none" normalizeH="0" baseline="0" dirty="0">
+              <a:rPr kumimoji="0" lang="nl-BE" altLang="nl-BE" sz="1200" b="0" i="1" u="none" strike="noStrike" cap="none" normalizeH="0" baseline="0" dirty="0" err="1">
+                <a:ln>
+                  <a:noFill/>
+                </a:ln>
+                <a:solidFill>
+                  <a:schemeClr val="tx1"/>
+                </a:solidFill>
+                <a:effectLst/>
+                <a:latin typeface="Times New Roman" panose="02020603050405020304" pitchFamily="18" charset="0"/>
+                <a:cs typeface="Times New Roman" panose="02020603050405020304" pitchFamily="18" charset="0"/>
+              </a:rPr>
+              <a:t>Golfpro</a:t>
+            </a:r>
+            <a:r>
+              <a:rPr kumimoji="0" lang="nl-BE" altLang="nl-BE" sz="1200" b="0" i="1" u="none" strike="noStrike" cap="none" normalizeH="0" baseline="0" dirty="0">
+                <a:ln>
+                  <a:noFill/>
+                </a:ln>
+                <a:solidFill>
+                  <a:schemeClr val="tx1"/>
+                </a:solidFill>
+                <a:effectLst/>
+                <a:latin typeface="Times New Roman" panose="02020603050405020304" pitchFamily="18" charset="0"/>
+                <a:cs typeface="Times New Roman" panose="02020603050405020304" pitchFamily="18" charset="0"/>
+              </a:rPr>
+              <a:t> - Foto van Beats of Golf, Antwerpen - </a:t>
+            </a:r>
+            <a:r>
+              <a:rPr kumimoji="0" lang="nl-BE" altLang="nl-BE" sz="1200" b="0" i="1" u="none" strike="noStrike" cap="none" normalizeH="0" baseline="0" dirty="0" err="1">
+                <a:ln>
+                  <a:noFill/>
+                </a:ln>
+                <a:solidFill>
+                  <a:schemeClr val="tx1"/>
+                </a:solidFill>
+                <a:effectLst/>
+                <a:latin typeface="Times New Roman" panose="02020603050405020304" pitchFamily="18" charset="0"/>
+                <a:cs typeface="Times New Roman" panose="02020603050405020304" pitchFamily="18" charset="0"/>
+              </a:rPr>
+              <a:t>Tripadvisor</a:t>
+            </a:r>
+            <a:r>
+              <a:rPr kumimoji="0" lang="nl-BE" altLang="nl-BE" sz="1200" b="0" i="0" u="none" strike="noStrike" cap="none" normalizeH="0" baseline="0" dirty="0">
+                <a:ln>
+                  <a:noFill/>
+                </a:ln>
+                <a:solidFill>
+                  <a:schemeClr val="tx1"/>
+                </a:solidFill>
+                <a:effectLst/>
+                <a:latin typeface="Times New Roman" panose="02020603050405020304" pitchFamily="18" charset="0"/>
+                <a:cs typeface="Times New Roman" panose="02020603050405020304" pitchFamily="18" charset="0"/>
+              </a:rPr>
+              <a:t>. (</a:t>
+            </a:r>
+            <a:r>
+              <a:rPr kumimoji="0" lang="nl-BE" altLang="nl-BE" sz="1200" b="0" i="0" u="none" strike="noStrike" cap="none" normalizeH="0" baseline="0" dirty="0" err="1">
+                <a:ln>
+                  <a:noFill/>
+                </a:ln>
+                <a:solidFill>
+                  <a:schemeClr val="tx1"/>
+                </a:solidFill>
+                <a:effectLst/>
+                <a:latin typeface="Times New Roman" panose="02020603050405020304" pitchFamily="18" charset="0"/>
+                <a:cs typeface="Times New Roman" panose="02020603050405020304" pitchFamily="18" charset="0"/>
+              </a:rPr>
+              <a:t>n.d</a:t>
+            </a:r>
+            <a:r>
+              <a:rPr kumimoji="0" lang="nl-BE" altLang="nl-BE" sz="1200" b="0" i="0" u="none" strike="noStrike" cap="none" normalizeH="0" baseline="0" dirty="0">
+                <a:ln>
+                  <a:noFill/>
+                </a:ln>
+                <a:solidFill>
+                  <a:schemeClr val="tx1"/>
+                </a:solidFill>
+                <a:effectLst/>
+                <a:latin typeface="Times New Roman" panose="02020603050405020304" pitchFamily="18" charset="0"/>
+                <a:cs typeface="Times New Roman" panose="02020603050405020304" pitchFamily="18" charset="0"/>
+              </a:rPr>
+              <a:t>.). </a:t>
+            </a:r>
+            <a:r>
+              <a:rPr kumimoji="0" lang="nl-BE" altLang="nl-BE" sz="1200" b="0" i="0" u="none" strike="noStrike" cap="none" normalizeH="0" baseline="0" dirty="0">
+                <a:ln>
+                  <a:noFill/>
+                </a:ln>
+                <a:solidFill>
+                  <a:schemeClr val="tx1"/>
+                </a:solidFill>
+                <a:effectLst/>
+                <a:latin typeface="Times New Roman" panose="02020603050405020304" pitchFamily="18" charset="0"/>
+                <a:cs typeface="Times New Roman" panose="02020603050405020304" pitchFamily="18" charset="0"/>
+                <a:hlinkClick r:id="rId7"/>
+              </a:rPr>
+              <a:t>https://www.tripadvisor.be/LocationPhotoDirectLink-g188636-d23542732-i493436553-Beats_of_Golf-Antwerp_Antwerp_Province.html</a:t>
+            </a:r>
+            <a:r>
+              <a:rPr kumimoji="0" lang="nl-BE" altLang="nl-BE" sz="1200" b="0" i="0" u="none" strike="noStrike" cap="none" normalizeH="0" baseline="0" dirty="0">
+                <a:ln>
+                  <a:noFill/>
+                </a:ln>
+                <a:solidFill>
+                  <a:schemeClr val="tx1"/>
+                </a:solidFill>
+                <a:effectLst/>
+                <a:latin typeface="Times New Roman" panose="02020603050405020304" pitchFamily="18" charset="0"/>
+                <a:cs typeface="Times New Roman" panose="02020603050405020304" pitchFamily="18" charset="0"/>
+              </a:rPr>
+              <a:t> </a:t>
+            </a:r>
+            <a:endParaRPr kumimoji="0" lang="nl-BE" altLang="nl-BE" sz="600" b="0" i="0" u="none" strike="noStrike" cap="none" normalizeH="0" baseline="0" dirty="0">
+              <a:ln>
+                <a:noFill/>
+              </a:ln>
+              <a:solidFill>
+                <a:schemeClr val="tx1"/>
+              </a:solidFill>
+              <a:effectLst/>
+            </a:endParaRPr>
+          </a:p>
+          <a:p>
+            <a:pPr defTabSz="914400">
+              <a:buClrTx/>
+              <a:buSzTx/>
+            </a:pPr>
+            <a:r>
+              <a:rPr kumimoji="0" lang="nl-BE" altLang="nl-BE" sz="1200" b="0" i="1" u="none" strike="noStrike" cap="none" normalizeH="0" baseline="0" dirty="0">
+                <a:ln>
+                  <a:noFill/>
+                </a:ln>
+                <a:solidFill>
+                  <a:schemeClr val="tx1"/>
+                </a:solidFill>
+                <a:effectLst/>
+                <a:latin typeface="Times New Roman" panose="02020603050405020304" pitchFamily="18" charset="0"/>
+                <a:cs typeface="Times New Roman" panose="02020603050405020304" pitchFamily="18" charset="0"/>
+              </a:rPr>
+              <a:t>Home Golf | Beats of Golf</a:t>
+            </a:r>
+            <a:r>
+              <a:rPr kumimoji="0" lang="nl-BE" altLang="nl-BE" sz="1200" b="0" i="0" u="none" strike="noStrike" cap="none" normalizeH="0" baseline="0" dirty="0">
+                <a:ln>
+                  <a:noFill/>
+                </a:ln>
+                <a:solidFill>
+                  <a:schemeClr val="tx1"/>
+                </a:solidFill>
+                <a:effectLst/>
+                <a:latin typeface="Times New Roman" panose="02020603050405020304" pitchFamily="18" charset="0"/>
+                <a:cs typeface="Times New Roman" panose="02020603050405020304" pitchFamily="18" charset="0"/>
+              </a:rPr>
+              <a:t>. (</a:t>
+            </a:r>
+            <a:r>
+              <a:rPr kumimoji="0" lang="nl-BE" altLang="nl-BE" sz="1200" b="0" i="0" u="none" strike="noStrike" cap="none" normalizeH="0" baseline="0" dirty="0" err="1">
+                <a:ln>
+                  <a:noFill/>
+                </a:ln>
+                <a:solidFill>
+                  <a:schemeClr val="tx1"/>
+                </a:solidFill>
+                <a:effectLst/>
+                <a:latin typeface="Times New Roman" panose="02020603050405020304" pitchFamily="18" charset="0"/>
+                <a:cs typeface="Times New Roman" panose="02020603050405020304" pitchFamily="18" charset="0"/>
+              </a:rPr>
+              <a:t>n.d</a:t>
+            </a:r>
+            <a:r>
+              <a:rPr kumimoji="0" lang="nl-BE" altLang="nl-BE" sz="1200" b="0" i="0" u="none" strike="noStrike" cap="none" normalizeH="0" baseline="0" dirty="0">
+                <a:ln>
+                  <a:noFill/>
+                </a:ln>
+                <a:solidFill>
+                  <a:schemeClr val="tx1"/>
+                </a:solidFill>
+                <a:effectLst/>
+                <a:latin typeface="Times New Roman" panose="02020603050405020304" pitchFamily="18" charset="0"/>
+                <a:cs typeface="Times New Roman" panose="02020603050405020304" pitchFamily="18" charset="0"/>
+              </a:rPr>
+              <a:t>.). Beats of Golf. </a:t>
+            </a:r>
+            <a:r>
+              <a:rPr kumimoji="0" lang="nl-BE" altLang="nl-BE" sz="1200" b="0" i="0" u="none" strike="noStrike" cap="none" normalizeH="0" baseline="0" dirty="0">
+                <a:ln>
+                  <a:noFill/>
+                </a:ln>
+                <a:solidFill>
+                  <a:schemeClr val="tx1"/>
+                </a:solidFill>
+                <a:effectLst/>
+                <a:latin typeface="Times New Roman" panose="02020603050405020304" pitchFamily="18" charset="0"/>
+                <a:cs typeface="Times New Roman" panose="02020603050405020304" pitchFamily="18" charset="0"/>
+                <a:hlinkClick r:id="rId8"/>
+              </a:rPr>
+              <a:t>https://www.beatsofgolf.com/homegolf?src=search_home_golf&amp;utm_source=googleads&amp;utm_medium=search&amp;utm_campaign=search_home_golf&amp;gad_source=1&amp;gclid=Cj0KCQjwjY64BhCaARIsAIfc7YYoXLSCNRDuIWK87vSPrpN0FXUIICT66b7mVvZCaI9DzrreoRv4T8EaAjNOEALw_wcB</a:t>
+            </a:r>
+            <a:r>
+              <a:rPr kumimoji="0" lang="nl-BE" altLang="nl-BE" sz="1200" b="0" i="0" u="none" strike="noStrike" cap="none" normalizeH="0" baseline="0" dirty="0">
+                <a:ln>
+                  <a:noFill/>
+                </a:ln>
+                <a:solidFill>
+                  <a:schemeClr val="tx1"/>
+                </a:solidFill>
+                <a:effectLst/>
+                <a:latin typeface="Times New Roman" panose="02020603050405020304" pitchFamily="18" charset="0"/>
+                <a:cs typeface="Times New Roman" panose="02020603050405020304" pitchFamily="18" charset="0"/>
+              </a:rPr>
+              <a:t> </a:t>
+            </a:r>
+            <a:endParaRPr kumimoji="0" lang="nl-BE" altLang="nl-BE" sz="600" b="0" i="0" u="none" strike="noStrike" cap="none" normalizeH="0" baseline="0" dirty="0">
+              <a:ln>
+                <a:noFill/>
+              </a:ln>
+              <a:solidFill>
+                <a:schemeClr val="tx1"/>
+              </a:solidFill>
+              <a:effectLst/>
+            </a:endParaRPr>
+          </a:p>
+          <a:p>
+            <a:pPr defTabSz="914400">
+              <a:buClrTx/>
+              <a:buSzTx/>
+            </a:pPr>
+            <a:r>
+              <a:rPr kumimoji="0" lang="nl-BE" altLang="nl-BE" sz="1200" b="0" i="1" u="none" strike="noStrike" cap="none" normalizeH="0" baseline="0" dirty="0">
                 <a:ln>
                   <a:noFill/>
                 </a:ln>
@@ -13353,7 +14030,7 @@
               <a:t>Indoor golf in Nederland</a:t>
             </a:r>
             <a:r>
-              <a:rPr kumimoji="0" lang="nl-BE" altLang="nl-BE" sz="2000" b="0" i="0" u="none" strike="noStrike" cap="none" normalizeH="0" baseline="0" dirty="0">
+              <a:rPr kumimoji="0" lang="nl-BE" altLang="nl-BE" sz="1200" b="0" i="0" u="none" strike="noStrike" cap="none" normalizeH="0" baseline="0" dirty="0">
                 <a:ln>
                   <a:noFill/>
                 </a:ln>
@@ -13367,7 +14044,7 @@
               <a:t>. (</a:t>
             </a:r>
             <a:r>
-              <a:rPr kumimoji="0" lang="nl-BE" altLang="nl-BE" sz="2000" b="0" i="0" u="none" strike="noStrike" cap="none" normalizeH="0" baseline="0" dirty="0" err="1">
+              <a:rPr kumimoji="0" lang="nl-BE" altLang="nl-BE" sz="1200" b="0" i="0" u="none" strike="noStrike" cap="none" normalizeH="0" baseline="0" dirty="0" err="1">
                 <a:ln>
                   <a:noFill/>
                 </a:ln>
@@ -13381,7 +14058,7 @@
               <a:t>n.d</a:t>
             </a:r>
             <a:r>
-              <a:rPr kumimoji="0" lang="nl-BE" altLang="nl-BE" sz="2000" b="0" i="0" u="none" strike="noStrike" cap="none" normalizeH="0" baseline="0" dirty="0">
+              <a:rPr kumimoji="0" lang="nl-BE" altLang="nl-BE" sz="1200" b="0" i="0" u="none" strike="noStrike" cap="none" normalizeH="0" baseline="0" dirty="0">
                 <a:ln>
                   <a:noFill/>
                 </a:ln>
@@ -13392,9 +14069,704 @@
                 <a:latin typeface="Times New Roman" panose="02020603050405020304" pitchFamily="18" charset="0"/>
                 <a:cs typeface="Times New Roman" panose="02020603050405020304" pitchFamily="18" charset="0"/>
               </a:rPr>
-              <a:t>.). Golf.nl - Hét Platform Voor Golfend Nederland. https://www.golf.nl/beter-golfen/tips/indoor-golf</a:t>
-            </a:r>
-            <a:endParaRPr kumimoji="0" lang="nl-BE" altLang="nl-BE" sz="2000" b="0" i="0" u="none" strike="noStrike" cap="none" normalizeH="0" baseline="0" dirty="0">
+              <a:t>.). Golf.nl - Hét Platform Voor Golfend Nederland. </a:t>
+            </a:r>
+            <a:r>
+              <a:rPr kumimoji="0" lang="nl-BE" altLang="nl-BE" sz="1200" b="0" i="0" u="none" strike="noStrike" cap="none" normalizeH="0" baseline="0" dirty="0">
+                <a:ln>
+                  <a:noFill/>
+                </a:ln>
+                <a:solidFill>
+                  <a:schemeClr val="tx1"/>
+                </a:solidFill>
+                <a:effectLst/>
+                <a:latin typeface="Times New Roman" panose="02020603050405020304" pitchFamily="18" charset="0"/>
+                <a:cs typeface="Times New Roman" panose="02020603050405020304" pitchFamily="18" charset="0"/>
+                <a:hlinkClick r:id="rId9"/>
+              </a:rPr>
+              <a:t>https://www.golf.nl/beter-golfen/tips/indoor-golf</a:t>
+            </a:r>
+            <a:r>
+              <a:rPr kumimoji="0" lang="nl-BE" altLang="nl-BE" sz="1200" b="0" i="0" u="none" strike="noStrike" cap="none" normalizeH="0" baseline="0" dirty="0">
+                <a:ln>
+                  <a:noFill/>
+                </a:ln>
+                <a:solidFill>
+                  <a:schemeClr val="tx1"/>
+                </a:solidFill>
+                <a:effectLst/>
+                <a:latin typeface="Times New Roman" panose="02020603050405020304" pitchFamily="18" charset="0"/>
+                <a:cs typeface="Times New Roman" panose="02020603050405020304" pitchFamily="18" charset="0"/>
+              </a:rPr>
+              <a:t> </a:t>
+            </a:r>
+            <a:endParaRPr kumimoji="0" lang="nl-BE" altLang="nl-BE" sz="600" b="0" i="0" u="none" strike="noStrike" cap="none" normalizeH="0" baseline="0" dirty="0">
+              <a:ln>
+                <a:noFill/>
+              </a:ln>
+              <a:solidFill>
+                <a:schemeClr val="tx1"/>
+              </a:solidFill>
+              <a:effectLst/>
+            </a:endParaRPr>
+          </a:p>
+          <a:p>
+            <a:pPr defTabSz="914400">
+              <a:buClrTx/>
+              <a:buSzTx/>
+            </a:pPr>
+            <a:r>
+              <a:rPr kumimoji="0" lang="nl-BE" altLang="nl-BE" sz="1200" b="0" i="1" u="none" strike="noStrike" cap="none" normalizeH="0" baseline="0" dirty="0" err="1">
+                <a:ln>
+                  <a:noFill/>
+                </a:ln>
+                <a:solidFill>
+                  <a:schemeClr val="tx1"/>
+                </a:solidFill>
+                <a:effectLst/>
+                <a:latin typeface="Times New Roman" panose="02020603050405020304" pitchFamily="18" charset="0"/>
+                <a:cs typeface="Times New Roman" panose="02020603050405020304" pitchFamily="18" charset="0"/>
+              </a:rPr>
+              <a:t>Polysomnografie</a:t>
+            </a:r>
+            <a:r>
+              <a:rPr kumimoji="0" lang="nl-BE" altLang="nl-BE" sz="1200" b="0" i="0" u="none" strike="noStrike" cap="none" normalizeH="0" baseline="0" dirty="0">
+                <a:ln>
+                  <a:noFill/>
+                </a:ln>
+                <a:solidFill>
+                  <a:schemeClr val="tx1"/>
+                </a:solidFill>
+                <a:effectLst/>
+                <a:latin typeface="Times New Roman" panose="02020603050405020304" pitchFamily="18" charset="0"/>
+                <a:cs typeface="Times New Roman" panose="02020603050405020304" pitchFamily="18" charset="0"/>
+              </a:rPr>
+              <a:t>. (</a:t>
+            </a:r>
+            <a:r>
+              <a:rPr kumimoji="0" lang="nl-BE" altLang="nl-BE" sz="1200" b="0" i="0" u="none" strike="noStrike" cap="none" normalizeH="0" baseline="0" dirty="0" err="1">
+                <a:ln>
+                  <a:noFill/>
+                </a:ln>
+                <a:solidFill>
+                  <a:schemeClr val="tx1"/>
+                </a:solidFill>
+                <a:effectLst/>
+                <a:latin typeface="Times New Roman" panose="02020603050405020304" pitchFamily="18" charset="0"/>
+                <a:cs typeface="Times New Roman" panose="02020603050405020304" pitchFamily="18" charset="0"/>
+              </a:rPr>
+              <a:t>n.d</a:t>
+            </a:r>
+            <a:r>
+              <a:rPr kumimoji="0" lang="nl-BE" altLang="nl-BE" sz="1200" b="0" i="0" u="none" strike="noStrike" cap="none" normalizeH="0" baseline="0" dirty="0">
+                <a:ln>
+                  <a:noFill/>
+                </a:ln>
+                <a:solidFill>
+                  <a:schemeClr val="tx1"/>
+                </a:solidFill>
+                <a:effectLst/>
+                <a:latin typeface="Times New Roman" panose="02020603050405020304" pitchFamily="18" charset="0"/>
+                <a:cs typeface="Times New Roman" panose="02020603050405020304" pitchFamily="18" charset="0"/>
+              </a:rPr>
+              <a:t>.). UZ Leuven. </a:t>
+            </a:r>
+            <a:r>
+              <a:rPr kumimoji="0" lang="nl-BE" altLang="nl-BE" sz="1200" b="0" i="0" u="none" strike="noStrike" cap="none" normalizeH="0" baseline="0" dirty="0">
+                <a:ln>
+                  <a:noFill/>
+                </a:ln>
+                <a:solidFill>
+                  <a:schemeClr val="tx1"/>
+                </a:solidFill>
+                <a:effectLst/>
+                <a:latin typeface="Times New Roman" panose="02020603050405020304" pitchFamily="18" charset="0"/>
+                <a:cs typeface="Times New Roman" panose="02020603050405020304" pitchFamily="18" charset="0"/>
+                <a:hlinkClick r:id="rId10"/>
+              </a:rPr>
+              <a:t>https://www.uzleuven.be/nl/polysomnografie</a:t>
+            </a:r>
+            <a:r>
+              <a:rPr kumimoji="0" lang="nl-BE" altLang="nl-BE" sz="1200" b="0" i="0" u="none" strike="noStrike" cap="none" normalizeH="0" baseline="0" dirty="0">
+                <a:ln>
+                  <a:noFill/>
+                </a:ln>
+                <a:solidFill>
+                  <a:schemeClr val="tx1"/>
+                </a:solidFill>
+                <a:effectLst/>
+                <a:latin typeface="Times New Roman" panose="02020603050405020304" pitchFamily="18" charset="0"/>
+                <a:cs typeface="Times New Roman" panose="02020603050405020304" pitchFamily="18" charset="0"/>
+              </a:rPr>
+              <a:t> </a:t>
+            </a:r>
+            <a:endParaRPr kumimoji="0" lang="nl-BE" altLang="nl-BE" sz="600" b="0" i="0" u="none" strike="noStrike" cap="none" normalizeH="0" baseline="0" dirty="0">
+              <a:ln>
+                <a:noFill/>
+              </a:ln>
+              <a:solidFill>
+                <a:schemeClr val="tx1"/>
+              </a:solidFill>
+              <a:effectLst/>
+            </a:endParaRPr>
+          </a:p>
+          <a:p>
+            <a:pPr defTabSz="914400">
+              <a:buClrTx/>
+              <a:buSzTx/>
+            </a:pPr>
+            <a:r>
+              <a:rPr kumimoji="0" lang="nl-BE" altLang="nl-BE" sz="1200" b="0" i="0" u="none" strike="noStrike" cap="none" normalizeH="0" baseline="0" dirty="0" err="1">
+                <a:ln>
+                  <a:noFill/>
+                </a:ln>
+                <a:solidFill>
+                  <a:schemeClr val="tx1"/>
+                </a:solidFill>
+                <a:effectLst/>
+                <a:latin typeface="Times New Roman" panose="02020603050405020304" pitchFamily="18" charset="0"/>
+                <a:cs typeface="Times New Roman" panose="02020603050405020304" pitchFamily="18" charset="0"/>
+              </a:rPr>
+              <a:t>Ruddock</a:t>
+            </a:r>
+            <a:r>
+              <a:rPr kumimoji="0" lang="nl-BE" altLang="nl-BE" sz="1200" b="0" i="0" u="none" strike="noStrike" cap="none" normalizeH="0" baseline="0" dirty="0">
+                <a:ln>
+                  <a:noFill/>
+                </a:ln>
+                <a:solidFill>
+                  <a:schemeClr val="tx1"/>
+                </a:solidFill>
+                <a:effectLst/>
+                <a:latin typeface="Times New Roman" panose="02020603050405020304" pitchFamily="18" charset="0"/>
+                <a:cs typeface="Times New Roman" panose="02020603050405020304" pitchFamily="18" charset="0"/>
+              </a:rPr>
+              <a:t>, J. (</a:t>
+            </a:r>
+            <a:r>
+              <a:rPr kumimoji="0" lang="nl-BE" altLang="nl-BE" sz="1200" b="0" i="0" u="none" strike="noStrike" cap="none" normalizeH="0" baseline="0" dirty="0" err="1">
+                <a:ln>
+                  <a:noFill/>
+                </a:ln>
+                <a:solidFill>
+                  <a:schemeClr val="tx1"/>
+                </a:solidFill>
+                <a:effectLst/>
+                <a:latin typeface="Times New Roman" panose="02020603050405020304" pitchFamily="18" charset="0"/>
+                <a:cs typeface="Times New Roman" panose="02020603050405020304" pitchFamily="18" charset="0"/>
+              </a:rPr>
+              <a:t>n.d</a:t>
+            </a:r>
+            <a:r>
+              <a:rPr kumimoji="0" lang="nl-BE" altLang="nl-BE" sz="1200" b="0" i="0" u="none" strike="noStrike" cap="none" normalizeH="0" baseline="0" dirty="0">
+                <a:ln>
+                  <a:noFill/>
+                </a:ln>
+                <a:solidFill>
+                  <a:schemeClr val="tx1"/>
+                </a:solidFill>
+                <a:effectLst/>
+                <a:latin typeface="Times New Roman" panose="02020603050405020304" pitchFamily="18" charset="0"/>
+                <a:cs typeface="Times New Roman" panose="02020603050405020304" pitchFamily="18" charset="0"/>
+              </a:rPr>
+              <a:t>.). </a:t>
+            </a:r>
+            <a:r>
+              <a:rPr kumimoji="0" lang="nl-BE" altLang="nl-BE" sz="1200" b="0" i="1" u="none" strike="noStrike" cap="none" normalizeH="0" baseline="0" dirty="0">
+                <a:ln>
+                  <a:noFill/>
+                </a:ln>
+                <a:solidFill>
+                  <a:schemeClr val="tx1"/>
+                </a:solidFill>
+                <a:effectLst/>
+                <a:latin typeface="Times New Roman" panose="02020603050405020304" pitchFamily="18" charset="0"/>
+                <a:cs typeface="Times New Roman" panose="02020603050405020304" pitchFamily="18" charset="0"/>
+              </a:rPr>
+              <a:t>Research </a:t>
+            </a:r>
+            <a:r>
+              <a:rPr kumimoji="0" lang="nl-BE" altLang="nl-BE" sz="1200" b="0" i="1" u="none" strike="noStrike" cap="none" normalizeH="0" baseline="0" dirty="0" err="1">
+                <a:ln>
+                  <a:noFill/>
+                </a:ln>
+                <a:solidFill>
+                  <a:schemeClr val="tx1"/>
+                </a:solidFill>
+                <a:effectLst/>
+                <a:latin typeface="Times New Roman" panose="02020603050405020304" pitchFamily="18" charset="0"/>
+                <a:cs typeface="Times New Roman" panose="02020603050405020304" pitchFamily="18" charset="0"/>
+              </a:rPr>
+              <a:t>reveals</a:t>
+            </a:r>
+            <a:r>
+              <a:rPr kumimoji="0" lang="nl-BE" altLang="nl-BE" sz="1200" b="0" i="1" u="none" strike="noStrike" cap="none" normalizeH="0" baseline="0" dirty="0">
+                <a:ln>
+                  <a:noFill/>
+                </a:ln>
+                <a:solidFill>
+                  <a:schemeClr val="tx1"/>
+                </a:solidFill>
+                <a:effectLst/>
+                <a:latin typeface="Times New Roman" panose="02020603050405020304" pitchFamily="18" charset="0"/>
+                <a:cs typeface="Times New Roman" panose="02020603050405020304" pitchFamily="18" charset="0"/>
+              </a:rPr>
+              <a:t> </a:t>
+            </a:r>
+            <a:r>
+              <a:rPr kumimoji="0" lang="nl-BE" altLang="nl-BE" sz="1200" b="0" i="1" u="none" strike="noStrike" cap="none" normalizeH="0" baseline="0" dirty="0" err="1">
+                <a:ln>
+                  <a:noFill/>
+                </a:ln>
+                <a:solidFill>
+                  <a:schemeClr val="tx1"/>
+                </a:solidFill>
+                <a:effectLst/>
+                <a:latin typeface="Times New Roman" panose="02020603050405020304" pitchFamily="18" charset="0"/>
+                <a:cs typeface="Times New Roman" panose="02020603050405020304" pitchFamily="18" charset="0"/>
+              </a:rPr>
+              <a:t>massive</a:t>
+            </a:r>
+            <a:r>
+              <a:rPr kumimoji="0" lang="nl-BE" altLang="nl-BE" sz="1200" b="0" i="1" u="none" strike="noStrike" cap="none" normalizeH="0" baseline="0" dirty="0">
+                <a:ln>
+                  <a:noFill/>
+                </a:ln>
+                <a:solidFill>
+                  <a:schemeClr val="tx1"/>
+                </a:solidFill>
+                <a:effectLst/>
+                <a:latin typeface="Times New Roman" panose="02020603050405020304" pitchFamily="18" charset="0"/>
+                <a:cs typeface="Times New Roman" panose="02020603050405020304" pitchFamily="18" charset="0"/>
+              </a:rPr>
+              <a:t> </a:t>
+            </a:r>
+            <a:r>
+              <a:rPr kumimoji="0" lang="nl-BE" altLang="nl-BE" sz="1200" b="0" i="1" u="none" strike="noStrike" cap="none" normalizeH="0" baseline="0" dirty="0" err="1">
+                <a:ln>
+                  <a:noFill/>
+                </a:ln>
+                <a:solidFill>
+                  <a:schemeClr val="tx1"/>
+                </a:solidFill>
+                <a:effectLst/>
+                <a:latin typeface="Times New Roman" panose="02020603050405020304" pitchFamily="18" charset="0"/>
+                <a:cs typeface="Times New Roman" panose="02020603050405020304" pitchFamily="18" charset="0"/>
+              </a:rPr>
+              <a:t>increase</a:t>
+            </a:r>
+            <a:r>
+              <a:rPr kumimoji="0" lang="nl-BE" altLang="nl-BE" sz="1200" b="0" i="1" u="none" strike="noStrike" cap="none" normalizeH="0" baseline="0" dirty="0">
+                <a:ln>
+                  <a:noFill/>
+                </a:ln>
+                <a:solidFill>
+                  <a:schemeClr val="tx1"/>
+                </a:solidFill>
+                <a:effectLst/>
+                <a:latin typeface="Times New Roman" panose="02020603050405020304" pitchFamily="18" charset="0"/>
+                <a:cs typeface="Times New Roman" panose="02020603050405020304" pitchFamily="18" charset="0"/>
+              </a:rPr>
+              <a:t> in </a:t>
+            </a:r>
+            <a:r>
+              <a:rPr kumimoji="0" lang="nl-BE" altLang="nl-BE" sz="1200" b="0" i="1" u="none" strike="noStrike" cap="none" normalizeH="0" baseline="0" dirty="0" err="1">
+                <a:ln>
+                  <a:noFill/>
+                </a:ln>
+                <a:solidFill>
+                  <a:schemeClr val="tx1"/>
+                </a:solidFill>
+                <a:effectLst/>
+                <a:latin typeface="Times New Roman" panose="02020603050405020304" pitchFamily="18" charset="0"/>
+                <a:cs typeface="Times New Roman" panose="02020603050405020304" pitchFamily="18" charset="0"/>
+              </a:rPr>
+              <a:t>number</a:t>
+            </a:r>
+            <a:r>
+              <a:rPr kumimoji="0" lang="nl-BE" altLang="nl-BE" sz="1200" b="0" i="1" u="none" strike="noStrike" cap="none" normalizeH="0" baseline="0" dirty="0">
+                <a:ln>
+                  <a:noFill/>
+                </a:ln>
+                <a:solidFill>
+                  <a:schemeClr val="tx1"/>
+                </a:solidFill>
+                <a:effectLst/>
+                <a:latin typeface="Times New Roman" panose="02020603050405020304" pitchFamily="18" charset="0"/>
+                <a:cs typeface="Times New Roman" panose="02020603050405020304" pitchFamily="18" charset="0"/>
+              </a:rPr>
+              <a:t> of fans live streaming </a:t>
+            </a:r>
+            <a:r>
+              <a:rPr kumimoji="0" lang="nl-BE" altLang="nl-BE" sz="1200" b="0" i="1" u="none" strike="noStrike" cap="none" normalizeH="0" baseline="0" dirty="0" err="1">
+                <a:ln>
+                  <a:noFill/>
+                </a:ln>
+                <a:solidFill>
+                  <a:schemeClr val="tx1"/>
+                </a:solidFill>
+                <a:effectLst/>
+                <a:latin typeface="Times New Roman" panose="02020603050405020304" pitchFamily="18" charset="0"/>
+                <a:cs typeface="Times New Roman" panose="02020603050405020304" pitchFamily="18" charset="0"/>
+              </a:rPr>
+              <a:t>football</a:t>
+            </a:r>
+            <a:r>
+              <a:rPr kumimoji="0" lang="nl-BE" altLang="nl-BE" sz="1200" b="0" i="1" u="none" strike="noStrike" cap="none" normalizeH="0" baseline="0" dirty="0">
+                <a:ln>
+                  <a:noFill/>
+                </a:ln>
+                <a:solidFill>
+                  <a:schemeClr val="tx1"/>
+                </a:solidFill>
+                <a:effectLst/>
+                <a:latin typeface="Times New Roman" panose="02020603050405020304" pitchFamily="18" charset="0"/>
+                <a:cs typeface="Times New Roman" panose="02020603050405020304" pitchFamily="18" charset="0"/>
+              </a:rPr>
+              <a:t> </a:t>
+            </a:r>
+            <a:r>
+              <a:rPr kumimoji="0" lang="nl-BE" altLang="nl-BE" sz="1200" b="0" i="1" u="none" strike="noStrike" cap="none" normalizeH="0" baseline="0" dirty="0" err="1">
+                <a:ln>
+                  <a:noFill/>
+                </a:ln>
+                <a:solidFill>
+                  <a:schemeClr val="tx1"/>
+                </a:solidFill>
+                <a:effectLst/>
+                <a:latin typeface="Times New Roman" panose="02020603050405020304" pitchFamily="18" charset="0"/>
+                <a:cs typeface="Times New Roman" panose="02020603050405020304" pitchFamily="18" charset="0"/>
+              </a:rPr>
+              <a:t>from</a:t>
+            </a:r>
+            <a:r>
+              <a:rPr kumimoji="0" lang="nl-BE" altLang="nl-BE" sz="1200" b="0" i="1" u="none" strike="noStrike" cap="none" normalizeH="0" baseline="0" dirty="0">
+                <a:ln>
+                  <a:noFill/>
+                </a:ln>
+                <a:solidFill>
+                  <a:schemeClr val="tx1"/>
+                </a:solidFill>
+                <a:effectLst/>
+                <a:latin typeface="Times New Roman" panose="02020603050405020304" pitchFamily="18" charset="0"/>
+                <a:cs typeface="Times New Roman" panose="02020603050405020304" pitchFamily="18" charset="0"/>
+              </a:rPr>
+              <a:t> home post-</a:t>
+            </a:r>
+            <a:r>
+              <a:rPr kumimoji="0" lang="nl-BE" altLang="nl-BE" sz="1200" b="0" i="1" u="none" strike="noStrike" cap="none" normalizeH="0" baseline="0" dirty="0" err="1">
+                <a:ln>
+                  <a:noFill/>
+                </a:ln>
+                <a:solidFill>
+                  <a:schemeClr val="tx1"/>
+                </a:solidFill>
+                <a:effectLst/>
+                <a:latin typeface="Times New Roman" panose="02020603050405020304" pitchFamily="18" charset="0"/>
+                <a:cs typeface="Times New Roman" panose="02020603050405020304" pitchFamily="18" charset="0"/>
+              </a:rPr>
+              <a:t>pandemic</a:t>
+            </a:r>
+            <a:r>
+              <a:rPr kumimoji="0" lang="nl-BE" altLang="nl-BE" sz="1200" b="0" i="0" u="none" strike="noStrike" cap="none" normalizeH="0" baseline="0" dirty="0">
+                <a:ln>
+                  <a:noFill/>
+                </a:ln>
+                <a:solidFill>
+                  <a:schemeClr val="tx1"/>
+                </a:solidFill>
+                <a:effectLst/>
+                <a:latin typeface="Times New Roman" panose="02020603050405020304" pitchFamily="18" charset="0"/>
+                <a:cs typeface="Times New Roman" panose="02020603050405020304" pitchFamily="18" charset="0"/>
+              </a:rPr>
+              <a:t>. SVG Europe. </a:t>
+            </a:r>
+            <a:r>
+              <a:rPr kumimoji="0" lang="nl-BE" altLang="nl-BE" sz="1200" b="0" i="0" u="none" strike="noStrike" cap="none" normalizeH="0" baseline="0" dirty="0">
+                <a:ln>
+                  <a:noFill/>
+                </a:ln>
+                <a:solidFill>
+                  <a:schemeClr val="tx1"/>
+                </a:solidFill>
+                <a:effectLst/>
+                <a:latin typeface="Times New Roman" panose="02020603050405020304" pitchFamily="18" charset="0"/>
+                <a:cs typeface="Times New Roman" panose="02020603050405020304" pitchFamily="18" charset="0"/>
+                <a:hlinkClick r:id="rId11"/>
+              </a:rPr>
+              <a:t>https://www.svgeurope.org/blog/headlines/research-reveals-massive-increase-in-number-of-fans-live-streaming-football-from-home-post-pandemic/</a:t>
+            </a:r>
+            <a:r>
+              <a:rPr kumimoji="0" lang="nl-BE" altLang="nl-BE" sz="1200" b="0" i="0" u="none" strike="noStrike" cap="none" normalizeH="0" baseline="0" dirty="0">
+                <a:ln>
+                  <a:noFill/>
+                </a:ln>
+                <a:solidFill>
+                  <a:schemeClr val="tx1"/>
+                </a:solidFill>
+                <a:effectLst/>
+                <a:latin typeface="Times New Roman" panose="02020603050405020304" pitchFamily="18" charset="0"/>
+                <a:cs typeface="Times New Roman" panose="02020603050405020304" pitchFamily="18" charset="0"/>
+              </a:rPr>
+              <a:t> </a:t>
+            </a:r>
+            <a:endParaRPr kumimoji="0" lang="nl-BE" altLang="nl-BE" sz="600" b="0" i="0" u="none" strike="noStrike" cap="none" normalizeH="0" baseline="0" dirty="0">
+              <a:ln>
+                <a:noFill/>
+              </a:ln>
+              <a:solidFill>
+                <a:schemeClr val="tx1"/>
+              </a:solidFill>
+              <a:effectLst/>
+            </a:endParaRPr>
+          </a:p>
+          <a:p>
+            <a:pPr defTabSz="914400">
+              <a:buClrTx/>
+              <a:buSzTx/>
+            </a:pPr>
+            <a:r>
+              <a:rPr kumimoji="0" lang="nl-BE" altLang="nl-BE" sz="1200" b="0" i="1" u="none" strike="noStrike" cap="none" normalizeH="0" baseline="0" dirty="0">
+                <a:ln>
+                  <a:noFill/>
+                </a:ln>
+                <a:solidFill>
+                  <a:schemeClr val="tx1"/>
+                </a:solidFill>
+                <a:effectLst/>
+                <a:latin typeface="Times New Roman" panose="02020603050405020304" pitchFamily="18" charset="0"/>
+                <a:cs typeface="Times New Roman" panose="02020603050405020304" pitchFamily="18" charset="0"/>
+              </a:rPr>
+              <a:t>Technologie-ondersteunde revalidatie - </a:t>
+            </a:r>
+            <a:r>
+              <a:rPr kumimoji="0" lang="nl-BE" altLang="nl-BE" sz="1200" b="0" i="1" u="none" strike="noStrike" cap="none" normalizeH="0" baseline="0" dirty="0" err="1">
+                <a:ln>
+                  <a:noFill/>
+                </a:ln>
+                <a:solidFill>
+                  <a:schemeClr val="tx1"/>
+                </a:solidFill>
+                <a:effectLst/>
+                <a:latin typeface="Times New Roman" panose="02020603050405020304" pitchFamily="18" charset="0"/>
+                <a:cs typeface="Times New Roman" panose="02020603050405020304" pitchFamily="18" charset="0"/>
+              </a:rPr>
+              <a:t>UHasselt</a:t>
+            </a:r>
+            <a:r>
+              <a:rPr kumimoji="0" lang="nl-BE" altLang="nl-BE" sz="1200" b="0" i="0" u="none" strike="noStrike" cap="none" normalizeH="0" baseline="0" dirty="0">
+                <a:ln>
+                  <a:noFill/>
+                </a:ln>
+                <a:solidFill>
+                  <a:schemeClr val="tx1"/>
+                </a:solidFill>
+                <a:effectLst/>
+                <a:latin typeface="Times New Roman" panose="02020603050405020304" pitchFamily="18" charset="0"/>
+                <a:cs typeface="Times New Roman" panose="02020603050405020304" pitchFamily="18" charset="0"/>
+              </a:rPr>
+              <a:t>. (</a:t>
+            </a:r>
+            <a:r>
+              <a:rPr kumimoji="0" lang="nl-BE" altLang="nl-BE" sz="1200" b="0" i="0" u="none" strike="noStrike" cap="none" normalizeH="0" baseline="0" dirty="0" err="1">
+                <a:ln>
+                  <a:noFill/>
+                </a:ln>
+                <a:solidFill>
+                  <a:schemeClr val="tx1"/>
+                </a:solidFill>
+                <a:effectLst/>
+                <a:latin typeface="Times New Roman" panose="02020603050405020304" pitchFamily="18" charset="0"/>
+                <a:cs typeface="Times New Roman" panose="02020603050405020304" pitchFamily="18" charset="0"/>
+              </a:rPr>
+              <a:t>n.d</a:t>
+            </a:r>
+            <a:r>
+              <a:rPr kumimoji="0" lang="nl-BE" altLang="nl-BE" sz="1200" b="0" i="0" u="none" strike="noStrike" cap="none" normalizeH="0" baseline="0" dirty="0">
+                <a:ln>
+                  <a:noFill/>
+                </a:ln>
+                <a:solidFill>
+                  <a:schemeClr val="tx1"/>
+                </a:solidFill>
+                <a:effectLst/>
+                <a:latin typeface="Times New Roman" panose="02020603050405020304" pitchFamily="18" charset="0"/>
+                <a:cs typeface="Times New Roman" panose="02020603050405020304" pitchFamily="18" charset="0"/>
+              </a:rPr>
+              <a:t>.). </a:t>
+            </a:r>
+            <a:r>
+              <a:rPr kumimoji="0" lang="nl-BE" altLang="nl-BE" sz="1200" b="0" i="0" u="none" strike="noStrike" cap="none" normalizeH="0" baseline="0" dirty="0" err="1">
+                <a:ln>
+                  <a:noFill/>
+                </a:ln>
+                <a:solidFill>
+                  <a:schemeClr val="tx1"/>
+                </a:solidFill>
+                <a:effectLst/>
+                <a:latin typeface="Times New Roman" panose="02020603050405020304" pitchFamily="18" charset="0"/>
+                <a:cs typeface="Times New Roman" panose="02020603050405020304" pitchFamily="18" charset="0"/>
+              </a:rPr>
+              <a:t>UHasselt</a:t>
+            </a:r>
+            <a:r>
+              <a:rPr kumimoji="0" lang="nl-BE" altLang="nl-BE" sz="1200" b="0" i="0" u="none" strike="noStrike" cap="none" normalizeH="0" baseline="0" dirty="0">
+                <a:ln>
+                  <a:noFill/>
+                </a:ln>
+                <a:solidFill>
+                  <a:schemeClr val="tx1"/>
+                </a:solidFill>
+                <a:effectLst/>
+                <a:latin typeface="Times New Roman" panose="02020603050405020304" pitchFamily="18" charset="0"/>
+                <a:cs typeface="Times New Roman" panose="02020603050405020304" pitchFamily="18" charset="0"/>
+              </a:rPr>
+              <a:t>. </a:t>
+            </a:r>
+            <a:r>
+              <a:rPr kumimoji="0" lang="nl-BE" altLang="nl-BE" sz="1200" b="0" i="0" u="none" strike="noStrike" cap="none" normalizeH="0" baseline="0" dirty="0">
+                <a:ln>
+                  <a:noFill/>
+                </a:ln>
+                <a:solidFill>
+                  <a:schemeClr val="tx1"/>
+                </a:solidFill>
+                <a:effectLst/>
+                <a:latin typeface="Times New Roman" panose="02020603050405020304" pitchFamily="18" charset="0"/>
+                <a:cs typeface="Times New Roman" panose="02020603050405020304" pitchFamily="18" charset="0"/>
+                <a:hlinkClick r:id="rId12"/>
+              </a:rPr>
+              <a:t>https://www.uhasselt.be/nl/onderzoeksgroepen/reval/technologie-ondersteunde-revalidatie</a:t>
+            </a:r>
+            <a:r>
+              <a:rPr kumimoji="0" lang="nl-BE" altLang="nl-BE" sz="1200" b="0" i="0" u="none" strike="noStrike" cap="none" normalizeH="0" baseline="0" dirty="0">
+                <a:ln>
+                  <a:noFill/>
+                </a:ln>
+                <a:solidFill>
+                  <a:schemeClr val="tx1"/>
+                </a:solidFill>
+                <a:effectLst/>
+                <a:latin typeface="Times New Roman" panose="02020603050405020304" pitchFamily="18" charset="0"/>
+                <a:cs typeface="Times New Roman" panose="02020603050405020304" pitchFamily="18" charset="0"/>
+              </a:rPr>
+              <a:t> </a:t>
+            </a:r>
+            <a:endParaRPr kumimoji="0" lang="nl-BE" altLang="nl-BE" sz="600" b="0" i="0" u="none" strike="noStrike" cap="none" normalizeH="0" baseline="0" dirty="0">
+              <a:ln>
+                <a:noFill/>
+              </a:ln>
+              <a:solidFill>
+                <a:schemeClr val="tx1"/>
+              </a:solidFill>
+              <a:effectLst/>
+            </a:endParaRPr>
+          </a:p>
+          <a:p>
+            <a:pPr defTabSz="914400">
+              <a:buClrTx/>
+              <a:buSzTx/>
+            </a:pPr>
+            <a:r>
+              <a:rPr kumimoji="0" lang="nl-BE" altLang="nl-BE" sz="1200" b="0" i="0" u="none" strike="noStrike" cap="none" normalizeH="0" baseline="0" dirty="0">
+                <a:ln>
+                  <a:noFill/>
+                </a:ln>
+                <a:solidFill>
+                  <a:schemeClr val="tx1"/>
+                </a:solidFill>
+                <a:effectLst/>
+                <a:latin typeface="Times New Roman" panose="02020603050405020304" pitchFamily="18" charset="0"/>
+                <a:cs typeface="Times New Roman" panose="02020603050405020304" pitchFamily="18" charset="0"/>
+              </a:rPr>
+              <a:t>UZ Antwerpen. (</a:t>
+            </a:r>
+            <a:r>
+              <a:rPr kumimoji="0" lang="nl-BE" altLang="nl-BE" sz="1200" b="0" i="0" u="none" strike="noStrike" cap="none" normalizeH="0" baseline="0" dirty="0" err="1">
+                <a:ln>
+                  <a:noFill/>
+                </a:ln>
+                <a:solidFill>
+                  <a:schemeClr val="tx1"/>
+                </a:solidFill>
+                <a:effectLst/>
+                <a:latin typeface="Times New Roman" panose="02020603050405020304" pitchFamily="18" charset="0"/>
+                <a:cs typeface="Times New Roman" panose="02020603050405020304" pitchFamily="18" charset="0"/>
+              </a:rPr>
+              <a:t>n.d</a:t>
+            </a:r>
+            <a:r>
+              <a:rPr kumimoji="0" lang="nl-BE" altLang="nl-BE" sz="1200" b="0" i="0" u="none" strike="noStrike" cap="none" normalizeH="0" baseline="0" dirty="0">
+                <a:ln>
+                  <a:noFill/>
+                </a:ln>
+                <a:solidFill>
+                  <a:schemeClr val="tx1"/>
+                </a:solidFill>
+                <a:effectLst/>
+                <a:latin typeface="Times New Roman" panose="02020603050405020304" pitchFamily="18" charset="0"/>
+                <a:cs typeface="Times New Roman" panose="02020603050405020304" pitchFamily="18" charset="0"/>
+              </a:rPr>
+              <a:t>.). </a:t>
+            </a:r>
+            <a:r>
+              <a:rPr kumimoji="0" lang="nl-BE" altLang="nl-BE" sz="1200" b="0" i="1" u="none" strike="noStrike" cap="none" normalizeH="0" baseline="0" dirty="0">
+                <a:ln>
+                  <a:noFill/>
+                </a:ln>
+                <a:solidFill>
+                  <a:schemeClr val="tx1"/>
+                </a:solidFill>
+                <a:effectLst/>
+                <a:latin typeface="Times New Roman" panose="02020603050405020304" pitchFamily="18" charset="0"/>
+                <a:cs typeface="Times New Roman" panose="02020603050405020304" pitchFamily="18" charset="0"/>
+              </a:rPr>
+              <a:t>Sportmedische keuring en preventie | UZA</a:t>
+            </a:r>
+            <a:r>
+              <a:rPr kumimoji="0" lang="nl-BE" altLang="nl-BE" sz="1200" b="0" i="0" u="none" strike="noStrike" cap="none" normalizeH="0" baseline="0" dirty="0">
+                <a:ln>
+                  <a:noFill/>
+                </a:ln>
+                <a:solidFill>
+                  <a:schemeClr val="tx1"/>
+                </a:solidFill>
+                <a:effectLst/>
+                <a:latin typeface="Times New Roman" panose="02020603050405020304" pitchFamily="18" charset="0"/>
+                <a:cs typeface="Times New Roman" panose="02020603050405020304" pitchFamily="18" charset="0"/>
+              </a:rPr>
+              <a:t>. </a:t>
+            </a:r>
+            <a:r>
+              <a:rPr kumimoji="0" lang="nl-BE" altLang="nl-BE" sz="1200" b="0" i="0" u="none" strike="noStrike" cap="none" normalizeH="0" baseline="0" dirty="0">
+                <a:ln>
+                  <a:noFill/>
+                </a:ln>
+                <a:solidFill>
+                  <a:schemeClr val="tx1"/>
+                </a:solidFill>
+                <a:effectLst/>
+                <a:latin typeface="Times New Roman" panose="02020603050405020304" pitchFamily="18" charset="0"/>
+                <a:cs typeface="Times New Roman" panose="02020603050405020304" pitchFamily="18" charset="0"/>
+                <a:hlinkClick r:id="rId13"/>
+              </a:rPr>
+              <a:t>https://www.uza.be/behandeling/sportmedische-keuring-en-preventie</a:t>
+            </a:r>
+            <a:r>
+              <a:rPr kumimoji="0" lang="nl-BE" altLang="nl-BE" sz="1200" b="0" i="0" u="none" strike="noStrike" cap="none" normalizeH="0" baseline="0" dirty="0">
+                <a:ln>
+                  <a:noFill/>
+                </a:ln>
+                <a:solidFill>
+                  <a:schemeClr val="tx1"/>
+                </a:solidFill>
+                <a:effectLst/>
+                <a:latin typeface="Times New Roman" panose="02020603050405020304" pitchFamily="18" charset="0"/>
+                <a:cs typeface="Times New Roman" panose="02020603050405020304" pitchFamily="18" charset="0"/>
+              </a:rPr>
+              <a:t> </a:t>
+            </a:r>
+            <a:endParaRPr kumimoji="0" lang="nl-BE" altLang="nl-BE" sz="1800" b="0" i="0" u="none" strike="noStrike" cap="none" normalizeH="0" baseline="0" dirty="0">
               <a:ln>
                 <a:noFill/>
               </a:ln>

</xml_diff>

<commit_message>
Update text and powerpoint to final version
</commit_message>
<xml_diff>
--- a/Presentatie_powerpoint.pptx
+++ b/Presentatie_powerpoint.pptx
@@ -4437,7 +4437,7 @@
           <a:p>
             <a:fld id="{C722F3E1-CB26-48F9-850F-095D388C7B08}" type="datetimeFigureOut">
               <a:rPr lang="nl-NL" smtClean="0"/>
-              <a:t>10-10-2024</a:t>
+              <a:t>14-10-2024</a:t>
             </a:fld>
             <a:endParaRPr lang="nl-NL"/>
           </a:p>
@@ -5207,6 +5207,90 @@
 </p:notes>
 </file>
 
+<file path=ppt/notesSlides/notesSlide6.xml><?xml version="1.0" encoding="utf-8"?>
+<p:notes xmlns:a="http://schemas.openxmlformats.org/drawingml/2006/main" xmlns:r="http://schemas.openxmlformats.org/officeDocument/2006/relationships" xmlns:p="http://schemas.openxmlformats.org/presentationml/2006/main">
+  <p:cSld>
+    <p:spTree>
+      <p:nvGrpSpPr>
+        <p:cNvPr id="1" name=""/>
+        <p:cNvGrpSpPr/>
+        <p:nvPr/>
+      </p:nvGrpSpPr>
+      <p:grpSpPr>
+        <a:xfrm>
+          <a:off x="0" y="0"/>
+          <a:ext cx="0" cy="0"/>
+          <a:chOff x="0" y="0"/>
+          <a:chExt cx="0" cy="0"/>
+        </a:xfrm>
+      </p:grpSpPr>
+      <p:sp>
+        <p:nvSpPr>
+          <p:cNvPr id="2" name="Tijdelijke aanduiding voor dia-afbeelding 1"/>
+          <p:cNvSpPr>
+            <a:spLocks noGrp="1" noRot="1" noChangeAspect="1"/>
+          </p:cNvSpPr>
+          <p:nvPr>
+            <p:ph type="sldImg"/>
+          </p:nvPr>
+        </p:nvSpPr>
+        <p:spPr/>
+      </p:sp>
+      <p:sp>
+        <p:nvSpPr>
+          <p:cNvPr id="3" name="Tijdelijke aanduiding voor notities 2"/>
+          <p:cNvSpPr>
+            <a:spLocks noGrp="1"/>
+          </p:cNvSpPr>
+          <p:nvPr>
+            <p:ph type="body" idx="1"/>
+          </p:nvPr>
+        </p:nvSpPr>
+        <p:spPr/>
+        <p:txBody>
+          <a:bodyPr/>
+          <a:lstStyle/>
+          <a:p>
+            <a:endParaRPr lang="nl-BE" dirty="0"/>
+          </a:p>
+        </p:txBody>
+      </p:sp>
+      <p:sp>
+        <p:nvSpPr>
+          <p:cNvPr id="4" name="Tijdelijke aanduiding voor dianummer 3"/>
+          <p:cNvSpPr>
+            <a:spLocks noGrp="1"/>
+          </p:cNvSpPr>
+          <p:nvPr>
+            <p:ph type="sldNum" sz="quarter" idx="5"/>
+          </p:nvPr>
+        </p:nvSpPr>
+        <p:spPr/>
+        <p:txBody>
+          <a:bodyPr/>
+          <a:lstStyle/>
+          <a:p>
+            <a:fld id="{AB363037-1310-4CF1-84A3-3BF13FF51853}" type="slidenum">
+              <a:rPr lang="nl-NL" smtClean="0"/>
+              <a:t>7</a:t>
+            </a:fld>
+            <a:endParaRPr lang="nl-NL"/>
+          </a:p>
+        </p:txBody>
+      </p:sp>
+    </p:spTree>
+    <p:extLst>
+      <p:ext uri="{BB962C8B-B14F-4D97-AF65-F5344CB8AC3E}">
+        <p14:creationId xmlns:p14="http://schemas.microsoft.com/office/powerpoint/2010/main" val="3689479409"/>
+      </p:ext>
+    </p:extLst>
+  </p:cSld>
+  <p:clrMapOvr>
+    <a:masterClrMapping/>
+  </p:clrMapOvr>
+</p:notes>
+</file>
+
 <file path=ppt/slideLayouts/slideLayout1.xml><?xml version="1.0" encoding="utf-8"?>
 <p:sldLayout xmlns:a="http://schemas.openxmlformats.org/drawingml/2006/main" xmlns:r="http://schemas.openxmlformats.org/officeDocument/2006/relationships" xmlns:p="http://schemas.openxmlformats.org/presentationml/2006/main" type="title" preserve="1">
   <p:cSld name="Titeldia">
@@ -5437,7 +5521,7 @@
             <a:fld id="{B61BEF0D-F0BB-DE4B-95CE-6DB70DBA9567}" type="datetimeFigureOut">
               <a:rPr lang="en-US" dirty="0"/>
               <a:pPr/>
-              <a:t>10/10/2024</a:t>
+              <a:t>10/14/2024</a:t>
             </a:fld>
             <a:endParaRPr lang="en-US" dirty="0"/>
           </a:p>
@@ -5768,7 +5852,7 @@
             <a:fld id="{B61BEF0D-F0BB-DE4B-95CE-6DB70DBA9567}" type="datetimeFigureOut">
               <a:rPr lang="en-US" dirty="0"/>
               <a:pPr/>
-              <a:t>10/10/2024</a:t>
+              <a:t>10/14/2024</a:t>
             </a:fld>
             <a:endParaRPr lang="en-US" dirty="0"/>
           </a:p>
@@ -6043,7 +6127,7 @@
             <a:fld id="{B61BEF0D-F0BB-DE4B-95CE-6DB70DBA9567}" type="datetimeFigureOut">
               <a:rPr lang="en-US" dirty="0"/>
               <a:pPr/>
-              <a:t>10/10/2024</a:t>
+              <a:t>10/14/2024</a:t>
             </a:fld>
             <a:endParaRPr lang="en-US" dirty="0"/>
           </a:p>
@@ -6608,7 +6692,7 @@
             <a:fld id="{B61BEF0D-F0BB-DE4B-95CE-6DB70DBA9567}" type="datetimeFigureOut">
               <a:rPr lang="en-US" dirty="0"/>
               <a:pPr/>
-              <a:t>10/10/2024</a:t>
+              <a:t>10/14/2024</a:t>
             </a:fld>
             <a:endParaRPr lang="en-US" dirty="0"/>
           </a:p>
@@ -6883,7 +6967,7 @@
             <a:fld id="{B61BEF0D-F0BB-DE4B-95CE-6DB70DBA9567}" type="datetimeFigureOut">
               <a:rPr lang="en-US" dirty="0"/>
               <a:pPr/>
-              <a:t>10/10/2024</a:t>
+              <a:t>10/14/2024</a:t>
             </a:fld>
             <a:endParaRPr lang="en-US" dirty="0"/>
           </a:p>
@@ -7442,7 +7526,7 @@
             <a:fld id="{B61BEF0D-F0BB-DE4B-95CE-6DB70DBA9567}" type="datetimeFigureOut">
               <a:rPr lang="en-US" dirty="0"/>
               <a:pPr/>
-              <a:t>10/10/2024</a:t>
+              <a:t>10/14/2024</a:t>
             </a:fld>
             <a:endParaRPr lang="en-US" dirty="0"/>
           </a:p>
@@ -7766,7 +7850,7 @@
             <a:fld id="{B61BEF0D-F0BB-DE4B-95CE-6DB70DBA9567}" type="datetimeFigureOut">
               <a:rPr lang="en-US" dirty="0"/>
               <a:pPr/>
-              <a:t>10/10/2024</a:t>
+              <a:t>10/14/2024</a:t>
             </a:fld>
             <a:endParaRPr lang="en-US" dirty="0"/>
           </a:p>
@@ -7940,7 +8024,7 @@
             <a:fld id="{B61BEF0D-F0BB-DE4B-95CE-6DB70DBA9567}" type="datetimeFigureOut">
               <a:rPr lang="en-US" dirty="0"/>
               <a:pPr/>
-              <a:t>10/10/2024</a:t>
+              <a:t>10/14/2024</a:t>
             </a:fld>
             <a:endParaRPr lang="en-US" dirty="0"/>
           </a:p>
@@ -8175,7 +8259,7 @@
             <a:fld id="{B61BEF0D-F0BB-DE4B-95CE-6DB70DBA9567}" type="datetimeFigureOut">
               <a:rPr lang="en-US" dirty="0"/>
               <a:pPr/>
-              <a:t>10/10/2024</a:t>
+              <a:t>10/14/2024</a:t>
             </a:fld>
             <a:endParaRPr lang="en-US" dirty="0"/>
           </a:p>
@@ -8372,7 +8456,7 @@
             <a:fld id="{B61BEF0D-F0BB-DE4B-95CE-6DB70DBA9567}" type="datetimeFigureOut">
               <a:rPr lang="en-US" dirty="0"/>
               <a:pPr/>
-              <a:t>10/10/2024</a:t>
+              <a:t>10/14/2024</a:t>
             </a:fld>
             <a:endParaRPr lang="en-US" dirty="0"/>
           </a:p>
@@ -8645,7 +8729,7 @@
             <a:fld id="{B61BEF0D-F0BB-DE4B-95CE-6DB70DBA9567}" type="datetimeFigureOut">
               <a:rPr lang="en-US" dirty="0"/>
               <a:pPr/>
-              <a:t>10/10/2024</a:t>
+              <a:t>10/14/2024</a:t>
             </a:fld>
             <a:endParaRPr lang="en-US" dirty="0"/>
           </a:p>
@@ -8908,7 +8992,7 @@
             <a:fld id="{B61BEF0D-F0BB-DE4B-95CE-6DB70DBA9567}" type="datetimeFigureOut">
               <a:rPr lang="en-US" dirty="0"/>
               <a:pPr/>
-              <a:t>10/10/2024</a:t>
+              <a:t>10/14/2024</a:t>
             </a:fld>
             <a:endParaRPr lang="en-US" dirty="0"/>
           </a:p>
@@ -9279,7 +9363,7 @@
             <a:fld id="{B61BEF0D-F0BB-DE4B-95CE-6DB70DBA9567}" type="datetimeFigureOut">
               <a:rPr lang="en-US" dirty="0"/>
               <a:pPr/>
-              <a:t>10/10/2024</a:t>
+              <a:t>10/14/2024</a:t>
             </a:fld>
             <a:endParaRPr lang="en-US" dirty="0"/>
           </a:p>
@@ -9424,7 +9508,7 @@
             <a:fld id="{B61BEF0D-F0BB-DE4B-95CE-6DB70DBA9567}" type="datetimeFigureOut">
               <a:rPr lang="en-US" dirty="0"/>
               <a:pPr/>
-              <a:t>10/10/2024</a:t>
+              <a:t>10/14/2024</a:t>
             </a:fld>
             <a:endParaRPr lang="en-US" dirty="0"/>
           </a:p>
@@ -9546,7 +9630,7 @@
             <a:fld id="{B61BEF0D-F0BB-DE4B-95CE-6DB70DBA9567}" type="datetimeFigureOut">
               <a:rPr lang="en-US" dirty="0"/>
               <a:pPr/>
-              <a:t>10/10/2024</a:t>
+              <a:t>10/14/2024</a:t>
             </a:fld>
             <a:endParaRPr lang="en-US" dirty="0"/>
           </a:p>
@@ -9828,7 +9912,7 @@
             <a:fld id="{B61BEF0D-F0BB-DE4B-95CE-6DB70DBA9567}" type="datetimeFigureOut">
               <a:rPr lang="en-US" dirty="0"/>
               <a:pPr/>
-              <a:t>10/10/2024</a:t>
+              <a:t>10/14/2024</a:t>
             </a:fld>
             <a:endParaRPr lang="en-US" dirty="0"/>
           </a:p>
@@ -10149,7 +10233,7 @@
             <a:fld id="{B61BEF0D-F0BB-DE4B-95CE-6DB70DBA9567}" type="datetimeFigureOut">
               <a:rPr lang="en-US" dirty="0"/>
               <a:pPr/>
-              <a:t>10/10/2024</a:t>
+              <a:t>10/14/2024</a:t>
             </a:fld>
             <a:endParaRPr lang="en-US" dirty="0"/>
           </a:p>
@@ -10360,7 +10444,7 @@
             <a:fld id="{B61BEF0D-F0BB-DE4B-95CE-6DB70DBA9567}" type="datetimeFigureOut">
               <a:rPr lang="en-US" dirty="0"/>
               <a:pPr/>
-              <a:t>10/10/2024</a:t>
+              <a:t>10/14/2024</a:t>
             </a:fld>
             <a:endParaRPr lang="en-US" dirty="0"/>
           </a:p>
@@ -12395,6 +12479,13 @@
               <a:t>Wedstrijdinfo</a:t>
             </a:r>
           </a:p>
+          <a:p>
+            <a:r>
+              <a:rPr lang="nl-BE" sz="3200" dirty="0" err="1"/>
+              <a:t>Sporza</a:t>
+            </a:r>
+            <a:endParaRPr lang="nl-BE" sz="3200" dirty="0"/>
+          </a:p>
         </p:txBody>
       </p:sp>
       <p:pic>
@@ -12696,7 +12787,12 @@
             <p:ph type="title"/>
           </p:nvPr>
         </p:nvSpPr>
-        <p:spPr/>
+        <p:spPr>
+          <a:xfrm>
+            <a:off x="982981" y="720004"/>
+            <a:ext cx="1764029" cy="1456267"/>
+          </a:xfrm>
+        </p:spPr>
         <p:txBody>
           <a:bodyPr>
             <a:normAutofit/>
@@ -12710,33 +12806,50 @@
           </a:p>
         </p:txBody>
       </p:sp>
-      <p:sp>
-        <p:nvSpPr>
-          <p:cNvPr id="3" name="Tijdelijke aanduiding voor inhoud 2">
+      <p:pic>
+        <p:nvPicPr>
+          <p:cNvPr id="5" name="Afbeelding 4" descr="Afbeelding met hemel, buitenshuis, Achterverlichting, persoon&#10;&#10;Automatisch gegenereerde beschrijving">
             <a:extLst>
               <a:ext uri="{FF2B5EF4-FFF2-40B4-BE49-F238E27FC236}">
-                <a16:creationId xmlns:a16="http://schemas.microsoft.com/office/drawing/2014/main" id="{FDF975E5-9BED-413F-4B6C-4D7CE33314FB}"/>
+                <a16:creationId xmlns:a16="http://schemas.microsoft.com/office/drawing/2014/main" id="{2B89DDA8-2FD8-01EF-37A5-5CED14C086AA}"/>
               </a:ext>
             </a:extLst>
           </p:cNvPr>
-          <p:cNvSpPr>
-            <a:spLocks noGrp="1"/>
-          </p:cNvSpPr>
-          <p:nvPr>
-            <p:ph idx="1"/>
-          </p:nvPr>
-        </p:nvSpPr>
-        <p:spPr/>
-        <p:txBody>
-          <a:bodyPr>
-            <a:normAutofit/>
-          </a:bodyPr>
-          <a:lstStyle/>
-          <a:p>
-            <a:endParaRPr lang="nl-BE" sz="3200" dirty="0"/>
-          </a:p>
-        </p:txBody>
-      </p:sp>
+          <p:cNvPicPr>
+            <a:picLocks noChangeAspect="1"/>
+          </p:cNvPicPr>
+          <p:nvPr/>
+        </p:nvPicPr>
+        <p:blipFill>
+          <a:blip r:embed="rId3">
+            <a:extLst>
+              <a:ext uri="{837473B0-CC2E-450A-ABE3-18F120FF3D39}">
+                <a1611:picAttrSrcUrl xmlns:a1611="http://schemas.microsoft.com/office/drawing/2016/11/main" r:id="rId4"/>
+              </a:ext>
+            </a:extLst>
+          </a:blip>
+          <a:stretch>
+            <a:fillRect/>
+          </a:stretch>
+        </p:blipFill>
+        <p:spPr>
+          <a:xfrm>
+            <a:off x="3491865" y="1688964"/>
+            <a:ext cx="5208270" cy="3480071"/>
+          </a:xfrm>
+          <a:prstGeom prst="rect">
+            <a:avLst/>
+          </a:prstGeom>
+          <a:effectLst>
+            <a:outerShdw blurRad="76200" dir="13500000" sy="23000" kx="1200000" algn="br" rotWithShape="0">
+              <a:prstClr val="black">
+                <a:alpha val="20000"/>
+              </a:prstClr>
+            </a:outerShdw>
+            <a:softEdge rad="63500"/>
+          </a:effectLst>
+        </p:spPr>
+      </p:pic>
     </p:spTree>
     <p:extLst>
       <p:ext uri="{BB962C8B-B14F-4D97-AF65-F5344CB8AC3E}">
@@ -12783,7 +12896,12 @@
             <p:ph type="title"/>
           </p:nvPr>
         </p:nvSpPr>
-        <p:spPr/>
+        <p:spPr>
+          <a:xfrm>
+            <a:off x="685800" y="609600"/>
+            <a:ext cx="10131425" cy="1456267"/>
+          </a:xfrm>
+        </p:spPr>
         <p:txBody>
           <a:bodyPr/>
           <a:lstStyle/>
@@ -12797,24 +12915,22 @@
       </p:sp>
       <p:sp>
         <p:nvSpPr>
-          <p:cNvPr id="3" name="Rectangle 1">
+          <p:cNvPr id="9" name="Rectangle 4">
             <a:extLst>
               <a:ext uri="{FF2B5EF4-FFF2-40B4-BE49-F238E27FC236}">
-                <a16:creationId xmlns:a16="http://schemas.microsoft.com/office/drawing/2014/main" id="{7C25F310-76B6-4506-9528-489F13EC7D1E}"/>
+                <a16:creationId xmlns:a16="http://schemas.microsoft.com/office/drawing/2014/main" id="{9AE6C951-914F-19EC-CBF9-B83DA3FEEE88}"/>
               </a:ext>
             </a:extLst>
           </p:cNvPr>
           <p:cNvSpPr>
-            <a:spLocks noGrp="1" noChangeArrowheads="1"/>
+            <a:spLocks noChangeArrowheads="1"/>
           </p:cNvSpPr>
-          <p:nvPr>
-            <p:ph idx="1"/>
-          </p:nvPr>
+          <p:nvPr/>
         </p:nvSpPr>
         <p:spPr bwMode="auto">
           <a:xfrm>
-            <a:off x="685800" y="2760742"/>
-            <a:ext cx="21491221" cy="2215991"/>
+            <a:off x="902524" y="2510961"/>
+            <a:ext cx="23097506" cy="2585323"/>
           </a:xfrm>
           <a:prstGeom prst="rect">
             <a:avLst/>
@@ -12854,7 +12970,7 @@
           </a:extLst>
         </p:spPr>
         <p:txBody>
-          <a:bodyPr vert="horz" wrap="none" lIns="-457056" tIns="0" rIns="91440" bIns="0" numCol="1" anchor="ctr" anchorCtr="0" compatLnSpc="1">
+          <a:bodyPr vert="horz" wrap="square" lIns="-457056" tIns="0" rIns="91440" bIns="0" numCol="1" anchor="ctr" anchorCtr="0" compatLnSpc="1">
             <a:prstTxWarp prst="textNoShape">
               <a:avLst/>
             </a:prstTxWarp>
@@ -12989,9 +13105,21 @@
             </a:lvl9pPr>
           </a:lstStyle>
           <a:p>
-            <a:pPr defTabSz="914400">
+            <a:pPr marL="171450" marR="0" lvl="0" indent="-171450" algn="l" defTabSz="914400" rtl="0" eaLnBrk="0" fontAlgn="base" latinLnBrk="0" hangingPunct="0">
+              <a:lnSpc>
+                <a:spcPct val="100000"/>
+              </a:lnSpc>
+              <a:spcBef>
+                <a:spcPct val="0"/>
+              </a:spcBef>
+              <a:spcAft>
+                <a:spcPct val="0"/>
+              </a:spcAft>
               <a:buClrTx/>
               <a:buSzTx/>
+              <a:buFont typeface="Arial" panose="020B0604020202020204" pitchFamily="34" charset="0"/>
+              <a:buChar char="•"/>
+              <a:tabLst/>
             </a:pPr>
             <a:r>
               <a:rPr kumimoji="0" lang="nl-BE" altLang="nl-BE" sz="1200" b="0" i="1" u="none" strike="noStrike" cap="none" normalizeH="0" baseline="0" dirty="0">
@@ -13089,9 +13217,21 @@
             </a:endParaRPr>
           </a:p>
           <a:p>
-            <a:pPr defTabSz="914400">
+            <a:pPr marL="171450" marR="0" lvl="0" indent="-171450" algn="l" defTabSz="914400" rtl="0" eaLnBrk="0" fontAlgn="base" latinLnBrk="0" hangingPunct="0">
+              <a:lnSpc>
+                <a:spcPct val="100000"/>
+              </a:lnSpc>
+              <a:spcBef>
+                <a:spcPct val="0"/>
+              </a:spcBef>
+              <a:spcAft>
+                <a:spcPct val="0"/>
+              </a:spcAft>
               <a:buClrTx/>
               <a:buSzTx/>
+              <a:buFont typeface="Arial" panose="020B0604020202020204" pitchFamily="34" charset="0"/>
+              <a:buChar char="•"/>
+              <a:tabLst/>
             </a:pPr>
             <a:r>
               <a:rPr kumimoji="0" lang="nl-BE" altLang="nl-BE" sz="1200" b="0" i="0" u="none" strike="noStrike" cap="none" normalizeH="0" baseline="0" dirty="0" err="1">
@@ -13441,9 +13581,21 @@
             </a:endParaRPr>
           </a:p>
           <a:p>
-            <a:pPr defTabSz="914400">
+            <a:pPr marL="171450" marR="0" lvl="0" indent="-171450" algn="l" defTabSz="914400" rtl="0" eaLnBrk="0" fontAlgn="base" latinLnBrk="0" hangingPunct="0">
+              <a:lnSpc>
+                <a:spcPct val="100000"/>
+              </a:lnSpc>
+              <a:spcBef>
+                <a:spcPct val="0"/>
+              </a:spcBef>
+              <a:spcAft>
+                <a:spcPct val="0"/>
+              </a:spcAft>
               <a:buClrTx/>
               <a:buSzTx/>
+              <a:buFont typeface="Arial" panose="020B0604020202020204" pitchFamily="34" charset="0"/>
+              <a:buChar char="•"/>
+              <a:tabLst/>
             </a:pPr>
             <a:r>
               <a:rPr kumimoji="0" lang="nl-BE" altLang="nl-BE" sz="1200" b="0" i="0" u="none" strike="noStrike" cap="none" normalizeH="0" baseline="0" dirty="0">
@@ -13555,9 +13707,21 @@
             </a:endParaRPr>
           </a:p>
           <a:p>
-            <a:pPr defTabSz="914400">
+            <a:pPr marL="171450" marR="0" lvl="0" indent="-171450" algn="l" defTabSz="914400" rtl="0" eaLnBrk="0" fontAlgn="base" latinLnBrk="0" hangingPunct="0">
+              <a:lnSpc>
+                <a:spcPct val="100000"/>
+              </a:lnSpc>
+              <a:spcBef>
+                <a:spcPct val="0"/>
+              </a:spcBef>
+              <a:spcAft>
+                <a:spcPct val="0"/>
+              </a:spcAft>
               <a:buClrTx/>
               <a:buSzTx/>
+              <a:buFont typeface="Arial" panose="020B0604020202020204" pitchFamily="34" charset="0"/>
+              <a:buChar char="•"/>
+              <a:tabLst/>
             </a:pPr>
             <a:r>
               <a:rPr kumimoji="0" lang="nl-BE" altLang="nl-BE" sz="1200" b="0" i="0" u="none" strike="noStrike" cap="none" normalizeH="0" baseline="0" dirty="0">
@@ -13697,9 +13861,21 @@
             </a:endParaRPr>
           </a:p>
           <a:p>
-            <a:pPr defTabSz="914400">
+            <a:pPr marL="171450" marR="0" lvl="0" indent="-171450" algn="l" defTabSz="914400" rtl="0" eaLnBrk="0" fontAlgn="base" latinLnBrk="0" hangingPunct="0">
+              <a:lnSpc>
+                <a:spcPct val="100000"/>
+              </a:lnSpc>
+              <a:spcBef>
+                <a:spcPct val="0"/>
+              </a:spcBef>
+              <a:spcAft>
+                <a:spcPct val="0"/>
+              </a:spcAft>
               <a:buClrTx/>
               <a:buSzTx/>
+              <a:buFont typeface="Arial" panose="020B0604020202020204" pitchFamily="34" charset="0"/>
+              <a:buChar char="•"/>
+              <a:tabLst/>
             </a:pPr>
             <a:r>
               <a:rPr kumimoji="0" lang="nl-BE" altLang="nl-BE" sz="1200" b="0" i="0" u="none" strike="noStrike" cap="none" normalizeH="0" baseline="0" dirty="0">
@@ -13783,9 +13959,21 @@
             </a:endParaRPr>
           </a:p>
           <a:p>
-            <a:pPr defTabSz="914400">
+            <a:pPr marL="171450" marR="0" lvl="0" indent="-171450" algn="l" defTabSz="914400" rtl="0" eaLnBrk="0" fontAlgn="base" latinLnBrk="0" hangingPunct="0">
+              <a:lnSpc>
+                <a:spcPct val="100000"/>
+              </a:lnSpc>
+              <a:spcBef>
+                <a:spcPct val="0"/>
+              </a:spcBef>
+              <a:spcAft>
+                <a:spcPct val="0"/>
+              </a:spcAft>
               <a:buClrTx/>
               <a:buSzTx/>
+              <a:buFont typeface="Arial" panose="020B0604020202020204" pitchFamily="34" charset="0"/>
+              <a:buChar char="•"/>
+              <a:tabLst/>
             </a:pPr>
             <a:r>
               <a:rPr kumimoji="0" lang="nl-BE" altLang="nl-BE" sz="1200" b="0" i="1" u="none" strike="noStrike" cap="none" normalizeH="0" baseline="0" dirty="0" err="1">
@@ -13911,9 +14099,21 @@
             </a:endParaRPr>
           </a:p>
           <a:p>
-            <a:pPr defTabSz="914400">
+            <a:pPr marL="171450" marR="0" lvl="0" indent="-171450" algn="l" defTabSz="914400" rtl="0" eaLnBrk="0" fontAlgn="base" latinLnBrk="0" hangingPunct="0">
+              <a:lnSpc>
+                <a:spcPct val="100000"/>
+              </a:lnSpc>
+              <a:spcBef>
+                <a:spcPct val="0"/>
+              </a:spcBef>
+              <a:spcAft>
+                <a:spcPct val="0"/>
+              </a:spcAft>
               <a:buClrTx/>
               <a:buSzTx/>
+              <a:buFont typeface="Arial" panose="020B0604020202020204" pitchFamily="34" charset="0"/>
+              <a:buChar char="•"/>
+              <a:tabLst/>
             </a:pPr>
             <a:r>
               <a:rPr kumimoji="0" lang="nl-BE" altLang="nl-BE" sz="1200" b="0" i="1" u="none" strike="noStrike" cap="none" normalizeH="0" baseline="0" dirty="0">
@@ -14011,9 +14211,21 @@
             </a:endParaRPr>
           </a:p>
           <a:p>
-            <a:pPr defTabSz="914400">
+            <a:pPr marL="171450" marR="0" lvl="0" indent="-171450" algn="l" defTabSz="914400" rtl="0" eaLnBrk="0" fontAlgn="base" latinLnBrk="0" hangingPunct="0">
+              <a:lnSpc>
+                <a:spcPct val="100000"/>
+              </a:lnSpc>
+              <a:spcBef>
+                <a:spcPct val="0"/>
+              </a:spcBef>
+              <a:spcAft>
+                <a:spcPct val="0"/>
+              </a:spcAft>
               <a:buClrTx/>
               <a:buSzTx/>
+              <a:buFont typeface="Arial" panose="020B0604020202020204" pitchFamily="34" charset="0"/>
+              <a:buChar char="•"/>
+              <a:tabLst/>
             </a:pPr>
             <a:r>
               <a:rPr kumimoji="0" lang="nl-BE" altLang="nl-BE" sz="1200" b="0" i="1" u="none" strike="noStrike" cap="none" normalizeH="0" baseline="0" dirty="0">
@@ -14111,9 +14323,21 @@
             </a:endParaRPr>
           </a:p>
           <a:p>
-            <a:pPr defTabSz="914400">
+            <a:pPr marL="171450" marR="0" lvl="0" indent="-171450" algn="l" defTabSz="914400" rtl="0" eaLnBrk="0" fontAlgn="base" latinLnBrk="0" hangingPunct="0">
+              <a:lnSpc>
+                <a:spcPct val="100000"/>
+              </a:lnSpc>
+              <a:spcBef>
+                <a:spcPct val="0"/>
+              </a:spcBef>
+              <a:spcAft>
+                <a:spcPct val="0"/>
+              </a:spcAft>
               <a:buClrTx/>
               <a:buSzTx/>
+              <a:buFont typeface="Arial" panose="020B0604020202020204" pitchFamily="34" charset="0"/>
+              <a:buChar char="•"/>
+              <a:tabLst/>
             </a:pPr>
             <a:r>
               <a:rPr kumimoji="0" lang="nl-BE" altLang="nl-BE" sz="1200" b="0" i="1" u="none" strike="noStrike" cap="none" normalizeH="0" baseline="0" dirty="0" err="1">
@@ -14211,12 +14435,24 @@
             </a:endParaRPr>
           </a:p>
           <a:p>
-            <a:pPr defTabSz="914400">
+            <a:pPr marL="171450" marR="0" lvl="0" indent="-171450" algn="l" defTabSz="914400" rtl="0" eaLnBrk="0" fontAlgn="base" latinLnBrk="0" hangingPunct="0">
+              <a:lnSpc>
+                <a:spcPct val="100000"/>
+              </a:lnSpc>
+              <a:spcBef>
+                <a:spcPct val="0"/>
+              </a:spcBef>
+              <a:spcAft>
+                <a:spcPct val="0"/>
+              </a:spcAft>
               <a:buClrTx/>
               <a:buSzTx/>
+              <a:buFont typeface="Arial" panose="020B0604020202020204" pitchFamily="34" charset="0"/>
+              <a:buChar char="•"/>
+              <a:tabLst/>
             </a:pPr>
             <a:r>
-              <a:rPr kumimoji="0" lang="nl-BE" altLang="nl-BE" sz="1200" b="0" i="0" u="none" strike="noStrike" cap="none" normalizeH="0" baseline="0" dirty="0" err="1">
+              <a:rPr kumimoji="0" lang="nl-BE" altLang="nl-BE" sz="1200" b="0" i="1" u="none" strike="noStrike" cap="none" normalizeH="0" baseline="0" dirty="0">
                 <a:ln>
                   <a:noFill/>
                 </a:ln>
@@ -14227,7 +14463,35 @@
                 <a:latin typeface="Times New Roman" panose="02020603050405020304" pitchFamily="18" charset="0"/>
                 <a:cs typeface="Times New Roman" panose="02020603050405020304" pitchFamily="18" charset="0"/>
               </a:rPr>
-              <a:t>Ruddock</a:t>
+              <a:t>Royal </a:t>
+            </a:r>
+            <a:r>
+              <a:rPr kumimoji="0" lang="nl-BE" altLang="nl-BE" sz="1200" b="0" i="1" u="none" strike="noStrike" cap="none" normalizeH="0" baseline="0" dirty="0" err="1">
+                <a:ln>
+                  <a:noFill/>
+                </a:ln>
+                <a:solidFill>
+                  <a:schemeClr val="tx1"/>
+                </a:solidFill>
+                <a:effectLst/>
+                <a:latin typeface="Times New Roman" panose="02020603050405020304" pitchFamily="18" charset="0"/>
+                <a:cs typeface="Times New Roman" panose="02020603050405020304" pitchFamily="18" charset="0"/>
+              </a:rPr>
+              <a:t>Belgian</a:t>
+            </a:r>
+            <a:r>
+              <a:rPr kumimoji="0" lang="nl-BE" altLang="nl-BE" sz="1200" b="0" i="1" u="none" strike="noStrike" cap="none" normalizeH="0" baseline="0" dirty="0">
+                <a:ln>
+                  <a:noFill/>
+                </a:ln>
+                <a:solidFill>
+                  <a:schemeClr val="tx1"/>
+                </a:solidFill>
+                <a:effectLst/>
+                <a:latin typeface="Times New Roman" panose="02020603050405020304" pitchFamily="18" charset="0"/>
+                <a:cs typeface="Times New Roman" panose="02020603050405020304" pitchFamily="18" charset="0"/>
+              </a:rPr>
+              <a:t> FA</a:t>
             </a:r>
             <a:r>
               <a:rPr kumimoji="0" lang="nl-BE" altLang="nl-BE" sz="1200" b="0" i="0" u="none" strike="noStrike" cap="none" normalizeH="0" baseline="0" dirty="0">
@@ -14241,7 +14505,7 @@
                 <a:latin typeface="Times New Roman" panose="02020603050405020304" pitchFamily="18" charset="0"/>
                 <a:cs typeface="Times New Roman" panose="02020603050405020304" pitchFamily="18" charset="0"/>
               </a:rPr>
-              <a:t>, J. (</a:t>
+              <a:t>. (</a:t>
             </a:r>
             <a:r>
               <a:rPr kumimoji="0" lang="nl-BE" altLang="nl-BE" sz="1200" b="0" i="0" u="none" strike="noStrike" cap="none" normalizeH="0" baseline="0" dirty="0" err="1">
@@ -14272,216 +14536,6 @@
               <a:t>.). </a:t>
             </a:r>
             <a:r>
-              <a:rPr kumimoji="0" lang="nl-BE" altLang="nl-BE" sz="1200" b="0" i="1" u="none" strike="noStrike" cap="none" normalizeH="0" baseline="0" dirty="0">
-                <a:ln>
-                  <a:noFill/>
-                </a:ln>
-                <a:solidFill>
-                  <a:schemeClr val="tx1"/>
-                </a:solidFill>
-                <a:effectLst/>
-                <a:latin typeface="Times New Roman" panose="02020603050405020304" pitchFamily="18" charset="0"/>
-                <a:cs typeface="Times New Roman" panose="02020603050405020304" pitchFamily="18" charset="0"/>
-              </a:rPr>
-              <a:t>Research </a:t>
-            </a:r>
-            <a:r>
-              <a:rPr kumimoji="0" lang="nl-BE" altLang="nl-BE" sz="1200" b="0" i="1" u="none" strike="noStrike" cap="none" normalizeH="0" baseline="0" dirty="0" err="1">
-                <a:ln>
-                  <a:noFill/>
-                </a:ln>
-                <a:solidFill>
-                  <a:schemeClr val="tx1"/>
-                </a:solidFill>
-                <a:effectLst/>
-                <a:latin typeface="Times New Roman" panose="02020603050405020304" pitchFamily="18" charset="0"/>
-                <a:cs typeface="Times New Roman" panose="02020603050405020304" pitchFamily="18" charset="0"/>
-              </a:rPr>
-              <a:t>reveals</a:t>
-            </a:r>
-            <a:r>
-              <a:rPr kumimoji="0" lang="nl-BE" altLang="nl-BE" sz="1200" b="0" i="1" u="none" strike="noStrike" cap="none" normalizeH="0" baseline="0" dirty="0">
-                <a:ln>
-                  <a:noFill/>
-                </a:ln>
-                <a:solidFill>
-                  <a:schemeClr val="tx1"/>
-                </a:solidFill>
-                <a:effectLst/>
-                <a:latin typeface="Times New Roman" panose="02020603050405020304" pitchFamily="18" charset="0"/>
-                <a:cs typeface="Times New Roman" panose="02020603050405020304" pitchFamily="18" charset="0"/>
-              </a:rPr>
-              <a:t> </a:t>
-            </a:r>
-            <a:r>
-              <a:rPr kumimoji="0" lang="nl-BE" altLang="nl-BE" sz="1200" b="0" i="1" u="none" strike="noStrike" cap="none" normalizeH="0" baseline="0" dirty="0" err="1">
-                <a:ln>
-                  <a:noFill/>
-                </a:ln>
-                <a:solidFill>
-                  <a:schemeClr val="tx1"/>
-                </a:solidFill>
-                <a:effectLst/>
-                <a:latin typeface="Times New Roman" panose="02020603050405020304" pitchFamily="18" charset="0"/>
-                <a:cs typeface="Times New Roman" panose="02020603050405020304" pitchFamily="18" charset="0"/>
-              </a:rPr>
-              <a:t>massive</a:t>
-            </a:r>
-            <a:r>
-              <a:rPr kumimoji="0" lang="nl-BE" altLang="nl-BE" sz="1200" b="0" i="1" u="none" strike="noStrike" cap="none" normalizeH="0" baseline="0" dirty="0">
-                <a:ln>
-                  <a:noFill/>
-                </a:ln>
-                <a:solidFill>
-                  <a:schemeClr val="tx1"/>
-                </a:solidFill>
-                <a:effectLst/>
-                <a:latin typeface="Times New Roman" panose="02020603050405020304" pitchFamily="18" charset="0"/>
-                <a:cs typeface="Times New Roman" panose="02020603050405020304" pitchFamily="18" charset="0"/>
-              </a:rPr>
-              <a:t> </a:t>
-            </a:r>
-            <a:r>
-              <a:rPr kumimoji="0" lang="nl-BE" altLang="nl-BE" sz="1200" b="0" i="1" u="none" strike="noStrike" cap="none" normalizeH="0" baseline="0" dirty="0" err="1">
-                <a:ln>
-                  <a:noFill/>
-                </a:ln>
-                <a:solidFill>
-                  <a:schemeClr val="tx1"/>
-                </a:solidFill>
-                <a:effectLst/>
-                <a:latin typeface="Times New Roman" panose="02020603050405020304" pitchFamily="18" charset="0"/>
-                <a:cs typeface="Times New Roman" panose="02020603050405020304" pitchFamily="18" charset="0"/>
-              </a:rPr>
-              <a:t>increase</a:t>
-            </a:r>
-            <a:r>
-              <a:rPr kumimoji="0" lang="nl-BE" altLang="nl-BE" sz="1200" b="0" i="1" u="none" strike="noStrike" cap="none" normalizeH="0" baseline="0" dirty="0">
-                <a:ln>
-                  <a:noFill/>
-                </a:ln>
-                <a:solidFill>
-                  <a:schemeClr val="tx1"/>
-                </a:solidFill>
-                <a:effectLst/>
-                <a:latin typeface="Times New Roman" panose="02020603050405020304" pitchFamily="18" charset="0"/>
-                <a:cs typeface="Times New Roman" panose="02020603050405020304" pitchFamily="18" charset="0"/>
-              </a:rPr>
-              <a:t> in </a:t>
-            </a:r>
-            <a:r>
-              <a:rPr kumimoji="0" lang="nl-BE" altLang="nl-BE" sz="1200" b="0" i="1" u="none" strike="noStrike" cap="none" normalizeH="0" baseline="0" dirty="0" err="1">
-                <a:ln>
-                  <a:noFill/>
-                </a:ln>
-                <a:solidFill>
-                  <a:schemeClr val="tx1"/>
-                </a:solidFill>
-                <a:effectLst/>
-                <a:latin typeface="Times New Roman" panose="02020603050405020304" pitchFamily="18" charset="0"/>
-                <a:cs typeface="Times New Roman" panose="02020603050405020304" pitchFamily="18" charset="0"/>
-              </a:rPr>
-              <a:t>number</a:t>
-            </a:r>
-            <a:r>
-              <a:rPr kumimoji="0" lang="nl-BE" altLang="nl-BE" sz="1200" b="0" i="1" u="none" strike="noStrike" cap="none" normalizeH="0" baseline="0" dirty="0">
-                <a:ln>
-                  <a:noFill/>
-                </a:ln>
-                <a:solidFill>
-                  <a:schemeClr val="tx1"/>
-                </a:solidFill>
-                <a:effectLst/>
-                <a:latin typeface="Times New Roman" panose="02020603050405020304" pitchFamily="18" charset="0"/>
-                <a:cs typeface="Times New Roman" panose="02020603050405020304" pitchFamily="18" charset="0"/>
-              </a:rPr>
-              <a:t> of fans live streaming </a:t>
-            </a:r>
-            <a:r>
-              <a:rPr kumimoji="0" lang="nl-BE" altLang="nl-BE" sz="1200" b="0" i="1" u="none" strike="noStrike" cap="none" normalizeH="0" baseline="0" dirty="0" err="1">
-                <a:ln>
-                  <a:noFill/>
-                </a:ln>
-                <a:solidFill>
-                  <a:schemeClr val="tx1"/>
-                </a:solidFill>
-                <a:effectLst/>
-                <a:latin typeface="Times New Roman" panose="02020603050405020304" pitchFamily="18" charset="0"/>
-                <a:cs typeface="Times New Roman" panose="02020603050405020304" pitchFamily="18" charset="0"/>
-              </a:rPr>
-              <a:t>football</a:t>
-            </a:r>
-            <a:r>
-              <a:rPr kumimoji="0" lang="nl-BE" altLang="nl-BE" sz="1200" b="0" i="1" u="none" strike="noStrike" cap="none" normalizeH="0" baseline="0" dirty="0">
-                <a:ln>
-                  <a:noFill/>
-                </a:ln>
-                <a:solidFill>
-                  <a:schemeClr val="tx1"/>
-                </a:solidFill>
-                <a:effectLst/>
-                <a:latin typeface="Times New Roman" panose="02020603050405020304" pitchFamily="18" charset="0"/>
-                <a:cs typeface="Times New Roman" panose="02020603050405020304" pitchFamily="18" charset="0"/>
-              </a:rPr>
-              <a:t> </a:t>
-            </a:r>
-            <a:r>
-              <a:rPr kumimoji="0" lang="nl-BE" altLang="nl-BE" sz="1200" b="0" i="1" u="none" strike="noStrike" cap="none" normalizeH="0" baseline="0" dirty="0" err="1">
-                <a:ln>
-                  <a:noFill/>
-                </a:ln>
-                <a:solidFill>
-                  <a:schemeClr val="tx1"/>
-                </a:solidFill>
-                <a:effectLst/>
-                <a:latin typeface="Times New Roman" panose="02020603050405020304" pitchFamily="18" charset="0"/>
-                <a:cs typeface="Times New Roman" panose="02020603050405020304" pitchFamily="18" charset="0"/>
-              </a:rPr>
-              <a:t>from</a:t>
-            </a:r>
-            <a:r>
-              <a:rPr kumimoji="0" lang="nl-BE" altLang="nl-BE" sz="1200" b="0" i="1" u="none" strike="noStrike" cap="none" normalizeH="0" baseline="0" dirty="0">
-                <a:ln>
-                  <a:noFill/>
-                </a:ln>
-                <a:solidFill>
-                  <a:schemeClr val="tx1"/>
-                </a:solidFill>
-                <a:effectLst/>
-                <a:latin typeface="Times New Roman" panose="02020603050405020304" pitchFamily="18" charset="0"/>
-                <a:cs typeface="Times New Roman" panose="02020603050405020304" pitchFamily="18" charset="0"/>
-              </a:rPr>
-              <a:t> home post-</a:t>
-            </a:r>
-            <a:r>
-              <a:rPr kumimoji="0" lang="nl-BE" altLang="nl-BE" sz="1200" b="0" i="1" u="none" strike="noStrike" cap="none" normalizeH="0" baseline="0" dirty="0" err="1">
-                <a:ln>
-                  <a:noFill/>
-                </a:ln>
-                <a:solidFill>
-                  <a:schemeClr val="tx1"/>
-                </a:solidFill>
-                <a:effectLst/>
-                <a:latin typeface="Times New Roman" panose="02020603050405020304" pitchFamily="18" charset="0"/>
-                <a:cs typeface="Times New Roman" panose="02020603050405020304" pitchFamily="18" charset="0"/>
-              </a:rPr>
-              <a:t>pandemic</a:t>
-            </a:r>
-            <a:r>
-              <a:rPr kumimoji="0" lang="nl-BE" altLang="nl-BE" sz="1200" b="0" i="0" u="none" strike="noStrike" cap="none" normalizeH="0" baseline="0" dirty="0">
-                <a:ln>
-                  <a:noFill/>
-                </a:ln>
-                <a:solidFill>
-                  <a:schemeClr val="tx1"/>
-                </a:solidFill>
-                <a:effectLst/>
-                <a:latin typeface="Times New Roman" panose="02020603050405020304" pitchFamily="18" charset="0"/>
-                <a:cs typeface="Times New Roman" panose="02020603050405020304" pitchFamily="18" charset="0"/>
-              </a:rPr>
-              <a:t>. SVG Europe. </a:t>
-            </a:r>
-            <a:r>
               <a:rPr kumimoji="0" lang="nl-BE" altLang="nl-BE" sz="1200" b="0" i="0" u="none" strike="noStrike" cap="none" normalizeH="0" baseline="0" dirty="0">
                 <a:ln>
                   <a:noFill/>
@@ -14494,7 +14548,7 @@
                 <a:cs typeface="Times New Roman" panose="02020603050405020304" pitchFamily="18" charset="0"/>
                 <a:hlinkClick r:id="rId11"/>
               </a:rPr>
-              <a:t>https://www.svgeurope.org/blog/headlines/research-reveals-massive-increase-in-number-of-fans-live-streaming-football-from-home-post-pandemic/</a:t>
+              <a:t>https://www.rbfa.be/nl/nationale-ploegen/rode-duivels</a:t>
             </a:r>
             <a:r>
               <a:rPr kumimoji="0" lang="nl-BE" altLang="nl-BE" sz="1200" b="0" i="0" u="none" strike="noStrike" cap="none" normalizeH="0" baseline="0" dirty="0">
@@ -14521,12 +14575,24 @@
             </a:endParaRPr>
           </a:p>
           <a:p>
-            <a:pPr defTabSz="914400">
+            <a:pPr marL="171450" marR="0" lvl="0" indent="-171450" algn="l" defTabSz="914400" rtl="0" eaLnBrk="0" fontAlgn="base" latinLnBrk="0" hangingPunct="0">
+              <a:lnSpc>
+                <a:spcPct val="100000"/>
+              </a:lnSpc>
+              <a:spcBef>
+                <a:spcPct val="0"/>
+              </a:spcBef>
+              <a:spcAft>
+                <a:spcPct val="0"/>
+              </a:spcAft>
               <a:buClrTx/>
               <a:buSzTx/>
+              <a:buFont typeface="Arial" panose="020B0604020202020204" pitchFamily="34" charset="0"/>
+              <a:buChar char="•"/>
+              <a:tabLst/>
             </a:pPr>
             <a:r>
-              <a:rPr kumimoji="0" lang="nl-BE" altLang="nl-BE" sz="1200" b="0" i="1" u="none" strike="noStrike" cap="none" normalizeH="0" baseline="0" dirty="0">
+              <a:rPr kumimoji="0" lang="nl-BE" altLang="nl-BE" sz="1200" b="0" i="0" u="none" strike="noStrike" cap="none" normalizeH="0" baseline="0" dirty="0" err="1">
                 <a:ln>
                   <a:noFill/>
                 </a:ln>
@@ -14537,10 +14603,10 @@
                 <a:latin typeface="Times New Roman" panose="02020603050405020304" pitchFamily="18" charset="0"/>
                 <a:cs typeface="Times New Roman" panose="02020603050405020304" pitchFamily="18" charset="0"/>
               </a:rPr>
-              <a:t>Technologie-ondersteunde revalidatie - </a:t>
-            </a:r>
-            <a:r>
-              <a:rPr kumimoji="0" lang="nl-BE" altLang="nl-BE" sz="1200" b="0" i="1" u="none" strike="noStrike" cap="none" normalizeH="0" baseline="0" dirty="0" err="1">
+              <a:t>Ruddock</a:t>
+            </a:r>
+            <a:r>
+              <a:rPr kumimoji="0" lang="nl-BE" altLang="nl-BE" sz="1200" b="0" i="0" u="none" strike="noStrike" cap="none" normalizeH="0" baseline="0" dirty="0">
                 <a:ln>
                   <a:noFill/>
                 </a:ln>
@@ -14551,21 +14617,7 @@
                 <a:latin typeface="Times New Roman" panose="02020603050405020304" pitchFamily="18" charset="0"/>
                 <a:cs typeface="Times New Roman" panose="02020603050405020304" pitchFamily="18" charset="0"/>
               </a:rPr>
-              <a:t>UHasselt</a:t>
-            </a:r>
-            <a:r>
-              <a:rPr kumimoji="0" lang="nl-BE" altLang="nl-BE" sz="1200" b="0" i="0" u="none" strike="noStrike" cap="none" normalizeH="0" baseline="0" dirty="0">
-                <a:ln>
-                  <a:noFill/>
-                </a:ln>
-                <a:solidFill>
-                  <a:schemeClr val="tx1"/>
-                </a:solidFill>
-                <a:effectLst/>
-                <a:latin typeface="Times New Roman" panose="02020603050405020304" pitchFamily="18" charset="0"/>
-                <a:cs typeface="Times New Roman" panose="02020603050405020304" pitchFamily="18" charset="0"/>
-              </a:rPr>
-              <a:t>. (</a:t>
+              <a:t>, J. (</a:t>
             </a:r>
             <a:r>
               <a:rPr kumimoji="0" lang="nl-BE" altLang="nl-BE" sz="1200" b="0" i="0" u="none" strike="noStrike" cap="none" normalizeH="0" baseline="0" dirty="0" err="1">
@@ -14596,7 +14648,7 @@
               <a:t>.). </a:t>
             </a:r>
             <a:r>
-              <a:rPr kumimoji="0" lang="nl-BE" altLang="nl-BE" sz="1200" b="0" i="0" u="none" strike="noStrike" cap="none" normalizeH="0" baseline="0" dirty="0" err="1">
+              <a:rPr kumimoji="0" lang="nl-BE" altLang="nl-BE" sz="1200" b="0" i="1" u="none" strike="noStrike" cap="none" normalizeH="0" baseline="0" dirty="0">
                 <a:ln>
                   <a:noFill/>
                 </a:ln>
@@ -14607,7 +14659,189 @@
                 <a:latin typeface="Times New Roman" panose="02020603050405020304" pitchFamily="18" charset="0"/>
                 <a:cs typeface="Times New Roman" panose="02020603050405020304" pitchFamily="18" charset="0"/>
               </a:rPr>
-              <a:t>UHasselt</a:t>
+              <a:t>Research </a:t>
+            </a:r>
+            <a:r>
+              <a:rPr kumimoji="0" lang="nl-BE" altLang="nl-BE" sz="1200" b="0" i="1" u="none" strike="noStrike" cap="none" normalizeH="0" baseline="0" dirty="0" err="1">
+                <a:ln>
+                  <a:noFill/>
+                </a:ln>
+                <a:solidFill>
+                  <a:schemeClr val="tx1"/>
+                </a:solidFill>
+                <a:effectLst/>
+                <a:latin typeface="Times New Roman" panose="02020603050405020304" pitchFamily="18" charset="0"/>
+                <a:cs typeface="Times New Roman" panose="02020603050405020304" pitchFamily="18" charset="0"/>
+              </a:rPr>
+              <a:t>reveals</a:t>
+            </a:r>
+            <a:r>
+              <a:rPr kumimoji="0" lang="nl-BE" altLang="nl-BE" sz="1200" b="0" i="1" u="none" strike="noStrike" cap="none" normalizeH="0" baseline="0" dirty="0">
+                <a:ln>
+                  <a:noFill/>
+                </a:ln>
+                <a:solidFill>
+                  <a:schemeClr val="tx1"/>
+                </a:solidFill>
+                <a:effectLst/>
+                <a:latin typeface="Times New Roman" panose="02020603050405020304" pitchFamily="18" charset="0"/>
+                <a:cs typeface="Times New Roman" panose="02020603050405020304" pitchFamily="18" charset="0"/>
+              </a:rPr>
+              <a:t> </a:t>
+            </a:r>
+            <a:r>
+              <a:rPr kumimoji="0" lang="nl-BE" altLang="nl-BE" sz="1200" b="0" i="1" u="none" strike="noStrike" cap="none" normalizeH="0" baseline="0" dirty="0" err="1">
+                <a:ln>
+                  <a:noFill/>
+                </a:ln>
+                <a:solidFill>
+                  <a:schemeClr val="tx1"/>
+                </a:solidFill>
+                <a:effectLst/>
+                <a:latin typeface="Times New Roman" panose="02020603050405020304" pitchFamily="18" charset="0"/>
+                <a:cs typeface="Times New Roman" panose="02020603050405020304" pitchFamily="18" charset="0"/>
+              </a:rPr>
+              <a:t>massive</a:t>
+            </a:r>
+            <a:r>
+              <a:rPr kumimoji="0" lang="nl-BE" altLang="nl-BE" sz="1200" b="0" i="1" u="none" strike="noStrike" cap="none" normalizeH="0" baseline="0" dirty="0">
+                <a:ln>
+                  <a:noFill/>
+                </a:ln>
+                <a:solidFill>
+                  <a:schemeClr val="tx1"/>
+                </a:solidFill>
+                <a:effectLst/>
+                <a:latin typeface="Times New Roman" panose="02020603050405020304" pitchFamily="18" charset="0"/>
+                <a:cs typeface="Times New Roman" panose="02020603050405020304" pitchFamily="18" charset="0"/>
+              </a:rPr>
+              <a:t> </a:t>
+            </a:r>
+            <a:r>
+              <a:rPr kumimoji="0" lang="nl-BE" altLang="nl-BE" sz="1200" b="0" i="1" u="none" strike="noStrike" cap="none" normalizeH="0" baseline="0" dirty="0" err="1">
+                <a:ln>
+                  <a:noFill/>
+                </a:ln>
+                <a:solidFill>
+                  <a:schemeClr val="tx1"/>
+                </a:solidFill>
+                <a:effectLst/>
+                <a:latin typeface="Times New Roman" panose="02020603050405020304" pitchFamily="18" charset="0"/>
+                <a:cs typeface="Times New Roman" panose="02020603050405020304" pitchFamily="18" charset="0"/>
+              </a:rPr>
+              <a:t>increase</a:t>
+            </a:r>
+            <a:r>
+              <a:rPr kumimoji="0" lang="nl-BE" altLang="nl-BE" sz="1200" b="0" i="1" u="none" strike="noStrike" cap="none" normalizeH="0" baseline="0" dirty="0">
+                <a:ln>
+                  <a:noFill/>
+                </a:ln>
+                <a:solidFill>
+                  <a:schemeClr val="tx1"/>
+                </a:solidFill>
+                <a:effectLst/>
+                <a:latin typeface="Times New Roman" panose="02020603050405020304" pitchFamily="18" charset="0"/>
+                <a:cs typeface="Times New Roman" panose="02020603050405020304" pitchFamily="18" charset="0"/>
+              </a:rPr>
+              <a:t> in </a:t>
+            </a:r>
+            <a:r>
+              <a:rPr kumimoji="0" lang="nl-BE" altLang="nl-BE" sz="1200" b="0" i="1" u="none" strike="noStrike" cap="none" normalizeH="0" baseline="0" dirty="0" err="1">
+                <a:ln>
+                  <a:noFill/>
+                </a:ln>
+                <a:solidFill>
+                  <a:schemeClr val="tx1"/>
+                </a:solidFill>
+                <a:effectLst/>
+                <a:latin typeface="Times New Roman" panose="02020603050405020304" pitchFamily="18" charset="0"/>
+                <a:cs typeface="Times New Roman" panose="02020603050405020304" pitchFamily="18" charset="0"/>
+              </a:rPr>
+              <a:t>number</a:t>
+            </a:r>
+            <a:r>
+              <a:rPr kumimoji="0" lang="nl-BE" altLang="nl-BE" sz="1200" b="0" i="1" u="none" strike="noStrike" cap="none" normalizeH="0" baseline="0" dirty="0">
+                <a:ln>
+                  <a:noFill/>
+                </a:ln>
+                <a:solidFill>
+                  <a:schemeClr val="tx1"/>
+                </a:solidFill>
+                <a:effectLst/>
+                <a:latin typeface="Times New Roman" panose="02020603050405020304" pitchFamily="18" charset="0"/>
+                <a:cs typeface="Times New Roman" panose="02020603050405020304" pitchFamily="18" charset="0"/>
+              </a:rPr>
+              <a:t> of fans live streaming </a:t>
+            </a:r>
+            <a:r>
+              <a:rPr kumimoji="0" lang="nl-BE" altLang="nl-BE" sz="1200" b="0" i="1" u="none" strike="noStrike" cap="none" normalizeH="0" baseline="0" dirty="0" err="1">
+                <a:ln>
+                  <a:noFill/>
+                </a:ln>
+                <a:solidFill>
+                  <a:schemeClr val="tx1"/>
+                </a:solidFill>
+                <a:effectLst/>
+                <a:latin typeface="Times New Roman" panose="02020603050405020304" pitchFamily="18" charset="0"/>
+                <a:cs typeface="Times New Roman" panose="02020603050405020304" pitchFamily="18" charset="0"/>
+              </a:rPr>
+              <a:t>football</a:t>
+            </a:r>
+            <a:r>
+              <a:rPr kumimoji="0" lang="nl-BE" altLang="nl-BE" sz="1200" b="0" i="1" u="none" strike="noStrike" cap="none" normalizeH="0" baseline="0" dirty="0">
+                <a:ln>
+                  <a:noFill/>
+                </a:ln>
+                <a:solidFill>
+                  <a:schemeClr val="tx1"/>
+                </a:solidFill>
+                <a:effectLst/>
+                <a:latin typeface="Times New Roman" panose="02020603050405020304" pitchFamily="18" charset="0"/>
+                <a:cs typeface="Times New Roman" panose="02020603050405020304" pitchFamily="18" charset="0"/>
+              </a:rPr>
+              <a:t> </a:t>
+            </a:r>
+            <a:r>
+              <a:rPr kumimoji="0" lang="nl-BE" altLang="nl-BE" sz="1200" b="0" i="1" u="none" strike="noStrike" cap="none" normalizeH="0" baseline="0" dirty="0" err="1">
+                <a:ln>
+                  <a:noFill/>
+                </a:ln>
+                <a:solidFill>
+                  <a:schemeClr val="tx1"/>
+                </a:solidFill>
+                <a:effectLst/>
+                <a:latin typeface="Times New Roman" panose="02020603050405020304" pitchFamily="18" charset="0"/>
+                <a:cs typeface="Times New Roman" panose="02020603050405020304" pitchFamily="18" charset="0"/>
+              </a:rPr>
+              <a:t>from</a:t>
+            </a:r>
+            <a:r>
+              <a:rPr kumimoji="0" lang="nl-BE" altLang="nl-BE" sz="1200" b="0" i="1" u="none" strike="noStrike" cap="none" normalizeH="0" baseline="0" dirty="0">
+                <a:ln>
+                  <a:noFill/>
+                </a:ln>
+                <a:solidFill>
+                  <a:schemeClr val="tx1"/>
+                </a:solidFill>
+                <a:effectLst/>
+                <a:latin typeface="Times New Roman" panose="02020603050405020304" pitchFamily="18" charset="0"/>
+                <a:cs typeface="Times New Roman" panose="02020603050405020304" pitchFamily="18" charset="0"/>
+              </a:rPr>
+              <a:t> home post-</a:t>
+            </a:r>
+            <a:r>
+              <a:rPr kumimoji="0" lang="nl-BE" altLang="nl-BE" sz="1200" b="0" i="1" u="none" strike="noStrike" cap="none" normalizeH="0" baseline="0" dirty="0" err="1">
+                <a:ln>
+                  <a:noFill/>
+                </a:ln>
+                <a:solidFill>
+                  <a:schemeClr val="tx1"/>
+                </a:solidFill>
+                <a:effectLst/>
+                <a:latin typeface="Times New Roman" panose="02020603050405020304" pitchFamily="18" charset="0"/>
+                <a:cs typeface="Times New Roman" panose="02020603050405020304" pitchFamily="18" charset="0"/>
+              </a:rPr>
+              <a:t>pandemic</a:t>
             </a:r>
             <a:r>
               <a:rPr kumimoji="0" lang="nl-BE" altLang="nl-BE" sz="1200" b="0" i="0" u="none" strike="noStrike" cap="none" normalizeH="0" baseline="0" dirty="0">
@@ -14621,7 +14855,7 @@
                 <a:latin typeface="Times New Roman" panose="02020603050405020304" pitchFamily="18" charset="0"/>
                 <a:cs typeface="Times New Roman" panose="02020603050405020304" pitchFamily="18" charset="0"/>
               </a:rPr>
-              <a:t>. </a:t>
+              <a:t>. SVG Europe. </a:t>
             </a:r>
             <a:r>
               <a:rPr kumimoji="0" lang="nl-BE" altLang="nl-BE" sz="1200" b="0" i="0" u="none" strike="noStrike" cap="none" normalizeH="0" baseline="0" dirty="0">
@@ -14636,7 +14870,7 @@
                 <a:cs typeface="Times New Roman" panose="02020603050405020304" pitchFamily="18" charset="0"/>
                 <a:hlinkClick r:id="rId12"/>
               </a:rPr>
-              <a:t>https://www.uhasselt.be/nl/onderzoeksgroepen/reval/technologie-ondersteunde-revalidatie</a:t>
+              <a:t>https://www.svgeurope.org/blog/headlines/research-reveals-massive-increase-in-number-of-fans-live-streaming-football-from-home-post-pandemic/</a:t>
             </a:r>
             <a:r>
               <a:rPr kumimoji="0" lang="nl-BE" altLang="nl-BE" sz="1200" b="0" i="0" u="none" strike="noStrike" cap="none" normalizeH="0" baseline="0" dirty="0">
@@ -14663,9 +14897,287 @@
             </a:endParaRPr>
           </a:p>
           <a:p>
-            <a:pPr defTabSz="914400">
+            <a:pPr marL="171450" marR="0" lvl="0" indent="-171450" algn="l" defTabSz="914400" rtl="0" eaLnBrk="0" fontAlgn="base" latinLnBrk="0" hangingPunct="0">
+              <a:lnSpc>
+                <a:spcPct val="100000"/>
+              </a:lnSpc>
+              <a:spcBef>
+                <a:spcPct val="0"/>
+              </a:spcBef>
+              <a:spcAft>
+                <a:spcPct val="0"/>
+              </a:spcAft>
               <a:buClrTx/>
               <a:buSzTx/>
+              <a:buFont typeface="Arial" panose="020B0604020202020204" pitchFamily="34" charset="0"/>
+              <a:buChar char="•"/>
+              <a:tabLst/>
+            </a:pPr>
+            <a:r>
+              <a:rPr kumimoji="0" lang="nl-BE" altLang="nl-BE" sz="1200" b="0" i="1" u="none" strike="noStrike" cap="none" normalizeH="0" baseline="0" dirty="0" err="1">
+                <a:ln>
+                  <a:noFill/>
+                </a:ln>
+                <a:solidFill>
+                  <a:schemeClr val="tx1"/>
+                </a:solidFill>
+                <a:effectLst/>
+                <a:latin typeface="Times New Roman" panose="02020603050405020304" pitchFamily="18" charset="0"/>
+                <a:cs typeface="Times New Roman" panose="02020603050405020304" pitchFamily="18" charset="0"/>
+              </a:rPr>
+              <a:t>sporza</a:t>
+            </a:r>
+            <a:r>
+              <a:rPr kumimoji="0" lang="nl-BE" altLang="nl-BE" sz="1200" b="0" i="0" u="none" strike="noStrike" cap="none" normalizeH="0" baseline="0" dirty="0">
+                <a:ln>
+                  <a:noFill/>
+                </a:ln>
+                <a:solidFill>
+                  <a:schemeClr val="tx1"/>
+                </a:solidFill>
+                <a:effectLst/>
+                <a:latin typeface="Times New Roman" panose="02020603050405020304" pitchFamily="18" charset="0"/>
+                <a:cs typeface="Times New Roman" panose="02020603050405020304" pitchFamily="18" charset="0"/>
+              </a:rPr>
+              <a:t>. (2018, </a:t>
+            </a:r>
+            <a:r>
+              <a:rPr kumimoji="0" lang="nl-BE" altLang="nl-BE" sz="1200" b="0" i="0" u="none" strike="noStrike" cap="none" normalizeH="0" baseline="0" dirty="0" err="1">
+                <a:ln>
+                  <a:noFill/>
+                </a:ln>
+                <a:solidFill>
+                  <a:schemeClr val="tx1"/>
+                </a:solidFill>
+                <a:effectLst/>
+                <a:latin typeface="Times New Roman" panose="02020603050405020304" pitchFamily="18" charset="0"/>
+                <a:cs typeface="Times New Roman" panose="02020603050405020304" pitchFamily="18" charset="0"/>
+              </a:rPr>
+              <a:t>January</a:t>
+            </a:r>
+            <a:r>
+              <a:rPr kumimoji="0" lang="nl-BE" altLang="nl-BE" sz="1200" b="0" i="0" u="none" strike="noStrike" cap="none" normalizeH="0" baseline="0" dirty="0">
+                <a:ln>
+                  <a:noFill/>
+                </a:ln>
+                <a:solidFill>
+                  <a:schemeClr val="tx1"/>
+                </a:solidFill>
+                <a:effectLst/>
+                <a:latin typeface="Times New Roman" panose="02020603050405020304" pitchFamily="18" charset="0"/>
+                <a:cs typeface="Times New Roman" panose="02020603050405020304" pitchFamily="18" charset="0"/>
+              </a:rPr>
+              <a:t> 10). sporza.be. </a:t>
+            </a:r>
+            <a:r>
+              <a:rPr kumimoji="0" lang="nl-BE" altLang="nl-BE" sz="1200" b="0" i="0" u="none" strike="noStrike" cap="none" normalizeH="0" baseline="0" dirty="0">
+                <a:ln>
+                  <a:noFill/>
+                </a:ln>
+                <a:solidFill>
+                  <a:schemeClr val="tx1"/>
+                </a:solidFill>
+                <a:effectLst/>
+                <a:latin typeface="Times New Roman" panose="02020603050405020304" pitchFamily="18" charset="0"/>
+                <a:cs typeface="Times New Roman" panose="02020603050405020304" pitchFamily="18" charset="0"/>
+                <a:hlinkClick r:id="rId13"/>
+              </a:rPr>
+              <a:t>https://sporza.be/nl/</a:t>
+            </a:r>
+            <a:r>
+              <a:rPr kumimoji="0" lang="nl-BE" altLang="nl-BE" sz="1200" b="0" i="0" u="none" strike="noStrike" cap="none" normalizeH="0" baseline="0" dirty="0">
+                <a:ln>
+                  <a:noFill/>
+                </a:ln>
+                <a:solidFill>
+                  <a:schemeClr val="tx1"/>
+                </a:solidFill>
+                <a:effectLst/>
+                <a:latin typeface="Times New Roman" panose="02020603050405020304" pitchFamily="18" charset="0"/>
+                <a:cs typeface="Times New Roman" panose="02020603050405020304" pitchFamily="18" charset="0"/>
+              </a:rPr>
+              <a:t> </a:t>
+            </a:r>
+            <a:endParaRPr kumimoji="0" lang="nl-BE" altLang="nl-BE" sz="600" b="0" i="0" u="none" strike="noStrike" cap="none" normalizeH="0" baseline="0" dirty="0">
+              <a:ln>
+                <a:noFill/>
+              </a:ln>
+              <a:solidFill>
+                <a:schemeClr val="tx1"/>
+              </a:solidFill>
+              <a:effectLst/>
+            </a:endParaRPr>
+          </a:p>
+          <a:p>
+            <a:pPr marL="171450" marR="0" lvl="0" indent="-171450" algn="l" defTabSz="914400" rtl="0" eaLnBrk="0" fontAlgn="base" latinLnBrk="0" hangingPunct="0">
+              <a:lnSpc>
+                <a:spcPct val="100000"/>
+              </a:lnSpc>
+              <a:spcBef>
+                <a:spcPct val="0"/>
+              </a:spcBef>
+              <a:spcAft>
+                <a:spcPct val="0"/>
+              </a:spcAft>
+              <a:buClrTx/>
+              <a:buSzTx/>
+              <a:buFont typeface="Arial" panose="020B0604020202020204" pitchFamily="34" charset="0"/>
+              <a:buChar char="•"/>
+              <a:tabLst/>
+            </a:pPr>
+            <a:r>
+              <a:rPr kumimoji="0" lang="nl-BE" altLang="nl-BE" sz="1200" b="0" i="1" u="none" strike="noStrike" cap="none" normalizeH="0" baseline="0" dirty="0">
+                <a:ln>
+                  <a:noFill/>
+                </a:ln>
+                <a:solidFill>
+                  <a:schemeClr val="tx1"/>
+                </a:solidFill>
+                <a:effectLst/>
+                <a:latin typeface="Times New Roman" panose="02020603050405020304" pitchFamily="18" charset="0"/>
+                <a:cs typeface="Times New Roman" panose="02020603050405020304" pitchFamily="18" charset="0"/>
+              </a:rPr>
+              <a:t>Technologie-ondersteunde revalidatie - </a:t>
+            </a:r>
+            <a:r>
+              <a:rPr kumimoji="0" lang="nl-BE" altLang="nl-BE" sz="1200" b="0" i="1" u="none" strike="noStrike" cap="none" normalizeH="0" baseline="0" dirty="0" err="1">
+                <a:ln>
+                  <a:noFill/>
+                </a:ln>
+                <a:solidFill>
+                  <a:schemeClr val="tx1"/>
+                </a:solidFill>
+                <a:effectLst/>
+                <a:latin typeface="Times New Roman" panose="02020603050405020304" pitchFamily="18" charset="0"/>
+                <a:cs typeface="Times New Roman" panose="02020603050405020304" pitchFamily="18" charset="0"/>
+              </a:rPr>
+              <a:t>UHasselt</a:t>
+            </a:r>
+            <a:r>
+              <a:rPr kumimoji="0" lang="nl-BE" altLang="nl-BE" sz="1200" b="0" i="0" u="none" strike="noStrike" cap="none" normalizeH="0" baseline="0" dirty="0">
+                <a:ln>
+                  <a:noFill/>
+                </a:ln>
+                <a:solidFill>
+                  <a:schemeClr val="tx1"/>
+                </a:solidFill>
+                <a:effectLst/>
+                <a:latin typeface="Times New Roman" panose="02020603050405020304" pitchFamily="18" charset="0"/>
+                <a:cs typeface="Times New Roman" panose="02020603050405020304" pitchFamily="18" charset="0"/>
+              </a:rPr>
+              <a:t>. (</a:t>
+            </a:r>
+            <a:r>
+              <a:rPr kumimoji="0" lang="nl-BE" altLang="nl-BE" sz="1200" b="0" i="0" u="none" strike="noStrike" cap="none" normalizeH="0" baseline="0" dirty="0" err="1">
+                <a:ln>
+                  <a:noFill/>
+                </a:ln>
+                <a:solidFill>
+                  <a:schemeClr val="tx1"/>
+                </a:solidFill>
+                <a:effectLst/>
+                <a:latin typeface="Times New Roman" panose="02020603050405020304" pitchFamily="18" charset="0"/>
+                <a:cs typeface="Times New Roman" panose="02020603050405020304" pitchFamily="18" charset="0"/>
+              </a:rPr>
+              <a:t>n.d</a:t>
+            </a:r>
+            <a:r>
+              <a:rPr kumimoji="0" lang="nl-BE" altLang="nl-BE" sz="1200" b="0" i="0" u="none" strike="noStrike" cap="none" normalizeH="0" baseline="0" dirty="0">
+                <a:ln>
+                  <a:noFill/>
+                </a:ln>
+                <a:solidFill>
+                  <a:schemeClr val="tx1"/>
+                </a:solidFill>
+                <a:effectLst/>
+                <a:latin typeface="Times New Roman" panose="02020603050405020304" pitchFamily="18" charset="0"/>
+                <a:cs typeface="Times New Roman" panose="02020603050405020304" pitchFamily="18" charset="0"/>
+              </a:rPr>
+              <a:t>.). </a:t>
+            </a:r>
+            <a:r>
+              <a:rPr kumimoji="0" lang="nl-BE" altLang="nl-BE" sz="1200" b="0" i="0" u="none" strike="noStrike" cap="none" normalizeH="0" baseline="0" dirty="0" err="1">
+                <a:ln>
+                  <a:noFill/>
+                </a:ln>
+                <a:solidFill>
+                  <a:schemeClr val="tx1"/>
+                </a:solidFill>
+                <a:effectLst/>
+                <a:latin typeface="Times New Roman" panose="02020603050405020304" pitchFamily="18" charset="0"/>
+                <a:cs typeface="Times New Roman" panose="02020603050405020304" pitchFamily="18" charset="0"/>
+              </a:rPr>
+              <a:t>UHasselt</a:t>
+            </a:r>
+            <a:r>
+              <a:rPr kumimoji="0" lang="nl-BE" altLang="nl-BE" sz="1200" b="0" i="0" u="none" strike="noStrike" cap="none" normalizeH="0" baseline="0" dirty="0">
+                <a:ln>
+                  <a:noFill/>
+                </a:ln>
+                <a:solidFill>
+                  <a:schemeClr val="tx1"/>
+                </a:solidFill>
+                <a:effectLst/>
+                <a:latin typeface="Times New Roman" panose="02020603050405020304" pitchFamily="18" charset="0"/>
+                <a:cs typeface="Times New Roman" panose="02020603050405020304" pitchFamily="18" charset="0"/>
+              </a:rPr>
+              <a:t>. </a:t>
+            </a:r>
+            <a:r>
+              <a:rPr kumimoji="0" lang="nl-BE" altLang="nl-BE" sz="1200" b="0" i="0" u="none" strike="noStrike" cap="none" normalizeH="0" baseline="0" dirty="0">
+                <a:ln>
+                  <a:noFill/>
+                </a:ln>
+                <a:solidFill>
+                  <a:schemeClr val="tx1"/>
+                </a:solidFill>
+                <a:effectLst/>
+                <a:latin typeface="Times New Roman" panose="02020603050405020304" pitchFamily="18" charset="0"/>
+                <a:cs typeface="Times New Roman" panose="02020603050405020304" pitchFamily="18" charset="0"/>
+                <a:hlinkClick r:id="rId14"/>
+              </a:rPr>
+              <a:t>https://www.uhasselt.be/nl/onderzoeksgroepen/reval/technologie-ondersteunde-revalidatie</a:t>
+            </a:r>
+            <a:r>
+              <a:rPr kumimoji="0" lang="nl-BE" altLang="nl-BE" sz="1200" b="0" i="0" u="none" strike="noStrike" cap="none" normalizeH="0" baseline="0" dirty="0">
+                <a:ln>
+                  <a:noFill/>
+                </a:ln>
+                <a:solidFill>
+                  <a:schemeClr val="tx1"/>
+                </a:solidFill>
+                <a:effectLst/>
+                <a:latin typeface="Times New Roman" panose="02020603050405020304" pitchFamily="18" charset="0"/>
+                <a:cs typeface="Times New Roman" panose="02020603050405020304" pitchFamily="18" charset="0"/>
+              </a:rPr>
+              <a:t> </a:t>
+            </a:r>
+            <a:endParaRPr kumimoji="0" lang="nl-BE" altLang="nl-BE" sz="600" b="0" i="0" u="none" strike="noStrike" cap="none" normalizeH="0" baseline="0" dirty="0">
+              <a:ln>
+                <a:noFill/>
+              </a:ln>
+              <a:solidFill>
+                <a:schemeClr val="tx1"/>
+              </a:solidFill>
+              <a:effectLst/>
+            </a:endParaRPr>
+          </a:p>
+          <a:p>
+            <a:pPr marL="171450" marR="0" lvl="0" indent="-171450" algn="l" defTabSz="914400" rtl="0" eaLnBrk="0" fontAlgn="base" latinLnBrk="0" hangingPunct="0">
+              <a:lnSpc>
+                <a:spcPct val="100000"/>
+              </a:lnSpc>
+              <a:spcBef>
+                <a:spcPct val="0"/>
+              </a:spcBef>
+              <a:spcAft>
+                <a:spcPct val="0"/>
+              </a:spcAft>
+              <a:buClrTx/>
+              <a:buSzTx/>
+              <a:buFont typeface="Arial" panose="020B0604020202020204" pitchFamily="34" charset="0"/>
+              <a:buChar char="•"/>
+              <a:tabLst/>
             </a:pPr>
             <a:r>
               <a:rPr kumimoji="0" lang="nl-BE" altLang="nl-BE" sz="1200" b="0" i="0" u="none" strike="noStrike" cap="none" normalizeH="0" baseline="0" dirty="0">
@@ -14748,7 +15260,7 @@
                 <a:effectLst/>
                 <a:latin typeface="Times New Roman" panose="02020603050405020304" pitchFamily="18" charset="0"/>
                 <a:cs typeface="Times New Roman" panose="02020603050405020304" pitchFamily="18" charset="0"/>
-                <a:hlinkClick r:id="rId13"/>
+                <a:hlinkClick r:id="rId15"/>
               </a:rPr>
               <a:t>https://www.uza.be/behandeling/sportmedische-keuring-en-preventie</a:t>
             </a:r>

</xml_diff>